<commit_message>
revisions to the deck
revised the deck based on Sason's comments
</commit_message>
<xml_diff>
--- a/API Analysis/Review deck/Initial Scoping.pptx
+++ b/API Analysis/Review deck/Initial Scoping.pptx
@@ -128,15 +128,75 @@
       </p:ext>
     </p:extLst>
   </p:cmAuthor>
+  <p:cmAuthor id="2" name="udai parvathaneni" initials="up" lastIdx="2" clrIdx="1">
+    <p:extLst>
+      <p:ext uri="{19B8F6BF-5375-455C-9EA6-DF929625EA0E}">
+        <p15:presenceInfo xmlns:p15="http://schemas.microsoft.com/office/powerpoint/2012/main" userId="d83d812613df3043" providerId="Windows Live"/>
+      </p:ext>
+    </p:extLst>
+  </p:cmAuthor>
 </p:cmAuthorLst>
 </file>
 
 <file path=ppt/revisionInfo.xml><?xml version="1.0" encoding="utf-8"?>
 <p1510:revInfo xmlns:a="http://schemas.openxmlformats.org/drawingml/2006/main" xmlns:r="http://schemas.openxmlformats.org/officeDocument/2006/relationships" xmlns:p1510="http://schemas.microsoft.com/office/powerpoint/2015/10/main">
   <p1510:revLst>
+    <p1510:client id="{3D7A6A80-EE33-4841-B2CA-F0A08A8E7586}" v="1" dt="2021-06-03T03:03:02.907"/>
     <p1510:client id="{AD0A23DC-698B-5A42-AB71-FBCD8D64C716}" v="174" dt="2021-06-02T16:35:30.792"/>
   </p1510:revLst>
 </p1510:revInfo>
+</file>
+
+<file path=ppt/changesInfos/changesInfo1.xml><?xml version="1.0" encoding="utf-8"?>
+<pc:chgInfo xmlns:a="http://schemas.openxmlformats.org/drawingml/2006/main" xmlns:r="http://schemas.openxmlformats.org/officeDocument/2006/relationships" xmlns:ac="http://schemas.microsoft.com/office/drawing/2013/main/command" xmlns:pc="http://schemas.microsoft.com/office/powerpoint/2013/main/command">
+  <pc:docChgLst>
+    <pc:chgData name="udai parvathaneni" userId="d83d812613df3043" providerId="LiveId" clId="{3D7A6A80-EE33-4841-B2CA-F0A08A8E7586}"/>
+    <pc:docChg chg="custSel modSld">
+      <pc:chgData name="udai parvathaneni" userId="d83d812613df3043" providerId="LiveId" clId="{3D7A6A80-EE33-4841-B2CA-F0A08A8E7586}" dt="2021-06-03T03:03:02.907" v="9"/>
+      <pc:docMkLst>
+        <pc:docMk/>
+      </pc:docMkLst>
+      <pc:sldChg chg="modSp mod addCm modCm">
+        <pc:chgData name="udai parvathaneni" userId="d83d812613df3043" providerId="LiveId" clId="{3D7A6A80-EE33-4841-B2CA-F0A08A8E7586}" dt="2021-06-03T03:03:02.907" v="9"/>
+        <pc:sldMkLst>
+          <pc:docMk/>
+          <pc:sldMk cId="2719201867" sldId="262"/>
+        </pc:sldMkLst>
+        <pc:spChg chg="mod">
+          <ac:chgData name="udai parvathaneni" userId="d83d812613df3043" providerId="LiveId" clId="{3D7A6A80-EE33-4841-B2CA-F0A08A8E7586}" dt="2021-06-03T03:01:59.956" v="6" actId="692"/>
+          <ac:spMkLst>
+            <pc:docMk/>
+            <pc:sldMk cId="2719201867" sldId="262"/>
+            <ac:spMk id="4" creationId="{B3E6CBDA-13D4-E545-95C4-5B470DC897D4}"/>
+          </ac:spMkLst>
+        </pc:spChg>
+        <pc:spChg chg="mod">
+          <ac:chgData name="udai parvathaneni" userId="d83d812613df3043" providerId="LiveId" clId="{3D7A6A80-EE33-4841-B2CA-F0A08A8E7586}" dt="2021-06-03T03:02:09.254" v="8" actId="692"/>
+          <ac:spMkLst>
+            <pc:docMk/>
+            <pc:sldMk cId="2719201867" sldId="262"/>
+            <ac:spMk id="13" creationId="{89499D6C-26B3-4740-8944-7855DA094A1E}"/>
+          </ac:spMkLst>
+        </pc:spChg>
+      </pc:sldChg>
+      <pc:sldChg chg="modSp mod addCm">
+        <pc:chgData name="udai parvathaneni" userId="d83d812613df3043" providerId="LiveId" clId="{3D7A6A80-EE33-4841-B2CA-F0A08A8E7586}" dt="2021-06-03T02:59:22.422" v="3" actId="1589"/>
+        <pc:sldMkLst>
+          <pc:docMk/>
+          <pc:sldMk cId="1631408000" sldId="263"/>
+        </pc:sldMkLst>
+        <pc:spChg chg="mod">
+          <ac:chgData name="udai parvathaneni" userId="d83d812613df3043" providerId="LiveId" clId="{3D7A6A80-EE33-4841-B2CA-F0A08A8E7586}" dt="2021-06-03T02:59:07.343" v="2" actId="20577"/>
+          <ac:spMkLst>
+            <pc:docMk/>
+            <pc:sldMk cId="1631408000" sldId="263"/>
+            <ac:spMk id="19" creationId="{EB878473-E2E6-6546-B88E-60A402260AD2}"/>
+          </ac:spMkLst>
+        </pc:spChg>
+      </pc:sldChg>
+    </pc:docChg>
+  </pc:docChgLst>
+</pc:chgInfo>
 </file>
 
 <file path=ppt/comments/comment1.xml><?xml version="1.0" encoding="utf-8"?>
@@ -147,6 +207,17 @@
     <p:extLst>
       <p:ext uri="{C676402C-5697-4E1C-873F-D02D1690AC5C}">
         <p15:threadingInfo xmlns:p15="http://schemas.microsoft.com/office/powerpoint/2012/main" timeZoneBias="420"/>
+      </p:ext>
+    </p:extLst>
+  </p:cm>
+  <p:cm authorId="2" dt="2021-06-02T23:01:34.625" idx="2">
+    <p:pos x="1474" y="1427"/>
+    <p:text>Lets explore that thought and see if its feasible to get Nansen wallet profiler as a feature in the model.For now I will change the cell colour to green </p:text>
+    <p:extLst>
+      <p:ext uri="{C676402C-5697-4E1C-873F-D02D1690AC5C}">
+        <p15:threadingInfo xmlns:p15="http://schemas.microsoft.com/office/powerpoint/2012/main" timeZoneBias="240">
+          <p15:parentCm authorId="1" idx="2"/>
+        </p15:threadingInfo>
       </p:ext>
     </p:extLst>
   </p:cm>
@@ -161,6 +232,17 @@
     <p:extLst>
       <p:ext uri="{C676402C-5697-4E1C-873F-D02D1690AC5C}">
         <p15:threadingInfo xmlns:p15="http://schemas.microsoft.com/office/powerpoint/2012/main" timeZoneBias="420"/>
+      </p:ext>
+    </p:extLst>
+  </p:cm>
+  <p:cm authorId="2" dt="2021-06-02T22:59:22.343" idx="1">
+    <p:pos x="10" y="146"/>
+    <p:text>:) revised</p:text>
+    <p:extLst>
+      <p:ext uri="{C676402C-5697-4E1C-873F-D02D1690AC5C}">
+        <p15:threadingInfo xmlns:p15="http://schemas.microsoft.com/office/powerpoint/2012/main" timeZoneBias="240">
+          <p15:parentCm authorId="1" idx="1"/>
+        </p15:threadingInfo>
       </p:ext>
     </p:extLst>
   </p:cm>
@@ -3181,8 +3263,8 @@
     </dgm:pt>
   </dgm:ptLst>
   <dgm:cxnLst>
+    <dgm:cxn modelId="{81245D45-5D16-3847-8EDA-6E77AA59A0E8}" srcId="{0C1123CB-21AC-B745-B147-6B0F77A8FC70}" destId="{9BDB6ED8-7D00-F244-BC42-7315F5329629}" srcOrd="1" destOrd="0" parTransId="{8BBF319E-9641-AF4A-8584-70765EFD5470}" sibTransId="{25CC220D-3AAF-E346-A35A-D5B57E2F3C31}"/>
     <dgm:cxn modelId="{40DB745C-42EA-B548-ADA5-4F034B7095FC}" type="presOf" srcId="{7E9E90DB-36DA-3E4E-AC95-8770E247C94D}" destId="{F6A4F41B-2127-6845-A2F0-0FE5AE15AA65}" srcOrd="0" destOrd="0" presId="urn:microsoft.com/office/officeart/2005/8/layout/funnel1"/>
-    <dgm:cxn modelId="{81245D45-5D16-3847-8EDA-6E77AA59A0E8}" srcId="{0C1123CB-21AC-B745-B147-6B0F77A8FC70}" destId="{9BDB6ED8-7D00-F244-BC42-7315F5329629}" srcOrd="1" destOrd="0" parTransId="{8BBF319E-9641-AF4A-8584-70765EFD5470}" sibTransId="{25CC220D-3AAF-E346-A35A-D5B57E2F3C31}"/>
     <dgm:cxn modelId="{B5A3E674-2A03-1D45-A5B4-A8CB76E92DC8}" srcId="{0C1123CB-21AC-B745-B147-6B0F77A8FC70}" destId="{7E9E90DB-36DA-3E4E-AC95-8770E247C94D}" srcOrd="2" destOrd="0" parTransId="{5FCC8E10-4A9F-5143-B4A6-B24E2BF715FA}" sibTransId="{12C9B481-ABFA-F04A-9D24-F451249B15E2}"/>
     <dgm:cxn modelId="{02F24A97-1B4D-024B-B691-8054A6A142DB}" type="presOf" srcId="{1891B614-18F0-5D4D-8017-CA53CD07DE5B}" destId="{8AF16239-F40F-2640-9E5A-2C1E8AD25A0C}" srcOrd="0" destOrd="0" presId="urn:microsoft.com/office/officeart/2005/8/layout/funnel1"/>
     <dgm:cxn modelId="{D9BC3A99-8173-EF43-813C-F40F8F40FC49}" type="presOf" srcId="{9BDB6ED8-7D00-F244-BC42-7315F5329629}" destId="{60880A80-D707-AF41-98A8-212B131F62D0}" srcOrd="0" destOrd="0" presId="urn:microsoft.com/office/officeart/2005/8/layout/funnel1"/>
@@ -8985,7 +9067,7 @@
           <a:p>
             <a:fld id="{5E64D5E2-E313-0149-A090-E605E7F1C794}" type="datetimeFigureOut">
               <a:rPr lang="en-US" smtClean="0"/>
-              <a:t>6/2/2021</a:t>
+              <a:t>6/2/21</a:t>
             </a:fld>
             <a:endParaRPr lang="en-US"/>
           </a:p>
@@ -9162,7 +9244,7 @@
           <a:p>
             <a:fld id="{5E64D5E2-E313-0149-A090-E605E7F1C794}" type="datetimeFigureOut">
               <a:rPr lang="en-US" smtClean="0"/>
-              <a:t>6/2/2021</a:t>
+              <a:t>6/2/21</a:t>
             </a:fld>
             <a:endParaRPr lang="en-US"/>
           </a:p>
@@ -9342,7 +9424,7 @@
           <a:p>
             <a:fld id="{5E64D5E2-E313-0149-A090-E605E7F1C794}" type="datetimeFigureOut">
               <a:rPr lang="en-US" smtClean="0"/>
-              <a:t>6/2/2021</a:t>
+              <a:t>6/2/21</a:t>
             </a:fld>
             <a:endParaRPr lang="en-US"/>
           </a:p>
@@ -9512,7 +9594,7 @@
           <a:p>
             <a:fld id="{5E64D5E2-E313-0149-A090-E605E7F1C794}" type="datetimeFigureOut">
               <a:rPr lang="en-US" smtClean="0"/>
-              <a:t>6/2/2021</a:t>
+              <a:t>6/2/21</a:t>
             </a:fld>
             <a:endParaRPr lang="en-US"/>
           </a:p>
@@ -9833,7 +9915,7 @@
           <a:p>
             <a:fld id="{5E64D5E2-E313-0149-A090-E605E7F1C794}" type="datetimeFigureOut">
               <a:rPr lang="en-US" smtClean="0"/>
-              <a:t>6/2/2021</a:t>
+              <a:t>6/2/21</a:t>
             </a:fld>
             <a:endParaRPr lang="en-US"/>
           </a:p>
@@ -10293,7 +10375,7 @@
           <a:p>
             <a:fld id="{5E64D5E2-E313-0149-A090-E605E7F1C794}" type="datetimeFigureOut">
               <a:rPr lang="en-US" smtClean="0"/>
-              <a:t>6/2/2021</a:t>
+              <a:t>6/2/21</a:t>
             </a:fld>
             <a:endParaRPr lang="en-US"/>
           </a:p>
@@ -10704,7 +10786,7 @@
           <a:p>
             <a:fld id="{5E64D5E2-E313-0149-A090-E605E7F1C794}" type="datetimeFigureOut">
               <a:rPr lang="en-US" smtClean="0"/>
-              <a:t>6/2/2021</a:t>
+              <a:t>6/2/21</a:t>
             </a:fld>
             <a:endParaRPr lang="en-US"/>
           </a:p>
@@ -10822,7 +10904,7 @@
           <a:p>
             <a:fld id="{5E64D5E2-E313-0149-A090-E605E7F1C794}" type="datetimeFigureOut">
               <a:rPr lang="en-US" smtClean="0"/>
-              <a:t>6/2/2021</a:t>
+              <a:t>6/2/21</a:t>
             </a:fld>
             <a:endParaRPr lang="en-US"/>
           </a:p>
@@ -10939,7 +11021,7 @@
           <a:p>
             <a:fld id="{5E64D5E2-E313-0149-A090-E605E7F1C794}" type="datetimeFigureOut">
               <a:rPr lang="en-US" smtClean="0"/>
-              <a:t>6/2/2021</a:t>
+              <a:t>6/2/21</a:t>
             </a:fld>
             <a:endParaRPr lang="en-US"/>
           </a:p>
@@ -11297,7 +11379,7 @@
           <a:p>
             <a:fld id="{5E64D5E2-E313-0149-A090-E605E7F1C794}" type="datetimeFigureOut">
               <a:rPr lang="en-US" smtClean="0"/>
-              <a:t>6/2/2021</a:t>
+              <a:t>6/2/21</a:t>
             </a:fld>
             <a:endParaRPr lang="en-US"/>
           </a:p>
@@ -11804,7 +11886,7 @@
           <a:p>
             <a:fld id="{5E64D5E2-E313-0149-A090-E605E7F1C794}" type="datetimeFigureOut">
               <a:rPr lang="en-US" smtClean="0"/>
-              <a:t>6/2/2021</a:t>
+              <a:t>6/2/21</a:t>
             </a:fld>
             <a:endParaRPr lang="en-US"/>
           </a:p>
@@ -12159,7 +12241,7 @@
           <a:p>
             <a:fld id="{5E64D5E2-E313-0149-A090-E605E7F1C794}" type="datetimeFigureOut">
               <a:rPr lang="en-US" smtClean="0"/>
-              <a:t>6/2/2021</a:t>
+              <a:t>6/2/21</a:t>
             </a:fld>
             <a:endParaRPr lang="en-US"/>
           </a:p>
@@ -15116,13 +15198,11 @@
             <a:avLst/>
           </a:prstGeom>
           <a:solidFill>
-            <a:schemeClr val="bg1">
-              <a:lumMod val="95000"/>
-            </a:schemeClr>
+            <a:srgbClr val="92D050"/>
           </a:solidFill>
           <a:ln>
             <a:solidFill>
-              <a:schemeClr val="bg1"/>
+              <a:srgbClr val="92D050"/>
             </a:solidFill>
           </a:ln>
         </p:spPr>
@@ -15638,13 +15718,11 @@
             <a:avLst/>
           </a:prstGeom>
           <a:solidFill>
-            <a:schemeClr val="bg1">
-              <a:lumMod val="95000"/>
-            </a:schemeClr>
+            <a:srgbClr val="92D050"/>
           </a:solidFill>
           <a:ln>
             <a:solidFill>
-              <a:schemeClr val="bg1"/>
+              <a:srgbClr val="92D050"/>
             </a:solidFill>
           </a:ln>
         </p:spPr>
@@ -17219,7 +17297,7 @@
           <a:p>
             <a:r>
               <a:rPr lang="en-US" sz="1200" dirty="0"/>
-              <a:t>Max(70*Multiplier,100) = 84</a:t>
+              <a:t>Min(70*Multiplier,100) = 84</a:t>
             </a:r>
           </a:p>
           <a:p>

</xml_diff>

<commit_message>
material for 1st touch point with product
</commit_message>
<xml_diff>
--- a/API Analysis/Review deck/Initial Scoping.pptx
+++ b/API Analysis/Review deck/Initial Scoping.pptx
@@ -9,16 +9,17 @@
     <p:sldId id="261" r:id="rId3"/>
     <p:sldId id="260" r:id="rId4"/>
     <p:sldId id="262" r:id="rId5"/>
-    <p:sldId id="268" r:id="rId6"/>
-    <p:sldId id="269" r:id="rId7"/>
-    <p:sldId id="270" r:id="rId8"/>
-    <p:sldId id="272" r:id="rId9"/>
-    <p:sldId id="273" r:id="rId10"/>
-    <p:sldId id="263" r:id="rId11"/>
-    <p:sldId id="266" r:id="rId12"/>
-    <p:sldId id="265" r:id="rId13"/>
-    <p:sldId id="264" r:id="rId14"/>
-    <p:sldId id="271" r:id="rId15"/>
+    <p:sldId id="274" r:id="rId6"/>
+    <p:sldId id="268" r:id="rId7"/>
+    <p:sldId id="269" r:id="rId8"/>
+    <p:sldId id="270" r:id="rId9"/>
+    <p:sldId id="272" r:id="rId10"/>
+    <p:sldId id="275" r:id="rId11"/>
+    <p:sldId id="263" r:id="rId12"/>
+    <p:sldId id="266" r:id="rId13"/>
+    <p:sldId id="265" r:id="rId14"/>
+    <p:sldId id="264" r:id="rId15"/>
+    <p:sldId id="271" r:id="rId16"/>
   </p:sldIdLst>
   <p:sldSz cx="12192000" cy="6858000"/>
   <p:notesSz cx="6858000" cy="9144000"/>
@@ -147,7 +148,7 @@
 <file path=ppt/revisionInfo.xml><?xml version="1.0" encoding="utf-8"?>
 <p1510:revInfo xmlns:a="http://schemas.openxmlformats.org/drawingml/2006/main" xmlns:r="http://schemas.openxmlformats.org/officeDocument/2006/relationships" xmlns:p1510="http://schemas.microsoft.com/office/powerpoint/2015/10/main">
   <p1510:revLst>
-    <p1510:client id="{3D7A6A80-EE33-4841-B2CA-F0A08A8E7586}" v="107" dt="2021-06-09T03:09:34.876"/>
+    <p1510:client id="{3D7A6A80-EE33-4841-B2CA-F0A08A8E7586}" v="590" dt="2021-06-09T13:00:32.144"/>
   </p1510:revLst>
 </p1510:revInfo>
 </file>
@@ -157,12 +158,12 @@
   <pc:docChgLst>
     <pc:chgData name="udai parvathaneni" userId="d83d812613df3043" providerId="LiveId" clId="{3D7A6A80-EE33-4841-B2CA-F0A08A8E7586}"/>
     <pc:docChg chg="undo redo custSel addSld delSld modSld">
-      <pc:chgData name="udai parvathaneni" userId="d83d812613df3043" providerId="LiveId" clId="{3D7A6A80-EE33-4841-B2CA-F0A08A8E7586}" dt="2021-06-09T03:11:11.318" v="908" actId="20577"/>
+      <pc:chgData name="udai parvathaneni" userId="d83d812613df3043" providerId="LiveId" clId="{3D7A6A80-EE33-4841-B2CA-F0A08A8E7586}" dt="2021-06-09T13:17:03.694" v="2536" actId="207"/>
       <pc:docMkLst>
         <pc:docMk/>
       </pc:docMkLst>
       <pc:sldChg chg="delSp modSp mod addCm modCm">
-        <pc:chgData name="udai parvathaneni" userId="d83d812613df3043" providerId="LiveId" clId="{3D7A6A80-EE33-4841-B2CA-F0A08A8E7586}" dt="2021-06-09T01:53:32.969" v="15" actId="207"/>
+        <pc:chgData name="udai parvathaneni" userId="d83d812613df3043" providerId="LiveId" clId="{3D7A6A80-EE33-4841-B2CA-F0A08A8E7586}" dt="2021-06-09T12:06:17.560" v="1201" actId="207"/>
         <pc:sldMkLst>
           <pc:docMk/>
           <pc:sldMk cId="2719201867" sldId="262"/>
@@ -189,6 +190,14 @@
             <pc:docMk/>
             <pc:sldMk cId="2719201867" sldId="262"/>
             <ac:spMk id="8" creationId="{0AA3B827-4AA8-0446-9977-5788D29DD355}"/>
+          </ac:spMkLst>
+        </pc:spChg>
+        <pc:spChg chg="mod">
+          <ac:chgData name="udai parvathaneni" userId="d83d812613df3043" providerId="LiveId" clId="{3D7A6A80-EE33-4841-B2CA-F0A08A8E7586}" dt="2021-06-09T12:06:17.560" v="1201" actId="207"/>
+          <ac:spMkLst>
+            <pc:docMk/>
+            <pc:sldMk cId="2719201867" sldId="262"/>
+            <ac:spMk id="9" creationId="{9A3D00E8-26DC-9549-AAAF-B5D236E14F37}"/>
           </ac:spMkLst>
         </pc:spChg>
         <pc:spChg chg="mod">
@@ -598,7 +607,7 @@
         </pc:cxnChg>
       </pc:sldChg>
       <pc:sldChg chg="addSp delSp modSp add mod">
-        <pc:chgData name="udai parvathaneni" userId="d83d812613df3043" providerId="LiveId" clId="{3D7A6A80-EE33-4841-B2CA-F0A08A8E7586}" dt="2021-06-09T02:59:01.433" v="801" actId="1076"/>
+        <pc:chgData name="udai parvathaneni" userId="d83d812613df3043" providerId="LiveId" clId="{3D7A6A80-EE33-4841-B2CA-F0A08A8E7586}" dt="2021-06-09T12:20:10.607" v="1367"/>
         <pc:sldMkLst>
           <pc:docMk/>
           <pc:sldMk cId="1995815305" sldId="268"/>
@@ -617,6 +626,14 @@
             <pc:docMk/>
             <pc:sldMk cId="1995815305" sldId="268"/>
             <ac:spMk id="3" creationId="{8ED2A13F-762D-F745-AACC-B59391304745}"/>
+          </ac:spMkLst>
+        </pc:spChg>
+        <pc:spChg chg="add mod">
+          <ac:chgData name="udai parvathaneni" userId="d83d812613df3043" providerId="LiveId" clId="{3D7A6A80-EE33-4841-B2CA-F0A08A8E7586}" dt="2021-06-09T12:20:10.607" v="1367"/>
+          <ac:spMkLst>
+            <pc:docMk/>
+            <pc:sldMk cId="1995815305" sldId="268"/>
+            <ac:spMk id="6" creationId="{1792A1D2-00DB-CE49-8AAA-0689E56F5FE1}"/>
           </ac:spMkLst>
         </pc:spChg>
         <pc:spChg chg="mod">
@@ -661,7 +678,7 @@
         </pc:cxnChg>
       </pc:sldChg>
       <pc:sldChg chg="addSp delSp modSp add mod modTransition">
-        <pc:chgData name="udai parvathaneni" userId="d83d812613df3043" providerId="LiveId" clId="{3D7A6A80-EE33-4841-B2CA-F0A08A8E7586}" dt="2021-06-09T03:00:32.846" v="804" actId="1076"/>
+        <pc:chgData name="udai parvathaneni" userId="d83d812613df3043" providerId="LiveId" clId="{3D7A6A80-EE33-4841-B2CA-F0A08A8E7586}" dt="2021-06-09T12:20:00.739" v="1366" actId="404"/>
         <pc:sldMkLst>
           <pc:docMk/>
           <pc:sldMk cId="3237524907" sldId="269"/>
@@ -674,6 +691,14 @@
             <ac:spMk id="2" creationId="{DAF33D13-582B-C542-BC37-EC39D42EC1D2}"/>
           </ac:spMkLst>
         </pc:spChg>
+        <pc:spChg chg="add mod">
+          <ac:chgData name="udai parvathaneni" userId="d83d812613df3043" providerId="LiveId" clId="{3D7A6A80-EE33-4841-B2CA-F0A08A8E7586}" dt="2021-06-09T12:20:00.739" v="1366" actId="404"/>
+          <ac:spMkLst>
+            <pc:docMk/>
+            <pc:sldMk cId="3237524907" sldId="269"/>
+            <ac:spMk id="3" creationId="{69EEE674-809E-1B40-80DE-0FE6720248DD}"/>
+          </ac:spMkLst>
+        </pc:spChg>
         <pc:spChg chg="add del mod">
           <ac:chgData name="udai parvathaneni" userId="d83d812613df3043" providerId="LiveId" clId="{3D7A6A80-EE33-4841-B2CA-F0A08A8E7586}" dt="2021-06-09T02:56:00.215" v="717" actId="478"/>
           <ac:spMkLst>
@@ -683,7 +708,7 @@
           </ac:spMkLst>
         </pc:spChg>
         <pc:spChg chg="mod">
-          <ac:chgData name="udai parvathaneni" userId="d83d812613df3043" providerId="LiveId" clId="{3D7A6A80-EE33-4841-B2CA-F0A08A8E7586}" dt="2021-06-09T02:12:51.863" v="227" actId="1076"/>
+          <ac:chgData name="udai parvathaneni" userId="d83d812613df3043" providerId="LiveId" clId="{3D7A6A80-EE33-4841-B2CA-F0A08A8E7586}" dt="2021-06-09T12:19:46.489" v="1364" actId="1035"/>
           <ac:spMkLst>
             <pc:docMk/>
             <pc:sldMk cId="3237524907" sldId="269"/>
@@ -699,7 +724,7 @@
           </ac:spMkLst>
         </pc:spChg>
         <pc:graphicFrameChg chg="add mod">
-          <ac:chgData name="udai parvathaneni" userId="d83d812613df3043" providerId="LiveId" clId="{3D7A6A80-EE33-4841-B2CA-F0A08A8E7586}" dt="2021-06-09T03:00:28.063" v="803" actId="1076"/>
+          <ac:chgData name="udai parvathaneni" userId="d83d812613df3043" providerId="LiveId" clId="{3D7A6A80-EE33-4841-B2CA-F0A08A8E7586}" dt="2021-06-09T12:19:38.125" v="1342" actId="1035"/>
           <ac:graphicFrameMkLst>
             <pc:docMk/>
             <pc:sldMk cId="3237524907" sldId="269"/>
@@ -731,7 +756,7 @@
         </pc:sldMkLst>
       </pc:sldChg>
       <pc:sldChg chg="addSp delSp modSp add mod">
-        <pc:chgData name="udai parvathaneni" userId="d83d812613df3043" providerId="LiveId" clId="{3D7A6A80-EE33-4841-B2CA-F0A08A8E7586}" dt="2021-06-09T02:47:09.063" v="397" actId="1076"/>
+        <pc:chgData name="udai parvathaneni" userId="d83d812613df3043" providerId="LiveId" clId="{3D7A6A80-EE33-4841-B2CA-F0A08A8E7586}" dt="2021-06-09T12:19:17.378" v="1323" actId="20577"/>
         <pc:sldMkLst>
           <pc:docMk/>
           <pc:sldMk cId="1337610362" sldId="270"/>
@@ -750,6 +775,14 @@
             <pc:docMk/>
             <pc:sldMk cId="1337610362" sldId="270"/>
             <ac:spMk id="3" creationId="{5F77FF26-3023-5545-AACB-087055322BD7}"/>
+          </ac:spMkLst>
+        </pc:spChg>
+        <pc:spChg chg="add mod">
+          <ac:chgData name="udai parvathaneni" userId="d83d812613df3043" providerId="LiveId" clId="{3D7A6A80-EE33-4841-B2CA-F0A08A8E7586}" dt="2021-06-09T12:19:17.378" v="1323" actId="20577"/>
+          <ac:spMkLst>
+            <pc:docMk/>
+            <pc:sldMk cId="1337610362" sldId="270"/>
+            <ac:spMk id="8" creationId="{16715012-A317-5344-BA12-FE013365780F}"/>
           </ac:spMkLst>
         </pc:spChg>
         <pc:spChg chg="del">
@@ -777,7 +810,7 @@
           </ac:spMkLst>
         </pc:spChg>
         <pc:graphicFrameChg chg="mod">
-          <ac:chgData name="udai parvathaneni" userId="d83d812613df3043" providerId="LiveId" clId="{3D7A6A80-EE33-4841-B2CA-F0A08A8E7586}" dt="2021-06-09T02:47:04.516" v="396" actId="1076"/>
+          <ac:chgData name="udai parvathaneni" userId="d83d812613df3043" providerId="LiveId" clId="{3D7A6A80-EE33-4841-B2CA-F0A08A8E7586}" dt="2021-06-09T12:18:34.003" v="1273" actId="1076"/>
           <ac:graphicFrameMkLst>
             <pc:docMk/>
             <pc:sldMk cId="1337610362" sldId="270"/>
@@ -810,7 +843,7 @@
         </pc:cxnChg>
       </pc:sldChg>
       <pc:sldChg chg="addSp delSp modSp new mod">
-        <pc:chgData name="udai parvathaneni" userId="d83d812613df3043" providerId="LiveId" clId="{3D7A6A80-EE33-4841-B2CA-F0A08A8E7586}" dt="2021-06-09T02:50:22.734" v="417" actId="14100"/>
+        <pc:chgData name="udai parvathaneni" userId="d83d812613df3043" providerId="LiveId" clId="{3D7A6A80-EE33-4841-B2CA-F0A08A8E7586}" dt="2021-06-09T12:18:27.104" v="1272" actId="1076"/>
         <pc:sldMkLst>
           <pc:docMk/>
           <pc:sldMk cId="2371888720" sldId="271"/>
@@ -821,6 +854,14 @@
             <pc:docMk/>
             <pc:sldMk cId="2371888720" sldId="271"/>
             <ac:spMk id="2" creationId="{85EA317B-B19E-3043-A922-2FFDB47B7F6C}"/>
+          </ac:spMkLst>
+        </pc:spChg>
+        <pc:spChg chg="add mod">
+          <ac:chgData name="udai parvathaneni" userId="d83d812613df3043" providerId="LiveId" clId="{3D7A6A80-EE33-4841-B2CA-F0A08A8E7586}" dt="2021-06-09T12:18:27.104" v="1272" actId="1076"/>
+          <ac:spMkLst>
+            <pc:docMk/>
+            <pc:sldMk cId="2371888720" sldId="271"/>
+            <ac:spMk id="2" creationId="{B047CCC4-43B1-F748-B699-9166FFAD1068}"/>
           </ac:spMkLst>
         </pc:spChg>
         <pc:spChg chg="del">
@@ -841,7 +882,7 @@
         </pc:graphicFrameChg>
       </pc:sldChg>
       <pc:sldChg chg="addSp delSp modSp new mod">
-        <pc:chgData name="udai parvathaneni" userId="d83d812613df3043" providerId="LiveId" clId="{3D7A6A80-EE33-4841-B2CA-F0A08A8E7586}" dt="2021-06-09T03:05:45.048" v="812" actId="1076"/>
+        <pc:chgData name="udai parvathaneni" userId="d83d812613df3043" providerId="LiveId" clId="{3D7A6A80-EE33-4841-B2CA-F0A08A8E7586}" dt="2021-06-09T13:02:39.390" v="2119" actId="11529"/>
         <pc:sldMkLst>
           <pc:docMk/>
           <pc:sldMk cId="606856741" sldId="272"/>
@@ -862,6 +903,14 @@
             <ac:spMk id="3" creationId="{500E63C2-70DB-424E-A738-EE9BA5BA5CF0}"/>
           </ac:spMkLst>
         </pc:spChg>
+        <pc:spChg chg="add mod">
+          <ac:chgData name="udai parvathaneni" userId="d83d812613df3043" providerId="LiveId" clId="{3D7A6A80-EE33-4841-B2CA-F0A08A8E7586}" dt="2021-06-09T13:02:29.170" v="2118" actId="1076"/>
+          <ac:spMkLst>
+            <pc:docMk/>
+            <pc:sldMk cId="606856741" sldId="272"/>
+            <ac:spMk id="4" creationId="{5D6956C3-CCE8-3340-A18E-EC35275FE5B3}"/>
+          </ac:spMkLst>
+        </pc:spChg>
         <pc:spChg chg="add del mod">
           <ac:chgData name="udai parvathaneni" userId="d83d812613df3043" providerId="LiveId" clId="{3D7A6A80-EE33-4841-B2CA-F0A08A8E7586}" dt="2021-06-09T03:05:11.718" v="806"/>
           <ac:spMkLst>
@@ -870,17 +919,33 @@
             <ac:spMk id="4" creationId="{803FA1D6-A215-884B-843F-F39EF0ECFD2C}"/>
           </ac:spMkLst>
         </pc:spChg>
-        <pc:picChg chg="add mod">
-          <ac:chgData name="udai parvathaneni" userId="d83d812613df3043" providerId="LiveId" clId="{3D7A6A80-EE33-4841-B2CA-F0A08A8E7586}" dt="2021-06-09T03:05:45.048" v="812" actId="1076"/>
+        <pc:spChg chg="add mod">
+          <ac:chgData name="udai parvathaneni" userId="d83d812613df3043" providerId="LiveId" clId="{3D7A6A80-EE33-4841-B2CA-F0A08A8E7586}" dt="2021-06-09T13:00:01.780" v="1837" actId="1076"/>
+          <ac:spMkLst>
+            <pc:docMk/>
+            <pc:sldMk cId="606856741" sldId="272"/>
+            <ac:spMk id="5" creationId="{622F4DFB-93C8-2047-BFAE-E46FC2A8D251}"/>
+          </ac:spMkLst>
+        </pc:spChg>
+        <pc:picChg chg="add del mod">
+          <ac:chgData name="udai parvathaneni" userId="d83d812613df3043" providerId="LiveId" clId="{3D7A6A80-EE33-4841-B2CA-F0A08A8E7586}" dt="2021-06-09T12:59:06.629" v="1806" actId="478"/>
           <ac:picMkLst>
             <pc:docMk/>
             <pc:sldMk cId="606856741" sldId="272"/>
             <ac:picMk id="6" creationId="{CB76EA4C-FB86-DC4D-89BC-C3C4BCE5932B}"/>
           </ac:picMkLst>
         </pc:picChg>
+        <pc:cxnChg chg="add">
+          <ac:chgData name="udai parvathaneni" userId="d83d812613df3043" providerId="LiveId" clId="{3D7A6A80-EE33-4841-B2CA-F0A08A8E7586}" dt="2021-06-09T13:02:39.390" v="2119" actId="11529"/>
+          <ac:cxnSpMkLst>
+            <pc:docMk/>
+            <pc:sldMk cId="606856741" sldId="272"/>
+            <ac:cxnSpMk id="8" creationId="{58E87CC0-95A0-E74D-8F0D-C9B125A93D89}"/>
+          </ac:cxnSpMkLst>
+        </pc:cxnChg>
       </pc:sldChg>
-      <pc:sldChg chg="addSp delSp modSp new mod setBg">
-        <pc:chgData name="udai parvathaneni" userId="d83d812613df3043" providerId="LiveId" clId="{3D7A6A80-EE33-4841-B2CA-F0A08A8E7586}" dt="2021-06-09T03:09:51.233" v="842" actId="20577"/>
+      <pc:sldChg chg="addSp delSp modSp new del mod setBg">
+        <pc:chgData name="udai parvathaneni" userId="d83d812613df3043" providerId="LiveId" clId="{3D7A6A80-EE33-4841-B2CA-F0A08A8E7586}" dt="2021-06-09T13:14:40.901" v="2505" actId="2696"/>
         <pc:sldMkLst>
           <pc:docMk/>
           <pc:sldMk cId="2873643166" sldId="273"/>
@@ -989,14 +1054,171 @@
             <ac:grpSpMk id="16" creationId="{54CA915D-BDF0-41F8-B00E-FB186EFF7BD6}"/>
           </ac:grpSpMkLst>
         </pc:grpChg>
+        <pc:graphicFrameChg chg="add del modGraphic">
+          <ac:chgData name="udai parvathaneni" userId="d83d812613df3043" providerId="LiveId" clId="{3D7A6A80-EE33-4841-B2CA-F0A08A8E7586}" dt="2021-06-09T13:03:33.209" v="2121" actId="1032"/>
+          <ac:graphicFrameMkLst>
+            <pc:docMk/>
+            <pc:sldMk cId="2873643166" sldId="273"/>
+            <ac:graphicFrameMk id="3" creationId="{BC0FC1FB-ED3E-8E40-AA7E-04F949BF5C92}"/>
+          </ac:graphicFrameMkLst>
+        </pc:graphicFrameChg>
         <pc:picChg chg="add del mod">
-          <ac:chgData name="udai parvathaneni" userId="d83d812613df3043" providerId="LiveId" clId="{3D7A6A80-EE33-4841-B2CA-F0A08A8E7586}" dt="2021-06-09T03:09:42.953" v="828" actId="14100"/>
+          <ac:chgData name="udai parvathaneni" userId="d83d812613df3043" providerId="LiveId" clId="{3D7A6A80-EE33-4841-B2CA-F0A08A8E7586}" dt="2021-06-09T13:03:59.146" v="2122" actId="1076"/>
           <ac:picMkLst>
             <pc:docMk/>
             <pc:sldMk cId="2873643166" sldId="273"/>
             <ac:picMk id="5" creationId="{A5912380-4EE0-5D4A-BA50-BE28F82A71AC}"/>
           </ac:picMkLst>
         </pc:picChg>
+      </pc:sldChg>
+      <pc:sldChg chg="addSp modSp add mod">
+        <pc:chgData name="udai parvathaneni" userId="d83d812613df3043" providerId="LiveId" clId="{3D7A6A80-EE33-4841-B2CA-F0A08A8E7586}" dt="2021-06-09T12:50:51.467" v="1447" actId="1076"/>
+        <pc:sldMkLst>
+          <pc:docMk/>
+          <pc:sldMk cId="2157446705" sldId="274"/>
+        </pc:sldMkLst>
+        <pc:spChg chg="add mod">
+          <ac:chgData name="udai parvathaneni" userId="d83d812613df3043" providerId="LiveId" clId="{3D7A6A80-EE33-4841-B2CA-F0A08A8E7586}" dt="2021-06-09T12:50:51.467" v="1447" actId="1076"/>
+          <ac:spMkLst>
+            <pc:docMk/>
+            <pc:sldMk cId="2157446705" sldId="274"/>
+            <ac:spMk id="3" creationId="{A376978B-EB7B-0A41-8AB3-BAD989100F98}"/>
+          </ac:spMkLst>
+        </pc:spChg>
+        <pc:spChg chg="mod">
+          <ac:chgData name="udai parvathaneni" userId="d83d812613df3043" providerId="LiveId" clId="{3D7A6A80-EE33-4841-B2CA-F0A08A8E7586}" dt="2021-06-09T12:49:44.268" v="1428" actId="20577"/>
+          <ac:spMkLst>
+            <pc:docMk/>
+            <pc:sldMk cId="2157446705" sldId="274"/>
+            <ac:spMk id="26" creationId="{1CCC3185-39D9-5D45-A58F-08B2B0F65230}"/>
+          </ac:spMkLst>
+        </pc:spChg>
+        <pc:graphicFrameChg chg="mod">
+          <ac:chgData name="udai parvathaneni" userId="d83d812613df3043" providerId="LiveId" clId="{3D7A6A80-EE33-4841-B2CA-F0A08A8E7586}" dt="2021-06-09T12:25:22.942" v="1369" actId="20577"/>
+          <ac:graphicFrameMkLst>
+            <pc:docMk/>
+            <pc:sldMk cId="2157446705" sldId="274"/>
+            <ac:graphicFrameMk id="4" creationId="{C1A6A093-FB0B-6D4B-91E8-F958C3916E67}"/>
+          </ac:graphicFrameMkLst>
+        </pc:graphicFrameChg>
+      </pc:sldChg>
+      <pc:sldChg chg="addSp delSp modSp new del mod">
+        <pc:chgData name="udai parvathaneni" userId="d83d812613df3043" providerId="LiveId" clId="{3D7A6A80-EE33-4841-B2CA-F0A08A8E7586}" dt="2021-06-09T12:10:50.635" v="1207" actId="2696"/>
+        <pc:sldMkLst>
+          <pc:docMk/>
+          <pc:sldMk cId="2715204123" sldId="274"/>
+        </pc:sldMkLst>
+        <pc:spChg chg="add del mod">
+          <ac:chgData name="udai parvathaneni" userId="d83d812613df3043" providerId="LiveId" clId="{3D7A6A80-EE33-4841-B2CA-F0A08A8E7586}" dt="2021-06-09T12:05:32.416" v="1190" actId="20577"/>
+          <ac:spMkLst>
+            <pc:docMk/>
+            <pc:sldMk cId="2715204123" sldId="274"/>
+            <ac:spMk id="2" creationId="{B9FB7443-9A30-6D43-851C-C9A84919C164}"/>
+          </ac:spMkLst>
+        </pc:spChg>
+        <pc:spChg chg="del mod">
+          <ac:chgData name="udai parvathaneni" userId="d83d812613df3043" providerId="LiveId" clId="{3D7A6A80-EE33-4841-B2CA-F0A08A8E7586}" dt="2021-06-09T11:58:04.925" v="920" actId="1032"/>
+          <ac:spMkLst>
+            <pc:docMk/>
+            <pc:sldMk cId="2715204123" sldId="274"/>
+            <ac:spMk id="3" creationId="{3E15C368-9BC1-5A46-8716-A6A2BC7CB092}"/>
+          </ac:spMkLst>
+        </pc:spChg>
+        <pc:spChg chg="add del mod">
+          <ac:chgData name="udai parvathaneni" userId="d83d812613df3043" providerId="LiveId" clId="{3D7A6A80-EE33-4841-B2CA-F0A08A8E7586}" dt="2021-06-09T12:00:18.114" v="999" actId="478"/>
+          <ac:spMkLst>
+            <pc:docMk/>
+            <pc:sldMk cId="2715204123" sldId="274"/>
+            <ac:spMk id="5" creationId="{FF543712-0531-954D-B7DB-1D0074A2D954}"/>
+          </ac:spMkLst>
+        </pc:spChg>
+        <pc:spChg chg="add del mod">
+          <ac:chgData name="udai parvathaneni" userId="d83d812613df3043" providerId="LiveId" clId="{3D7A6A80-EE33-4841-B2CA-F0A08A8E7586}" dt="2021-06-09T12:05:42.008" v="1191" actId="478"/>
+          <ac:spMkLst>
+            <pc:docMk/>
+            <pc:sldMk cId="2715204123" sldId="274"/>
+            <ac:spMk id="6" creationId="{30CAF55E-86F0-D54B-BED0-990E8DC8C2EC}"/>
+          </ac:spMkLst>
+        </pc:spChg>
+        <pc:spChg chg="add del">
+          <ac:chgData name="udai parvathaneni" userId="d83d812613df3043" providerId="LiveId" clId="{3D7A6A80-EE33-4841-B2CA-F0A08A8E7586}" dt="2021-06-09T12:01:44.529" v="1015" actId="11529"/>
+          <ac:spMkLst>
+            <pc:docMk/>
+            <pc:sldMk cId="2715204123" sldId="274"/>
+            <ac:spMk id="11" creationId="{FA5A27D4-0848-4F46-815F-B35F6C5CEC6A}"/>
+          </ac:spMkLst>
+        </pc:spChg>
+        <pc:spChg chg="add mod">
+          <ac:chgData name="udai parvathaneni" userId="d83d812613df3043" providerId="LiveId" clId="{3D7A6A80-EE33-4841-B2CA-F0A08A8E7586}" dt="2021-06-09T12:05:48.165" v="1199" actId="20577"/>
+          <ac:spMkLst>
+            <pc:docMk/>
+            <pc:sldMk cId="2715204123" sldId="274"/>
+            <ac:spMk id="26" creationId="{1CCC3185-39D9-5D45-A58F-08B2B0F65230}"/>
+          </ac:spMkLst>
+        </pc:spChg>
+        <pc:spChg chg="add mod">
+          <ac:chgData name="udai parvathaneni" userId="d83d812613df3043" providerId="LiveId" clId="{3D7A6A80-EE33-4841-B2CA-F0A08A8E7586}" dt="2021-06-09T12:06:47.434" v="1206" actId="20577"/>
+          <ac:spMkLst>
+            <pc:docMk/>
+            <pc:sldMk cId="2715204123" sldId="274"/>
+            <ac:spMk id="27" creationId="{CDCFEC27-0AD6-DA4D-86FA-8DD8576276E1}"/>
+          </ac:spMkLst>
+        </pc:spChg>
+        <pc:graphicFrameChg chg="add mod modGraphic">
+          <ac:chgData name="udai parvathaneni" userId="d83d812613df3043" providerId="LiveId" clId="{3D7A6A80-EE33-4841-B2CA-F0A08A8E7586}" dt="2021-06-09T12:04:43.306" v="1120" actId="20577"/>
+          <ac:graphicFrameMkLst>
+            <pc:docMk/>
+            <pc:sldMk cId="2715204123" sldId="274"/>
+            <ac:graphicFrameMk id="4" creationId="{C1A6A093-FB0B-6D4B-91E8-F958C3916E67}"/>
+          </ac:graphicFrameMkLst>
+        </pc:graphicFrameChg>
+        <pc:cxnChg chg="add del mod">
+          <ac:chgData name="udai parvathaneni" userId="d83d812613df3043" providerId="LiveId" clId="{3D7A6A80-EE33-4841-B2CA-F0A08A8E7586}" dt="2021-06-09T12:01:34.199" v="1013" actId="478"/>
+          <ac:cxnSpMkLst>
+            <pc:docMk/>
+            <pc:sldMk cId="2715204123" sldId="274"/>
+            <ac:cxnSpMk id="8" creationId="{C2C85E13-630A-674C-848B-3B35CF013B5E}"/>
+          </ac:cxnSpMkLst>
+        </pc:cxnChg>
+        <pc:cxnChg chg="add mod">
+          <ac:chgData name="udai parvathaneni" userId="d83d812613df3043" providerId="LiveId" clId="{3D7A6A80-EE33-4841-B2CA-F0A08A8E7586}" dt="2021-06-09T12:02:38.916" v="1034" actId="14100"/>
+          <ac:cxnSpMkLst>
+            <pc:docMk/>
+            <pc:sldMk cId="2715204123" sldId="274"/>
+            <ac:cxnSpMk id="13" creationId="{5DC8CBC9-CEB8-6646-86CC-BE9F168CA505}"/>
+          </ac:cxnSpMkLst>
+        </pc:cxnChg>
+        <pc:cxnChg chg="add mod">
+          <ac:chgData name="udai parvathaneni" userId="d83d812613df3043" providerId="LiveId" clId="{3D7A6A80-EE33-4841-B2CA-F0A08A8E7586}" dt="2021-06-09T12:03:15.686" v="1041" actId="14100"/>
+          <ac:cxnSpMkLst>
+            <pc:docMk/>
+            <pc:sldMk cId="2715204123" sldId="274"/>
+            <ac:cxnSpMk id="20" creationId="{B002A8E1-A0DF-F84D-9E53-4A8B951C3938}"/>
+          </ac:cxnSpMkLst>
+        </pc:cxnChg>
+      </pc:sldChg>
+      <pc:sldChg chg="modSp new mod">
+        <pc:chgData name="udai parvathaneni" userId="d83d812613df3043" providerId="LiveId" clId="{3D7A6A80-EE33-4841-B2CA-F0A08A8E7586}" dt="2021-06-09T13:17:03.694" v="2536" actId="207"/>
+        <pc:sldMkLst>
+          <pc:docMk/>
+          <pc:sldMk cId="1633816787" sldId="275"/>
+        </pc:sldMkLst>
+        <pc:spChg chg="mod">
+          <ac:chgData name="udai parvathaneni" userId="d83d812613df3043" providerId="LiveId" clId="{3D7A6A80-EE33-4841-B2CA-F0A08A8E7586}" dt="2021-06-09T13:08:43.655" v="2504" actId="20577"/>
+          <ac:spMkLst>
+            <pc:docMk/>
+            <pc:sldMk cId="1633816787" sldId="275"/>
+            <ac:spMk id="2" creationId="{9B6F6FAD-1CB3-5247-9D59-845A5D2F51B4}"/>
+          </ac:spMkLst>
+        </pc:spChg>
+        <pc:spChg chg="mod">
+          <ac:chgData name="udai parvathaneni" userId="d83d812613df3043" providerId="LiveId" clId="{3D7A6A80-EE33-4841-B2CA-F0A08A8E7586}" dt="2021-06-09T13:17:03.694" v="2536" actId="207"/>
+          <ac:spMkLst>
+            <pc:docMk/>
+            <pc:sldMk cId="1633816787" sldId="275"/>
+            <ac:spMk id="3" creationId="{AC0D552F-EF59-3E47-B773-C83D5ED6230D}"/>
+          </ac:spMkLst>
+        </pc:spChg>
       </pc:sldChg>
     </pc:docChg>
   </pc:docChgLst>
@@ -8273,6 +8495,753 @@
 </file>
 
 <file path=ppt/diagrams/colors3.xml><?xml version="1.0" encoding="utf-8"?>
+<dgm:colorsDef xmlns:dgm="http://schemas.openxmlformats.org/drawingml/2006/diagram" xmlns:a="http://schemas.openxmlformats.org/drawingml/2006/main" uniqueId="urn:microsoft.com/office/officeart/2005/8/colors/accent1_2">
+  <dgm:title val=""/>
+  <dgm:desc val=""/>
+  <dgm:catLst>
+    <dgm:cat type="accent1" pri="11200"/>
+  </dgm:catLst>
+  <dgm:styleLbl name="node0">
+    <dgm:fillClrLst meth="repeat">
+      <a:schemeClr val="accent1"/>
+    </dgm:fillClrLst>
+    <dgm:linClrLst meth="repeat">
+      <a:schemeClr val="lt1"/>
+    </dgm:linClrLst>
+    <dgm:effectClrLst/>
+    <dgm:txLinClrLst/>
+    <dgm:txFillClrLst/>
+    <dgm:txEffectClrLst/>
+  </dgm:styleLbl>
+  <dgm:styleLbl name="alignNode1">
+    <dgm:fillClrLst meth="repeat">
+      <a:schemeClr val="accent1"/>
+    </dgm:fillClrLst>
+    <dgm:linClrLst meth="repeat">
+      <a:schemeClr val="accent1"/>
+    </dgm:linClrLst>
+    <dgm:effectClrLst/>
+    <dgm:txLinClrLst/>
+    <dgm:txFillClrLst/>
+    <dgm:txEffectClrLst/>
+  </dgm:styleLbl>
+  <dgm:styleLbl name="node1">
+    <dgm:fillClrLst meth="repeat">
+      <a:schemeClr val="accent1"/>
+    </dgm:fillClrLst>
+    <dgm:linClrLst meth="repeat">
+      <a:schemeClr val="lt1"/>
+    </dgm:linClrLst>
+    <dgm:effectClrLst/>
+    <dgm:txLinClrLst/>
+    <dgm:txFillClrLst/>
+    <dgm:txEffectClrLst/>
+  </dgm:styleLbl>
+  <dgm:styleLbl name="lnNode1">
+    <dgm:fillClrLst meth="repeat">
+      <a:schemeClr val="accent1"/>
+    </dgm:fillClrLst>
+    <dgm:linClrLst meth="repeat">
+      <a:schemeClr val="lt1"/>
+    </dgm:linClrLst>
+    <dgm:effectClrLst/>
+    <dgm:txLinClrLst/>
+    <dgm:txFillClrLst/>
+    <dgm:txEffectClrLst/>
+  </dgm:styleLbl>
+  <dgm:styleLbl name="vennNode1">
+    <dgm:fillClrLst meth="repeat">
+      <a:schemeClr val="accent1">
+        <a:alpha val="50000"/>
+      </a:schemeClr>
+    </dgm:fillClrLst>
+    <dgm:linClrLst meth="repeat">
+      <a:schemeClr val="lt1"/>
+    </dgm:linClrLst>
+    <dgm:effectClrLst/>
+    <dgm:txLinClrLst/>
+    <dgm:txFillClrLst/>
+    <dgm:txEffectClrLst/>
+  </dgm:styleLbl>
+  <dgm:styleLbl name="node2">
+    <dgm:fillClrLst meth="repeat">
+      <a:schemeClr val="accent1"/>
+    </dgm:fillClrLst>
+    <dgm:linClrLst meth="repeat">
+      <a:schemeClr val="lt1"/>
+    </dgm:linClrLst>
+    <dgm:effectClrLst/>
+    <dgm:txLinClrLst/>
+    <dgm:txFillClrLst/>
+    <dgm:txEffectClrLst/>
+  </dgm:styleLbl>
+  <dgm:styleLbl name="node3">
+    <dgm:fillClrLst meth="repeat">
+      <a:schemeClr val="accent1"/>
+    </dgm:fillClrLst>
+    <dgm:linClrLst meth="repeat">
+      <a:schemeClr val="lt1"/>
+    </dgm:linClrLst>
+    <dgm:effectClrLst/>
+    <dgm:txLinClrLst/>
+    <dgm:txFillClrLst/>
+    <dgm:txEffectClrLst/>
+  </dgm:styleLbl>
+  <dgm:styleLbl name="node4">
+    <dgm:fillClrLst meth="repeat">
+      <a:schemeClr val="accent1"/>
+    </dgm:fillClrLst>
+    <dgm:linClrLst meth="repeat">
+      <a:schemeClr val="lt1"/>
+    </dgm:linClrLst>
+    <dgm:effectClrLst/>
+    <dgm:txLinClrLst/>
+    <dgm:txFillClrLst/>
+    <dgm:txEffectClrLst/>
+  </dgm:styleLbl>
+  <dgm:styleLbl name="fgImgPlace1">
+    <dgm:fillClrLst meth="repeat">
+      <a:schemeClr val="accent1">
+        <a:tint val="50000"/>
+      </a:schemeClr>
+    </dgm:fillClrLst>
+    <dgm:linClrLst meth="repeat">
+      <a:schemeClr val="lt1"/>
+    </dgm:linClrLst>
+    <dgm:effectClrLst/>
+    <dgm:txLinClrLst/>
+    <dgm:txFillClrLst meth="repeat">
+      <a:schemeClr val="lt1"/>
+    </dgm:txFillClrLst>
+    <dgm:txEffectClrLst/>
+  </dgm:styleLbl>
+  <dgm:styleLbl name="alignImgPlace1">
+    <dgm:fillClrLst meth="repeat">
+      <a:schemeClr val="accent1">
+        <a:tint val="50000"/>
+      </a:schemeClr>
+    </dgm:fillClrLst>
+    <dgm:linClrLst meth="repeat">
+      <a:schemeClr val="lt1"/>
+    </dgm:linClrLst>
+    <dgm:effectClrLst/>
+    <dgm:txLinClrLst/>
+    <dgm:txFillClrLst meth="repeat">
+      <a:schemeClr val="lt1"/>
+    </dgm:txFillClrLst>
+    <dgm:txEffectClrLst/>
+  </dgm:styleLbl>
+  <dgm:styleLbl name="bgImgPlace1">
+    <dgm:fillClrLst meth="repeat">
+      <a:schemeClr val="accent1">
+        <a:tint val="50000"/>
+      </a:schemeClr>
+    </dgm:fillClrLst>
+    <dgm:linClrLst meth="repeat">
+      <a:schemeClr val="lt1"/>
+    </dgm:linClrLst>
+    <dgm:effectClrLst/>
+    <dgm:txLinClrLst/>
+    <dgm:txFillClrLst meth="repeat">
+      <a:schemeClr val="lt1"/>
+    </dgm:txFillClrLst>
+    <dgm:txEffectClrLst/>
+  </dgm:styleLbl>
+  <dgm:styleLbl name="sibTrans2D1">
+    <dgm:fillClrLst meth="repeat">
+      <a:schemeClr val="accent1">
+        <a:tint val="60000"/>
+      </a:schemeClr>
+    </dgm:fillClrLst>
+    <dgm:linClrLst meth="repeat">
+      <a:schemeClr val="accent1">
+        <a:tint val="60000"/>
+      </a:schemeClr>
+    </dgm:linClrLst>
+    <dgm:effectClrLst/>
+    <dgm:txLinClrLst/>
+    <dgm:txFillClrLst/>
+    <dgm:txEffectClrLst/>
+  </dgm:styleLbl>
+  <dgm:styleLbl name="fgSibTrans2D1">
+    <dgm:fillClrLst meth="repeat">
+      <a:schemeClr val="accent1">
+        <a:tint val="60000"/>
+      </a:schemeClr>
+    </dgm:fillClrLst>
+    <dgm:linClrLst meth="repeat">
+      <a:schemeClr val="accent1">
+        <a:tint val="60000"/>
+      </a:schemeClr>
+    </dgm:linClrLst>
+    <dgm:effectClrLst/>
+    <dgm:txLinClrLst/>
+    <dgm:txFillClrLst/>
+    <dgm:txEffectClrLst/>
+  </dgm:styleLbl>
+  <dgm:styleLbl name="bgSibTrans2D1">
+    <dgm:fillClrLst meth="repeat">
+      <a:schemeClr val="accent1">
+        <a:tint val="60000"/>
+      </a:schemeClr>
+    </dgm:fillClrLst>
+    <dgm:linClrLst meth="repeat">
+      <a:schemeClr val="accent1">
+        <a:tint val="60000"/>
+      </a:schemeClr>
+    </dgm:linClrLst>
+    <dgm:effectClrLst/>
+    <dgm:txLinClrLst/>
+    <dgm:txFillClrLst/>
+    <dgm:txEffectClrLst/>
+  </dgm:styleLbl>
+  <dgm:styleLbl name="sibTrans1D1">
+    <dgm:fillClrLst meth="repeat">
+      <a:schemeClr val="accent1"/>
+    </dgm:fillClrLst>
+    <dgm:linClrLst meth="repeat">
+      <a:schemeClr val="accent1"/>
+    </dgm:linClrLst>
+    <dgm:effectClrLst/>
+    <dgm:txLinClrLst/>
+    <dgm:txFillClrLst meth="repeat">
+      <a:schemeClr val="tx1"/>
+    </dgm:txFillClrLst>
+    <dgm:txEffectClrLst/>
+  </dgm:styleLbl>
+  <dgm:styleLbl name="callout">
+    <dgm:fillClrLst meth="repeat">
+      <a:schemeClr val="accent1"/>
+    </dgm:fillClrLst>
+    <dgm:linClrLst meth="repeat">
+      <a:schemeClr val="accent1">
+        <a:tint val="50000"/>
+      </a:schemeClr>
+    </dgm:linClrLst>
+    <dgm:effectClrLst/>
+    <dgm:txLinClrLst/>
+    <dgm:txFillClrLst meth="repeat">
+      <a:schemeClr val="tx1"/>
+    </dgm:txFillClrLst>
+    <dgm:txEffectClrLst/>
+  </dgm:styleLbl>
+  <dgm:styleLbl name="asst0">
+    <dgm:fillClrLst meth="repeat">
+      <a:schemeClr val="accent1"/>
+    </dgm:fillClrLst>
+    <dgm:linClrLst meth="repeat">
+      <a:schemeClr val="lt1"/>
+    </dgm:linClrLst>
+    <dgm:effectClrLst/>
+    <dgm:txLinClrLst/>
+    <dgm:txFillClrLst/>
+    <dgm:txEffectClrLst/>
+  </dgm:styleLbl>
+  <dgm:styleLbl name="asst1">
+    <dgm:fillClrLst meth="repeat">
+      <a:schemeClr val="accent1"/>
+    </dgm:fillClrLst>
+    <dgm:linClrLst meth="repeat">
+      <a:schemeClr val="lt1"/>
+    </dgm:linClrLst>
+    <dgm:effectClrLst/>
+    <dgm:txLinClrLst/>
+    <dgm:txFillClrLst/>
+    <dgm:txEffectClrLst/>
+  </dgm:styleLbl>
+  <dgm:styleLbl name="asst2">
+    <dgm:fillClrLst meth="repeat">
+      <a:schemeClr val="accent1"/>
+    </dgm:fillClrLst>
+    <dgm:linClrLst meth="repeat">
+      <a:schemeClr val="lt1"/>
+    </dgm:linClrLst>
+    <dgm:effectClrLst/>
+    <dgm:txLinClrLst/>
+    <dgm:txFillClrLst/>
+    <dgm:txEffectClrLst/>
+  </dgm:styleLbl>
+  <dgm:styleLbl name="asst3">
+    <dgm:fillClrLst meth="repeat">
+      <a:schemeClr val="accent1"/>
+    </dgm:fillClrLst>
+    <dgm:linClrLst meth="repeat">
+      <a:schemeClr val="lt1"/>
+    </dgm:linClrLst>
+    <dgm:effectClrLst/>
+    <dgm:txLinClrLst/>
+    <dgm:txFillClrLst/>
+    <dgm:txEffectClrLst/>
+  </dgm:styleLbl>
+  <dgm:styleLbl name="asst4">
+    <dgm:fillClrLst meth="repeat">
+      <a:schemeClr val="accent1"/>
+    </dgm:fillClrLst>
+    <dgm:linClrLst meth="repeat">
+      <a:schemeClr val="lt1"/>
+    </dgm:linClrLst>
+    <dgm:effectClrLst/>
+    <dgm:txLinClrLst/>
+    <dgm:txFillClrLst/>
+    <dgm:txEffectClrLst/>
+  </dgm:styleLbl>
+  <dgm:styleLbl name="parChTrans2D1">
+    <dgm:fillClrLst meth="repeat">
+      <a:schemeClr val="accent1">
+        <a:tint val="60000"/>
+      </a:schemeClr>
+    </dgm:fillClrLst>
+    <dgm:linClrLst meth="repeat">
+      <a:schemeClr val="accent1">
+        <a:tint val="60000"/>
+      </a:schemeClr>
+    </dgm:linClrLst>
+    <dgm:effectClrLst/>
+    <dgm:txLinClrLst/>
+    <dgm:txFillClrLst meth="repeat">
+      <a:schemeClr val="lt1"/>
+    </dgm:txFillClrLst>
+    <dgm:txEffectClrLst/>
+  </dgm:styleLbl>
+  <dgm:styleLbl name="parChTrans2D2">
+    <dgm:fillClrLst meth="repeat">
+      <a:schemeClr val="accent1"/>
+    </dgm:fillClrLst>
+    <dgm:linClrLst meth="repeat">
+      <a:schemeClr val="accent1"/>
+    </dgm:linClrLst>
+    <dgm:effectClrLst/>
+    <dgm:txLinClrLst/>
+    <dgm:txFillClrLst meth="repeat">
+      <a:schemeClr val="lt1"/>
+    </dgm:txFillClrLst>
+    <dgm:txEffectClrLst/>
+  </dgm:styleLbl>
+  <dgm:styleLbl name="parChTrans2D3">
+    <dgm:fillClrLst meth="repeat">
+      <a:schemeClr val="accent1"/>
+    </dgm:fillClrLst>
+    <dgm:linClrLst meth="repeat">
+      <a:schemeClr val="accent1"/>
+    </dgm:linClrLst>
+    <dgm:effectClrLst/>
+    <dgm:txLinClrLst/>
+    <dgm:txFillClrLst meth="repeat">
+      <a:schemeClr val="lt1"/>
+    </dgm:txFillClrLst>
+    <dgm:txEffectClrLst/>
+  </dgm:styleLbl>
+  <dgm:styleLbl name="parChTrans2D4">
+    <dgm:fillClrLst meth="repeat">
+      <a:schemeClr val="accent1"/>
+    </dgm:fillClrLst>
+    <dgm:linClrLst meth="repeat">
+      <a:schemeClr val="accent1"/>
+    </dgm:linClrLst>
+    <dgm:effectClrLst/>
+    <dgm:txLinClrLst/>
+    <dgm:txFillClrLst meth="repeat">
+      <a:schemeClr val="lt1"/>
+    </dgm:txFillClrLst>
+    <dgm:txEffectClrLst/>
+  </dgm:styleLbl>
+  <dgm:styleLbl name="parChTrans1D1">
+    <dgm:fillClrLst meth="repeat">
+      <a:schemeClr val="accent1"/>
+    </dgm:fillClrLst>
+    <dgm:linClrLst meth="repeat">
+      <a:schemeClr val="accent1">
+        <a:shade val="60000"/>
+      </a:schemeClr>
+    </dgm:linClrLst>
+    <dgm:effectClrLst/>
+    <dgm:txLinClrLst/>
+    <dgm:txFillClrLst meth="repeat">
+      <a:schemeClr val="tx1"/>
+    </dgm:txFillClrLst>
+    <dgm:txEffectClrLst/>
+  </dgm:styleLbl>
+  <dgm:styleLbl name="parChTrans1D2">
+    <dgm:fillClrLst meth="repeat">
+      <a:schemeClr val="accent1"/>
+    </dgm:fillClrLst>
+    <dgm:linClrLst meth="repeat">
+      <a:schemeClr val="accent1">
+        <a:shade val="60000"/>
+      </a:schemeClr>
+    </dgm:linClrLst>
+    <dgm:effectClrLst/>
+    <dgm:txLinClrLst/>
+    <dgm:txFillClrLst meth="repeat">
+      <a:schemeClr val="tx1"/>
+    </dgm:txFillClrLst>
+    <dgm:txEffectClrLst/>
+  </dgm:styleLbl>
+  <dgm:styleLbl name="parChTrans1D3">
+    <dgm:fillClrLst meth="repeat">
+      <a:schemeClr val="accent1"/>
+    </dgm:fillClrLst>
+    <dgm:linClrLst meth="repeat">
+      <a:schemeClr val="accent1">
+        <a:shade val="80000"/>
+      </a:schemeClr>
+    </dgm:linClrLst>
+    <dgm:effectClrLst/>
+    <dgm:txLinClrLst/>
+    <dgm:txFillClrLst meth="repeat">
+      <a:schemeClr val="tx1"/>
+    </dgm:txFillClrLst>
+    <dgm:txEffectClrLst/>
+  </dgm:styleLbl>
+  <dgm:styleLbl name="parChTrans1D4">
+    <dgm:fillClrLst meth="repeat">
+      <a:schemeClr val="accent1"/>
+    </dgm:fillClrLst>
+    <dgm:linClrLst meth="repeat">
+      <a:schemeClr val="accent1">
+        <a:shade val="80000"/>
+      </a:schemeClr>
+    </dgm:linClrLst>
+    <dgm:effectClrLst/>
+    <dgm:txLinClrLst/>
+    <dgm:txFillClrLst meth="repeat">
+      <a:schemeClr val="tx1"/>
+    </dgm:txFillClrLst>
+    <dgm:txEffectClrLst/>
+  </dgm:styleLbl>
+  <dgm:styleLbl name="fgAcc1">
+    <dgm:fillClrLst meth="repeat">
+      <a:schemeClr val="lt1">
+        <a:alpha val="90000"/>
+      </a:schemeClr>
+    </dgm:fillClrLst>
+    <dgm:linClrLst meth="repeat">
+      <a:schemeClr val="accent1"/>
+    </dgm:linClrLst>
+    <dgm:effectClrLst/>
+    <dgm:txLinClrLst/>
+    <dgm:txFillClrLst meth="repeat">
+      <a:schemeClr val="dk1"/>
+    </dgm:txFillClrLst>
+    <dgm:txEffectClrLst/>
+  </dgm:styleLbl>
+  <dgm:styleLbl name="conFgAcc1">
+    <dgm:fillClrLst meth="repeat">
+      <a:schemeClr val="lt1">
+        <a:alpha val="90000"/>
+      </a:schemeClr>
+    </dgm:fillClrLst>
+    <dgm:linClrLst meth="repeat">
+      <a:schemeClr val="accent1"/>
+    </dgm:linClrLst>
+    <dgm:effectClrLst/>
+    <dgm:txLinClrLst/>
+    <dgm:txFillClrLst meth="repeat">
+      <a:schemeClr val="dk1"/>
+    </dgm:txFillClrLst>
+    <dgm:txEffectClrLst/>
+  </dgm:styleLbl>
+  <dgm:styleLbl name="alignAcc1">
+    <dgm:fillClrLst meth="repeat">
+      <a:schemeClr val="lt1">
+        <a:alpha val="90000"/>
+      </a:schemeClr>
+    </dgm:fillClrLst>
+    <dgm:linClrLst meth="repeat">
+      <a:schemeClr val="accent1"/>
+    </dgm:linClrLst>
+    <dgm:effectClrLst/>
+    <dgm:txLinClrLst/>
+    <dgm:txFillClrLst meth="repeat">
+      <a:schemeClr val="dk1"/>
+    </dgm:txFillClrLst>
+    <dgm:txEffectClrLst/>
+  </dgm:styleLbl>
+  <dgm:styleLbl name="trAlignAcc1">
+    <dgm:fillClrLst meth="repeat">
+      <a:schemeClr val="lt1">
+        <a:alpha val="40000"/>
+      </a:schemeClr>
+    </dgm:fillClrLst>
+    <dgm:linClrLst meth="repeat">
+      <a:schemeClr val="accent1"/>
+    </dgm:linClrLst>
+    <dgm:effectClrLst/>
+    <dgm:txLinClrLst/>
+    <dgm:txFillClrLst meth="repeat">
+      <a:schemeClr val="dk1"/>
+    </dgm:txFillClrLst>
+    <dgm:txEffectClrLst/>
+  </dgm:styleLbl>
+  <dgm:styleLbl name="bgAcc1">
+    <dgm:fillClrLst meth="repeat">
+      <a:schemeClr val="lt1">
+        <a:alpha val="90000"/>
+      </a:schemeClr>
+    </dgm:fillClrLst>
+    <dgm:linClrLst meth="repeat">
+      <a:schemeClr val="accent1"/>
+    </dgm:linClrLst>
+    <dgm:effectClrLst/>
+    <dgm:txLinClrLst/>
+    <dgm:txFillClrLst meth="repeat">
+      <a:schemeClr val="dk1"/>
+    </dgm:txFillClrLst>
+    <dgm:txEffectClrLst/>
+  </dgm:styleLbl>
+  <dgm:styleLbl name="solidFgAcc1">
+    <dgm:fillClrLst meth="repeat">
+      <a:schemeClr val="lt1"/>
+    </dgm:fillClrLst>
+    <dgm:linClrLst meth="repeat">
+      <a:schemeClr val="accent1"/>
+    </dgm:linClrLst>
+    <dgm:effectClrLst/>
+    <dgm:txLinClrLst/>
+    <dgm:txFillClrLst meth="repeat">
+      <a:schemeClr val="dk1"/>
+    </dgm:txFillClrLst>
+    <dgm:txEffectClrLst/>
+  </dgm:styleLbl>
+  <dgm:styleLbl name="solidAlignAcc1">
+    <dgm:fillClrLst meth="repeat">
+      <a:schemeClr val="lt1"/>
+    </dgm:fillClrLst>
+    <dgm:linClrLst meth="repeat">
+      <a:schemeClr val="accent1"/>
+    </dgm:linClrLst>
+    <dgm:effectClrLst/>
+    <dgm:txLinClrLst/>
+    <dgm:txFillClrLst meth="repeat">
+      <a:schemeClr val="dk1"/>
+    </dgm:txFillClrLst>
+    <dgm:txEffectClrLst/>
+  </dgm:styleLbl>
+  <dgm:styleLbl name="solidBgAcc1">
+    <dgm:fillClrLst meth="repeat">
+      <a:schemeClr val="lt1"/>
+    </dgm:fillClrLst>
+    <dgm:linClrLst meth="repeat">
+      <a:schemeClr val="accent1"/>
+    </dgm:linClrLst>
+    <dgm:effectClrLst/>
+    <dgm:txLinClrLst/>
+    <dgm:txFillClrLst meth="repeat">
+      <a:schemeClr val="dk1"/>
+    </dgm:txFillClrLst>
+    <dgm:txEffectClrLst/>
+  </dgm:styleLbl>
+  <dgm:styleLbl name="fgAccFollowNode1">
+    <dgm:fillClrLst meth="repeat">
+      <a:schemeClr val="accent1">
+        <a:alpha val="90000"/>
+        <a:tint val="40000"/>
+      </a:schemeClr>
+    </dgm:fillClrLst>
+    <dgm:linClrLst meth="repeat">
+      <a:schemeClr val="accent1">
+        <a:alpha val="90000"/>
+        <a:tint val="40000"/>
+      </a:schemeClr>
+    </dgm:linClrLst>
+    <dgm:effectClrLst/>
+    <dgm:txLinClrLst/>
+    <dgm:txFillClrLst meth="repeat">
+      <a:schemeClr val="dk1"/>
+    </dgm:txFillClrLst>
+    <dgm:txEffectClrLst/>
+  </dgm:styleLbl>
+  <dgm:styleLbl name="alignAccFollowNode1">
+    <dgm:fillClrLst meth="repeat">
+      <a:schemeClr val="accent1">
+        <a:alpha val="90000"/>
+        <a:tint val="40000"/>
+      </a:schemeClr>
+    </dgm:fillClrLst>
+    <dgm:linClrLst meth="repeat">
+      <a:schemeClr val="accent1">
+        <a:alpha val="90000"/>
+        <a:tint val="40000"/>
+      </a:schemeClr>
+    </dgm:linClrLst>
+    <dgm:effectClrLst/>
+    <dgm:txLinClrLst/>
+    <dgm:txFillClrLst meth="repeat">
+      <a:schemeClr val="dk1"/>
+    </dgm:txFillClrLst>
+    <dgm:txEffectClrLst/>
+  </dgm:styleLbl>
+  <dgm:styleLbl name="bgAccFollowNode1">
+    <dgm:fillClrLst meth="repeat">
+      <a:schemeClr val="accent1">
+        <a:alpha val="90000"/>
+        <a:tint val="40000"/>
+      </a:schemeClr>
+    </dgm:fillClrLst>
+    <dgm:linClrLst meth="repeat">
+      <a:schemeClr val="accent1">
+        <a:alpha val="90000"/>
+        <a:tint val="40000"/>
+      </a:schemeClr>
+    </dgm:linClrLst>
+    <dgm:effectClrLst/>
+    <dgm:txLinClrLst/>
+    <dgm:txFillClrLst meth="repeat">
+      <a:schemeClr val="dk1"/>
+    </dgm:txFillClrLst>
+    <dgm:txEffectClrLst/>
+  </dgm:styleLbl>
+  <dgm:styleLbl name="fgAcc0">
+    <dgm:fillClrLst meth="repeat">
+      <a:schemeClr val="lt1">
+        <a:alpha val="90000"/>
+      </a:schemeClr>
+    </dgm:fillClrLst>
+    <dgm:linClrLst meth="repeat">
+      <a:schemeClr val="accent1"/>
+    </dgm:linClrLst>
+    <dgm:effectClrLst/>
+    <dgm:txLinClrLst/>
+    <dgm:txFillClrLst meth="repeat">
+      <a:schemeClr val="dk1"/>
+    </dgm:txFillClrLst>
+    <dgm:txEffectClrLst/>
+  </dgm:styleLbl>
+  <dgm:styleLbl name="fgAcc2">
+    <dgm:fillClrLst meth="repeat">
+      <a:schemeClr val="lt1">
+        <a:alpha val="90000"/>
+      </a:schemeClr>
+    </dgm:fillClrLst>
+    <dgm:linClrLst meth="repeat">
+      <a:schemeClr val="accent1"/>
+    </dgm:linClrLst>
+    <dgm:effectClrLst/>
+    <dgm:txLinClrLst/>
+    <dgm:txFillClrLst meth="repeat">
+      <a:schemeClr val="dk1"/>
+    </dgm:txFillClrLst>
+    <dgm:txEffectClrLst/>
+  </dgm:styleLbl>
+  <dgm:styleLbl name="fgAcc3">
+    <dgm:fillClrLst meth="repeat">
+      <a:schemeClr val="lt1">
+        <a:alpha val="90000"/>
+      </a:schemeClr>
+    </dgm:fillClrLst>
+    <dgm:linClrLst meth="repeat">
+      <a:schemeClr val="accent1"/>
+    </dgm:linClrLst>
+    <dgm:effectClrLst/>
+    <dgm:txLinClrLst/>
+    <dgm:txFillClrLst meth="repeat">
+      <a:schemeClr val="dk1"/>
+    </dgm:txFillClrLst>
+    <dgm:txEffectClrLst/>
+  </dgm:styleLbl>
+  <dgm:styleLbl name="fgAcc4">
+    <dgm:fillClrLst meth="repeat">
+      <a:schemeClr val="lt1">
+        <a:alpha val="90000"/>
+      </a:schemeClr>
+    </dgm:fillClrLst>
+    <dgm:linClrLst meth="repeat">
+      <a:schemeClr val="accent1"/>
+    </dgm:linClrLst>
+    <dgm:effectClrLst/>
+    <dgm:txLinClrLst/>
+    <dgm:txFillClrLst meth="repeat">
+      <a:schemeClr val="dk1"/>
+    </dgm:txFillClrLst>
+    <dgm:txEffectClrLst/>
+  </dgm:styleLbl>
+  <dgm:styleLbl name="bgShp">
+    <dgm:fillClrLst meth="repeat">
+      <a:schemeClr val="accent1">
+        <a:tint val="40000"/>
+      </a:schemeClr>
+    </dgm:fillClrLst>
+    <dgm:linClrLst meth="repeat">
+      <a:schemeClr val="accent1"/>
+    </dgm:linClrLst>
+    <dgm:effectClrLst/>
+    <dgm:txLinClrLst/>
+    <dgm:txFillClrLst meth="repeat">
+      <a:schemeClr val="dk1"/>
+    </dgm:txFillClrLst>
+    <dgm:txEffectClrLst/>
+  </dgm:styleLbl>
+  <dgm:styleLbl name="dkBgShp">
+    <dgm:fillClrLst meth="repeat">
+      <a:schemeClr val="accent1">
+        <a:shade val="80000"/>
+      </a:schemeClr>
+    </dgm:fillClrLst>
+    <dgm:linClrLst meth="repeat">
+      <a:schemeClr val="accent1"/>
+    </dgm:linClrLst>
+    <dgm:effectClrLst/>
+    <dgm:txLinClrLst/>
+    <dgm:txFillClrLst meth="repeat">
+      <a:schemeClr val="lt1"/>
+    </dgm:txFillClrLst>
+    <dgm:txEffectClrLst/>
+  </dgm:styleLbl>
+  <dgm:styleLbl name="trBgShp">
+    <dgm:fillClrLst meth="repeat">
+      <a:schemeClr val="accent1">
+        <a:tint val="50000"/>
+        <a:alpha val="40000"/>
+      </a:schemeClr>
+    </dgm:fillClrLst>
+    <dgm:linClrLst meth="repeat">
+      <a:schemeClr val="accent1"/>
+    </dgm:linClrLst>
+    <dgm:effectClrLst/>
+    <dgm:txLinClrLst/>
+    <dgm:txFillClrLst meth="repeat">
+      <a:schemeClr val="lt1"/>
+    </dgm:txFillClrLst>
+    <dgm:txEffectClrLst/>
+  </dgm:styleLbl>
+  <dgm:styleLbl name="fgShp">
+    <dgm:fillClrLst meth="repeat">
+      <a:schemeClr val="accent1">
+        <a:tint val="60000"/>
+      </a:schemeClr>
+    </dgm:fillClrLst>
+    <dgm:linClrLst meth="repeat">
+      <a:schemeClr val="lt1"/>
+    </dgm:linClrLst>
+    <dgm:effectClrLst/>
+    <dgm:txLinClrLst/>
+    <dgm:txFillClrLst meth="repeat">
+      <a:schemeClr val="dk1"/>
+    </dgm:txFillClrLst>
+    <dgm:txEffectClrLst/>
+  </dgm:styleLbl>
+  <dgm:styleLbl name="revTx">
+    <dgm:fillClrLst meth="repeat">
+      <a:schemeClr val="lt1">
+        <a:alpha val="0"/>
+      </a:schemeClr>
+    </dgm:fillClrLst>
+    <dgm:linClrLst meth="repeat">
+      <a:schemeClr val="dk1">
+        <a:alpha val="0"/>
+      </a:schemeClr>
+    </dgm:linClrLst>
+    <dgm:effectClrLst/>
+    <dgm:txLinClrLst/>
+    <dgm:txFillClrLst meth="repeat">
+      <a:schemeClr val="tx1"/>
+    </dgm:txFillClrLst>
+    <dgm:txEffectClrLst/>
+  </dgm:styleLbl>
+</dgm:colorsDef>
+</file>
+
+<file path=ppt/diagrams/colors4.xml><?xml version="1.0" encoding="utf-8"?>
 <dgm:colorsDef xmlns:dgm="http://schemas.openxmlformats.org/drawingml/2006/diagram" xmlns:a="http://schemas.openxmlformats.org/drawingml/2006/main" uniqueId="urn:microsoft.com/office/officeart/2005/8/colors/accent0_2">
   <dgm:title val=""/>
   <dgm:desc val=""/>
@@ -9576,6 +10545,201 @@
 </file>
 
 <file path=ppt/diagrams/data3.xml><?xml version="1.0" encoding="utf-8"?>
+<dgm:dataModel xmlns:dgm="http://schemas.openxmlformats.org/drawingml/2006/diagram" xmlns:a="http://schemas.openxmlformats.org/drawingml/2006/main">
+  <dgm:ptLst>
+    <dgm:pt modelId="{5FE4678F-E38D-B74B-BA37-6FC95CB77DC1}" type="doc">
+      <dgm:prSet loTypeId="urn:microsoft.com/office/officeart/2005/8/layout/process1" loCatId="" qsTypeId="urn:microsoft.com/office/officeart/2005/8/quickstyle/simple1" qsCatId="simple" csTypeId="urn:microsoft.com/office/officeart/2005/8/colors/accent1_2" csCatId="accent1" phldr="1"/>
+      <dgm:spPr/>
+    </dgm:pt>
+    <dgm:pt modelId="{61D82486-BCD2-5A4B-B254-8A1B719BF9B4}">
+      <dgm:prSet phldrT="[Text]"/>
+      <dgm:spPr/>
+      <dgm:t>
+        <a:bodyPr/>
+        <a:lstStyle/>
+        <a:p>
+          <a:r>
+            <a:rPr lang="en-US" dirty="0"/>
+            <a:t>Dataset</a:t>
+          </a:r>
+        </a:p>
+      </dgm:t>
+    </dgm:pt>
+    <dgm:pt modelId="{8E238B87-3462-D841-8623-6D1E11FC07E9}" type="parTrans" cxnId="{00421614-C9FB-224F-AC87-F0C3224CC50D}">
+      <dgm:prSet/>
+      <dgm:spPr/>
+      <dgm:t>
+        <a:bodyPr/>
+        <a:lstStyle/>
+        <a:p>
+          <a:endParaRPr lang="en-US"/>
+        </a:p>
+      </dgm:t>
+    </dgm:pt>
+    <dgm:pt modelId="{B160FA07-4C75-D84E-9175-F357AA725216}" type="sibTrans" cxnId="{00421614-C9FB-224F-AC87-F0C3224CC50D}">
+      <dgm:prSet/>
+      <dgm:spPr/>
+      <dgm:t>
+        <a:bodyPr/>
+        <a:lstStyle/>
+        <a:p>
+          <a:endParaRPr lang="en-US"/>
+        </a:p>
+      </dgm:t>
+    </dgm:pt>
+    <dgm:pt modelId="{A3516839-9336-FC42-B4CE-CD0B23B0BB77}">
+      <dgm:prSet phldrT="[Text]"/>
+      <dgm:spPr/>
+      <dgm:t>
+        <a:bodyPr/>
+        <a:lstStyle/>
+        <a:p>
+          <a:r>
+            <a:rPr lang="en-US" dirty="0"/>
+            <a:t>Develop Algo</a:t>
+          </a:r>
+        </a:p>
+      </dgm:t>
+    </dgm:pt>
+    <dgm:pt modelId="{6EEDF056-0901-8A43-B0F5-DB0847C754A4}" type="parTrans" cxnId="{F11B2884-4E01-EC4E-AFA9-F5E5FEC44225}">
+      <dgm:prSet/>
+      <dgm:spPr/>
+      <dgm:t>
+        <a:bodyPr/>
+        <a:lstStyle/>
+        <a:p>
+          <a:endParaRPr lang="en-US"/>
+        </a:p>
+      </dgm:t>
+    </dgm:pt>
+    <dgm:pt modelId="{17EE1C03-C588-1947-8C96-7BB5DF355EDD}" type="sibTrans" cxnId="{F11B2884-4E01-EC4E-AFA9-F5E5FEC44225}">
+      <dgm:prSet/>
+      <dgm:spPr/>
+      <dgm:t>
+        <a:bodyPr/>
+        <a:lstStyle/>
+        <a:p>
+          <a:endParaRPr lang="en-US"/>
+        </a:p>
+      </dgm:t>
+    </dgm:pt>
+    <dgm:pt modelId="{24CB2092-F537-A940-9FEA-59D4C3DED80B}">
+      <dgm:prSet phldrT="[Text]"/>
+      <dgm:spPr/>
+      <dgm:t>
+        <a:bodyPr/>
+        <a:lstStyle/>
+        <a:p>
+          <a:r>
+            <a:rPr lang="en-US" dirty="0"/>
+            <a:t>Integrate with Front end API such as Plaid</a:t>
+          </a:r>
+        </a:p>
+      </dgm:t>
+    </dgm:pt>
+    <dgm:pt modelId="{83471180-6C80-304B-87E5-7D8936F3D7F8}" type="parTrans" cxnId="{8A1A2BE2-5119-A744-A42D-E13BEE44F2EF}">
+      <dgm:prSet/>
+      <dgm:spPr/>
+      <dgm:t>
+        <a:bodyPr/>
+        <a:lstStyle/>
+        <a:p>
+          <a:endParaRPr lang="en-US"/>
+        </a:p>
+      </dgm:t>
+    </dgm:pt>
+    <dgm:pt modelId="{801643A7-E7F2-FE40-8F8F-01831689FD08}" type="sibTrans" cxnId="{8A1A2BE2-5119-A744-A42D-E13BEE44F2EF}">
+      <dgm:prSet/>
+      <dgm:spPr/>
+      <dgm:t>
+        <a:bodyPr/>
+        <a:lstStyle/>
+        <a:p>
+          <a:endParaRPr lang="en-US"/>
+        </a:p>
+      </dgm:t>
+    </dgm:pt>
+    <dgm:pt modelId="{9AC067DD-1946-D94B-B1F6-62E626218392}" type="pres">
+      <dgm:prSet presAssocID="{5FE4678F-E38D-B74B-BA37-6FC95CB77DC1}" presName="Name0" presStyleCnt="0">
+        <dgm:presLayoutVars>
+          <dgm:dir/>
+          <dgm:resizeHandles val="exact"/>
+        </dgm:presLayoutVars>
+      </dgm:prSet>
+      <dgm:spPr/>
+    </dgm:pt>
+    <dgm:pt modelId="{648F3750-F29A-604B-9473-274BC943C60E}" type="pres">
+      <dgm:prSet presAssocID="{61D82486-BCD2-5A4B-B254-8A1B719BF9B4}" presName="node" presStyleLbl="node1" presStyleIdx="0" presStyleCnt="3">
+        <dgm:presLayoutVars>
+          <dgm:bulletEnabled val="1"/>
+        </dgm:presLayoutVars>
+      </dgm:prSet>
+      <dgm:spPr/>
+    </dgm:pt>
+    <dgm:pt modelId="{CC1D135A-1C31-F248-99CA-A3FD6F4C89F7}" type="pres">
+      <dgm:prSet presAssocID="{B160FA07-4C75-D84E-9175-F357AA725216}" presName="sibTrans" presStyleLbl="sibTrans2D1" presStyleIdx="0" presStyleCnt="2"/>
+      <dgm:spPr/>
+    </dgm:pt>
+    <dgm:pt modelId="{AA78401D-36AC-2346-9B8A-A34E3CE44C71}" type="pres">
+      <dgm:prSet presAssocID="{B160FA07-4C75-D84E-9175-F357AA725216}" presName="connectorText" presStyleLbl="sibTrans2D1" presStyleIdx="0" presStyleCnt="2"/>
+      <dgm:spPr/>
+    </dgm:pt>
+    <dgm:pt modelId="{E110DA1A-A4E2-0046-A1B2-458B9652EBCE}" type="pres">
+      <dgm:prSet presAssocID="{A3516839-9336-FC42-B4CE-CD0B23B0BB77}" presName="node" presStyleLbl="node1" presStyleIdx="1" presStyleCnt="3">
+        <dgm:presLayoutVars>
+          <dgm:bulletEnabled val="1"/>
+        </dgm:presLayoutVars>
+      </dgm:prSet>
+      <dgm:spPr/>
+    </dgm:pt>
+    <dgm:pt modelId="{CF2236DE-EF6E-6444-B788-66EC724DB972}" type="pres">
+      <dgm:prSet presAssocID="{17EE1C03-C588-1947-8C96-7BB5DF355EDD}" presName="sibTrans" presStyleLbl="sibTrans2D1" presStyleIdx="1" presStyleCnt="2"/>
+      <dgm:spPr/>
+    </dgm:pt>
+    <dgm:pt modelId="{84485A13-8DE6-1B43-9308-F64853FB1479}" type="pres">
+      <dgm:prSet presAssocID="{17EE1C03-C588-1947-8C96-7BB5DF355EDD}" presName="connectorText" presStyleLbl="sibTrans2D1" presStyleIdx="1" presStyleCnt="2"/>
+      <dgm:spPr/>
+    </dgm:pt>
+    <dgm:pt modelId="{1819B515-370C-8B4E-9AE7-9F42D3EF5359}" type="pres">
+      <dgm:prSet presAssocID="{24CB2092-F537-A940-9FEA-59D4C3DED80B}" presName="node" presStyleLbl="node1" presStyleIdx="2" presStyleCnt="3">
+        <dgm:presLayoutVars>
+          <dgm:bulletEnabled val="1"/>
+        </dgm:presLayoutVars>
+      </dgm:prSet>
+      <dgm:spPr/>
+    </dgm:pt>
+  </dgm:ptLst>
+  <dgm:cxnLst>
+    <dgm:cxn modelId="{00421614-C9FB-224F-AC87-F0C3224CC50D}" srcId="{5FE4678F-E38D-B74B-BA37-6FC95CB77DC1}" destId="{61D82486-BCD2-5A4B-B254-8A1B719BF9B4}" srcOrd="0" destOrd="0" parTransId="{8E238B87-3462-D841-8623-6D1E11FC07E9}" sibTransId="{B160FA07-4C75-D84E-9175-F357AA725216}"/>
+    <dgm:cxn modelId="{05B78F2D-B505-6545-B4C1-94DFD1B87091}" type="presOf" srcId="{24CB2092-F537-A940-9FEA-59D4C3DED80B}" destId="{1819B515-370C-8B4E-9AE7-9F42D3EF5359}" srcOrd="0" destOrd="0" presId="urn:microsoft.com/office/officeart/2005/8/layout/process1"/>
+    <dgm:cxn modelId="{AFEF0635-0561-F24B-BF8F-268843878BD8}" type="presOf" srcId="{17EE1C03-C588-1947-8C96-7BB5DF355EDD}" destId="{84485A13-8DE6-1B43-9308-F64853FB1479}" srcOrd="1" destOrd="0" presId="urn:microsoft.com/office/officeart/2005/8/layout/process1"/>
+    <dgm:cxn modelId="{B4AE0645-4B17-D34E-8A9B-32A639AC29E0}" type="presOf" srcId="{B160FA07-4C75-D84E-9175-F357AA725216}" destId="{AA78401D-36AC-2346-9B8A-A34E3CE44C71}" srcOrd="1" destOrd="0" presId="urn:microsoft.com/office/officeart/2005/8/layout/process1"/>
+    <dgm:cxn modelId="{577FC458-CBB0-054C-AEB2-D07E254D3066}" type="presOf" srcId="{A3516839-9336-FC42-B4CE-CD0B23B0BB77}" destId="{E110DA1A-A4E2-0046-A1B2-458B9652EBCE}" srcOrd="0" destOrd="0" presId="urn:microsoft.com/office/officeart/2005/8/layout/process1"/>
+    <dgm:cxn modelId="{F11B2884-4E01-EC4E-AFA9-F5E5FEC44225}" srcId="{5FE4678F-E38D-B74B-BA37-6FC95CB77DC1}" destId="{A3516839-9336-FC42-B4CE-CD0B23B0BB77}" srcOrd="1" destOrd="0" parTransId="{6EEDF056-0901-8A43-B0F5-DB0847C754A4}" sibTransId="{17EE1C03-C588-1947-8C96-7BB5DF355EDD}"/>
+    <dgm:cxn modelId="{4FB634C7-4E8C-0547-AF00-A7CB226312E7}" type="presOf" srcId="{17EE1C03-C588-1947-8C96-7BB5DF355EDD}" destId="{CF2236DE-EF6E-6444-B788-66EC724DB972}" srcOrd="0" destOrd="0" presId="urn:microsoft.com/office/officeart/2005/8/layout/process1"/>
+    <dgm:cxn modelId="{8AD74BD4-5493-5C4F-9CD7-3B9ABE97CE60}" type="presOf" srcId="{5FE4678F-E38D-B74B-BA37-6FC95CB77DC1}" destId="{9AC067DD-1946-D94B-B1F6-62E626218392}" srcOrd="0" destOrd="0" presId="urn:microsoft.com/office/officeart/2005/8/layout/process1"/>
+    <dgm:cxn modelId="{0A8CE0D9-DA24-F84D-ABAB-42BF326E32BA}" type="presOf" srcId="{61D82486-BCD2-5A4B-B254-8A1B719BF9B4}" destId="{648F3750-F29A-604B-9473-274BC943C60E}" srcOrd="0" destOrd="0" presId="urn:microsoft.com/office/officeart/2005/8/layout/process1"/>
+    <dgm:cxn modelId="{8A1A2BE2-5119-A744-A42D-E13BEE44F2EF}" srcId="{5FE4678F-E38D-B74B-BA37-6FC95CB77DC1}" destId="{24CB2092-F537-A940-9FEA-59D4C3DED80B}" srcOrd="2" destOrd="0" parTransId="{83471180-6C80-304B-87E5-7D8936F3D7F8}" sibTransId="{801643A7-E7F2-FE40-8F8F-01831689FD08}"/>
+    <dgm:cxn modelId="{C13C16EF-1A2E-C34A-9763-1370D3F790AA}" type="presOf" srcId="{B160FA07-4C75-D84E-9175-F357AA725216}" destId="{CC1D135A-1C31-F248-99CA-A3FD6F4C89F7}" srcOrd="0" destOrd="0" presId="urn:microsoft.com/office/officeart/2005/8/layout/process1"/>
+    <dgm:cxn modelId="{4163AC29-28D5-DD4B-B32A-6B23FF1ED844}" type="presParOf" srcId="{9AC067DD-1946-D94B-B1F6-62E626218392}" destId="{648F3750-F29A-604B-9473-274BC943C60E}" srcOrd="0" destOrd="0" presId="urn:microsoft.com/office/officeart/2005/8/layout/process1"/>
+    <dgm:cxn modelId="{D614A9F8-905D-DD45-A065-051A8468CA89}" type="presParOf" srcId="{9AC067DD-1946-D94B-B1F6-62E626218392}" destId="{CC1D135A-1C31-F248-99CA-A3FD6F4C89F7}" srcOrd="1" destOrd="0" presId="urn:microsoft.com/office/officeart/2005/8/layout/process1"/>
+    <dgm:cxn modelId="{4E8D03C9-A14E-B644-98B3-82166130C178}" type="presParOf" srcId="{CC1D135A-1C31-F248-99CA-A3FD6F4C89F7}" destId="{AA78401D-36AC-2346-9B8A-A34E3CE44C71}" srcOrd="0" destOrd="0" presId="urn:microsoft.com/office/officeart/2005/8/layout/process1"/>
+    <dgm:cxn modelId="{EA2EF118-C380-B64C-B890-9362B08E3C43}" type="presParOf" srcId="{9AC067DD-1946-D94B-B1F6-62E626218392}" destId="{E110DA1A-A4E2-0046-A1B2-458B9652EBCE}" srcOrd="2" destOrd="0" presId="urn:microsoft.com/office/officeart/2005/8/layout/process1"/>
+    <dgm:cxn modelId="{E9809C90-5D34-7B48-8CAF-619157B52971}" type="presParOf" srcId="{9AC067DD-1946-D94B-B1F6-62E626218392}" destId="{CF2236DE-EF6E-6444-B788-66EC724DB972}" srcOrd="3" destOrd="0" presId="urn:microsoft.com/office/officeart/2005/8/layout/process1"/>
+    <dgm:cxn modelId="{9662BA9E-F483-C14E-B57E-37F23AAA8EFD}" type="presParOf" srcId="{CF2236DE-EF6E-6444-B788-66EC724DB972}" destId="{84485A13-8DE6-1B43-9308-F64853FB1479}" srcOrd="0" destOrd="0" presId="urn:microsoft.com/office/officeart/2005/8/layout/process1"/>
+    <dgm:cxn modelId="{687D2302-6A36-F141-9DD9-9475339D33AB}" type="presParOf" srcId="{9AC067DD-1946-D94B-B1F6-62E626218392}" destId="{1819B515-370C-8B4E-9AE7-9F42D3EF5359}" srcOrd="4" destOrd="0" presId="urn:microsoft.com/office/officeart/2005/8/layout/process1"/>
+  </dgm:cxnLst>
+  <dgm:bg/>
+  <dgm:whole/>
+  <dgm:extLst>
+    <a:ext uri="http://schemas.microsoft.com/office/drawing/2008/diagram">
+      <dsp:dataModelExt xmlns:dsp="http://schemas.microsoft.com/office/drawing/2008/diagram" relId="rId6" minVer="http://schemas.openxmlformats.org/drawingml/2006/diagram"/>
+    </a:ext>
+  </dgm:extLst>
+</dgm:dataModel>
+</file>
+
+<file path=ppt/diagrams/data4.xml><?xml version="1.0" encoding="utf-8"?>
 <dgm:dataModel xmlns:dgm="http://schemas.openxmlformats.org/drawingml/2006/diagram" xmlns:a="http://schemas.openxmlformats.org/drawingml/2006/main">
   <dgm:ptLst>
     <dgm:pt modelId="{0C1123CB-21AC-B745-B147-6B0F77A8FC70}" type="doc">
@@ -10731,6 +11895,395 @@
       <dsp:cNvGrpSpPr/>
     </dsp:nvGrpSpPr>
     <dsp:grpSpPr/>
+    <dsp:sp modelId="{648F3750-F29A-604B-9473-274BC943C60E}">
+      <dsp:nvSpPr>
+        <dsp:cNvPr id="0" name=""/>
+        <dsp:cNvSpPr/>
+      </dsp:nvSpPr>
+      <dsp:spPr>
+        <a:xfrm>
+          <a:off x="8840" y="1232961"/>
+          <a:ext cx="2642294" cy="1585376"/>
+        </a:xfrm>
+        <a:prstGeom prst="roundRect">
+          <a:avLst>
+            <a:gd name="adj" fmla="val 10000"/>
+          </a:avLst>
+        </a:prstGeom>
+        <a:solidFill>
+          <a:schemeClr val="accent1">
+            <a:hueOff val="0"/>
+            <a:satOff val="0"/>
+            <a:lumOff val="0"/>
+            <a:alphaOff val="0"/>
+          </a:schemeClr>
+        </a:solidFill>
+        <a:ln w="12700" cap="flat" cmpd="sng" algn="ctr">
+          <a:solidFill>
+            <a:schemeClr val="lt1">
+              <a:hueOff val="0"/>
+              <a:satOff val="0"/>
+              <a:lumOff val="0"/>
+              <a:alphaOff val="0"/>
+            </a:schemeClr>
+          </a:solidFill>
+          <a:prstDash val="solid"/>
+        </a:ln>
+        <a:effectLst/>
+      </dsp:spPr>
+      <dsp:style>
+        <a:lnRef idx="2">
+          <a:scrgbClr r="0" g="0" b="0"/>
+        </a:lnRef>
+        <a:fillRef idx="1">
+          <a:scrgbClr r="0" g="0" b="0"/>
+        </a:fillRef>
+        <a:effectRef idx="0">
+          <a:scrgbClr r="0" g="0" b="0"/>
+        </a:effectRef>
+        <a:fontRef idx="minor">
+          <a:schemeClr val="lt1"/>
+        </a:fontRef>
+      </dsp:style>
+      <dsp:txBody>
+        <a:bodyPr spcFirstLastPara="0" vert="horz" wrap="square" lIns="106680" tIns="106680" rIns="106680" bIns="106680" numCol="1" spcCol="1270" anchor="ctr" anchorCtr="0">
+          <a:noAutofit/>
+        </a:bodyPr>
+        <a:lstStyle/>
+        <a:p>
+          <a:pPr marL="0" lvl="0" indent="0" algn="ctr" defTabSz="1244600">
+            <a:lnSpc>
+              <a:spcPct val="90000"/>
+            </a:lnSpc>
+            <a:spcBef>
+              <a:spcPct val="0"/>
+            </a:spcBef>
+            <a:spcAft>
+              <a:spcPct val="35000"/>
+            </a:spcAft>
+            <a:buNone/>
+          </a:pPr>
+          <a:r>
+            <a:rPr lang="en-US" sz="2800" kern="1200" dirty="0"/>
+            <a:t>Dataset</a:t>
+          </a:r>
+        </a:p>
+      </dsp:txBody>
+      <dsp:txXfrm>
+        <a:off x="55274" y="1279395"/>
+        <a:ext cx="2549426" cy="1492508"/>
+      </dsp:txXfrm>
+    </dsp:sp>
+    <dsp:sp modelId="{CC1D135A-1C31-F248-99CA-A3FD6F4C89F7}">
+      <dsp:nvSpPr>
+        <dsp:cNvPr id="0" name=""/>
+        <dsp:cNvSpPr/>
+      </dsp:nvSpPr>
+      <dsp:spPr>
+        <a:xfrm>
+          <a:off x="2915364" y="1698005"/>
+          <a:ext cx="560166" cy="655289"/>
+        </a:xfrm>
+        <a:prstGeom prst="rightArrow">
+          <a:avLst>
+            <a:gd name="adj1" fmla="val 60000"/>
+            <a:gd name="adj2" fmla="val 50000"/>
+          </a:avLst>
+        </a:prstGeom>
+        <a:solidFill>
+          <a:schemeClr val="accent1">
+            <a:tint val="60000"/>
+            <a:hueOff val="0"/>
+            <a:satOff val="0"/>
+            <a:lumOff val="0"/>
+            <a:alphaOff val="0"/>
+          </a:schemeClr>
+        </a:solidFill>
+        <a:ln>
+          <a:noFill/>
+        </a:ln>
+        <a:effectLst/>
+      </dsp:spPr>
+      <dsp:style>
+        <a:lnRef idx="0">
+          <a:scrgbClr r="0" g="0" b="0"/>
+        </a:lnRef>
+        <a:fillRef idx="1">
+          <a:scrgbClr r="0" g="0" b="0"/>
+        </a:fillRef>
+        <a:effectRef idx="0">
+          <a:scrgbClr r="0" g="0" b="0"/>
+        </a:effectRef>
+        <a:fontRef idx="minor">
+          <a:schemeClr val="lt1"/>
+        </a:fontRef>
+      </dsp:style>
+      <dsp:txBody>
+        <a:bodyPr spcFirstLastPara="0" vert="horz" wrap="square" lIns="0" tIns="0" rIns="0" bIns="0" numCol="1" spcCol="1270" anchor="ctr" anchorCtr="0">
+          <a:noAutofit/>
+        </a:bodyPr>
+        <a:lstStyle/>
+        <a:p>
+          <a:pPr marL="0" lvl="0" indent="0" algn="ctr" defTabSz="1022350">
+            <a:lnSpc>
+              <a:spcPct val="90000"/>
+            </a:lnSpc>
+            <a:spcBef>
+              <a:spcPct val="0"/>
+            </a:spcBef>
+            <a:spcAft>
+              <a:spcPct val="35000"/>
+            </a:spcAft>
+            <a:buNone/>
+          </a:pPr>
+          <a:endParaRPr lang="en-US" sz="2300" kern="1200"/>
+        </a:p>
+      </dsp:txBody>
+      <dsp:txXfrm>
+        <a:off x="2915364" y="1829063"/>
+        <a:ext cx="392116" cy="393173"/>
+      </dsp:txXfrm>
+    </dsp:sp>
+    <dsp:sp modelId="{E110DA1A-A4E2-0046-A1B2-458B9652EBCE}">
+      <dsp:nvSpPr>
+        <dsp:cNvPr id="0" name=""/>
+        <dsp:cNvSpPr/>
+      </dsp:nvSpPr>
+      <dsp:spPr>
+        <a:xfrm>
+          <a:off x="3708052" y="1232961"/>
+          <a:ext cx="2642294" cy="1585376"/>
+        </a:xfrm>
+        <a:prstGeom prst="roundRect">
+          <a:avLst>
+            <a:gd name="adj" fmla="val 10000"/>
+          </a:avLst>
+        </a:prstGeom>
+        <a:solidFill>
+          <a:schemeClr val="accent1">
+            <a:hueOff val="0"/>
+            <a:satOff val="0"/>
+            <a:lumOff val="0"/>
+            <a:alphaOff val="0"/>
+          </a:schemeClr>
+        </a:solidFill>
+        <a:ln w="12700" cap="flat" cmpd="sng" algn="ctr">
+          <a:solidFill>
+            <a:schemeClr val="lt1">
+              <a:hueOff val="0"/>
+              <a:satOff val="0"/>
+              <a:lumOff val="0"/>
+              <a:alphaOff val="0"/>
+            </a:schemeClr>
+          </a:solidFill>
+          <a:prstDash val="solid"/>
+        </a:ln>
+        <a:effectLst/>
+      </dsp:spPr>
+      <dsp:style>
+        <a:lnRef idx="2">
+          <a:scrgbClr r="0" g="0" b="0"/>
+        </a:lnRef>
+        <a:fillRef idx="1">
+          <a:scrgbClr r="0" g="0" b="0"/>
+        </a:fillRef>
+        <a:effectRef idx="0">
+          <a:scrgbClr r="0" g="0" b="0"/>
+        </a:effectRef>
+        <a:fontRef idx="minor">
+          <a:schemeClr val="lt1"/>
+        </a:fontRef>
+      </dsp:style>
+      <dsp:txBody>
+        <a:bodyPr spcFirstLastPara="0" vert="horz" wrap="square" lIns="106680" tIns="106680" rIns="106680" bIns="106680" numCol="1" spcCol="1270" anchor="ctr" anchorCtr="0">
+          <a:noAutofit/>
+        </a:bodyPr>
+        <a:lstStyle/>
+        <a:p>
+          <a:pPr marL="0" lvl="0" indent="0" algn="ctr" defTabSz="1244600">
+            <a:lnSpc>
+              <a:spcPct val="90000"/>
+            </a:lnSpc>
+            <a:spcBef>
+              <a:spcPct val="0"/>
+            </a:spcBef>
+            <a:spcAft>
+              <a:spcPct val="35000"/>
+            </a:spcAft>
+            <a:buNone/>
+          </a:pPr>
+          <a:r>
+            <a:rPr lang="en-US" sz="2800" kern="1200" dirty="0"/>
+            <a:t>Develop Algo</a:t>
+          </a:r>
+        </a:p>
+      </dsp:txBody>
+      <dsp:txXfrm>
+        <a:off x="3754486" y="1279395"/>
+        <a:ext cx="2549426" cy="1492508"/>
+      </dsp:txXfrm>
+    </dsp:sp>
+    <dsp:sp modelId="{CF2236DE-EF6E-6444-B788-66EC724DB972}">
+      <dsp:nvSpPr>
+        <dsp:cNvPr id="0" name=""/>
+        <dsp:cNvSpPr/>
+      </dsp:nvSpPr>
+      <dsp:spPr>
+        <a:xfrm>
+          <a:off x="6614576" y="1698005"/>
+          <a:ext cx="560166" cy="655289"/>
+        </a:xfrm>
+        <a:prstGeom prst="rightArrow">
+          <a:avLst>
+            <a:gd name="adj1" fmla="val 60000"/>
+            <a:gd name="adj2" fmla="val 50000"/>
+          </a:avLst>
+        </a:prstGeom>
+        <a:solidFill>
+          <a:schemeClr val="accent1">
+            <a:tint val="60000"/>
+            <a:hueOff val="0"/>
+            <a:satOff val="0"/>
+            <a:lumOff val="0"/>
+            <a:alphaOff val="0"/>
+          </a:schemeClr>
+        </a:solidFill>
+        <a:ln>
+          <a:noFill/>
+        </a:ln>
+        <a:effectLst/>
+      </dsp:spPr>
+      <dsp:style>
+        <a:lnRef idx="0">
+          <a:scrgbClr r="0" g="0" b="0"/>
+        </a:lnRef>
+        <a:fillRef idx="1">
+          <a:scrgbClr r="0" g="0" b="0"/>
+        </a:fillRef>
+        <a:effectRef idx="0">
+          <a:scrgbClr r="0" g="0" b="0"/>
+        </a:effectRef>
+        <a:fontRef idx="minor">
+          <a:schemeClr val="lt1"/>
+        </a:fontRef>
+      </dsp:style>
+      <dsp:txBody>
+        <a:bodyPr spcFirstLastPara="0" vert="horz" wrap="square" lIns="0" tIns="0" rIns="0" bIns="0" numCol="1" spcCol="1270" anchor="ctr" anchorCtr="0">
+          <a:noAutofit/>
+        </a:bodyPr>
+        <a:lstStyle/>
+        <a:p>
+          <a:pPr marL="0" lvl="0" indent="0" algn="ctr" defTabSz="1022350">
+            <a:lnSpc>
+              <a:spcPct val="90000"/>
+            </a:lnSpc>
+            <a:spcBef>
+              <a:spcPct val="0"/>
+            </a:spcBef>
+            <a:spcAft>
+              <a:spcPct val="35000"/>
+            </a:spcAft>
+            <a:buNone/>
+          </a:pPr>
+          <a:endParaRPr lang="en-US" sz="2300" kern="1200"/>
+        </a:p>
+      </dsp:txBody>
+      <dsp:txXfrm>
+        <a:off x="6614576" y="1829063"/>
+        <a:ext cx="392116" cy="393173"/>
+      </dsp:txXfrm>
+    </dsp:sp>
+    <dsp:sp modelId="{1819B515-370C-8B4E-9AE7-9F42D3EF5359}">
+      <dsp:nvSpPr>
+        <dsp:cNvPr id="0" name=""/>
+        <dsp:cNvSpPr/>
+      </dsp:nvSpPr>
+      <dsp:spPr>
+        <a:xfrm>
+          <a:off x="7407265" y="1232961"/>
+          <a:ext cx="2642294" cy="1585376"/>
+        </a:xfrm>
+        <a:prstGeom prst="roundRect">
+          <a:avLst>
+            <a:gd name="adj" fmla="val 10000"/>
+          </a:avLst>
+        </a:prstGeom>
+        <a:solidFill>
+          <a:schemeClr val="accent1">
+            <a:hueOff val="0"/>
+            <a:satOff val="0"/>
+            <a:lumOff val="0"/>
+            <a:alphaOff val="0"/>
+          </a:schemeClr>
+        </a:solidFill>
+        <a:ln w="12700" cap="flat" cmpd="sng" algn="ctr">
+          <a:solidFill>
+            <a:schemeClr val="lt1">
+              <a:hueOff val="0"/>
+              <a:satOff val="0"/>
+              <a:lumOff val="0"/>
+              <a:alphaOff val="0"/>
+            </a:schemeClr>
+          </a:solidFill>
+          <a:prstDash val="solid"/>
+        </a:ln>
+        <a:effectLst/>
+      </dsp:spPr>
+      <dsp:style>
+        <a:lnRef idx="2">
+          <a:scrgbClr r="0" g="0" b="0"/>
+        </a:lnRef>
+        <a:fillRef idx="1">
+          <a:scrgbClr r="0" g="0" b="0"/>
+        </a:fillRef>
+        <a:effectRef idx="0">
+          <a:scrgbClr r="0" g="0" b="0"/>
+        </a:effectRef>
+        <a:fontRef idx="minor">
+          <a:schemeClr val="lt1"/>
+        </a:fontRef>
+      </dsp:style>
+      <dsp:txBody>
+        <a:bodyPr spcFirstLastPara="0" vert="horz" wrap="square" lIns="106680" tIns="106680" rIns="106680" bIns="106680" numCol="1" spcCol="1270" anchor="ctr" anchorCtr="0">
+          <a:noAutofit/>
+        </a:bodyPr>
+        <a:lstStyle/>
+        <a:p>
+          <a:pPr marL="0" lvl="0" indent="0" algn="ctr" defTabSz="1244600">
+            <a:lnSpc>
+              <a:spcPct val="90000"/>
+            </a:lnSpc>
+            <a:spcBef>
+              <a:spcPct val="0"/>
+            </a:spcBef>
+            <a:spcAft>
+              <a:spcPct val="35000"/>
+            </a:spcAft>
+            <a:buNone/>
+          </a:pPr>
+          <a:r>
+            <a:rPr lang="en-US" sz="2800" kern="1200" dirty="0"/>
+            <a:t>Integrate with Front end API such as Plaid</a:t>
+          </a:r>
+        </a:p>
+      </dsp:txBody>
+      <dsp:txXfrm>
+        <a:off x="7453699" y="1279395"/>
+        <a:ext cx="2549426" cy="1492508"/>
+      </dsp:txXfrm>
+    </dsp:sp>
+  </dsp:spTree>
+</dsp:drawing>
+</file>
+
+<file path=ppt/diagrams/drawing4.xml><?xml version="1.0" encoding="utf-8"?>
+<dsp:drawing xmlns:dgm="http://schemas.openxmlformats.org/drawingml/2006/diagram" xmlns:dsp="http://schemas.microsoft.com/office/drawing/2008/diagram" xmlns:a="http://schemas.openxmlformats.org/drawingml/2006/main">
+  <dsp:spTree>
+    <dsp:nvGrpSpPr>
+      <dsp:cNvPr id="0" name=""/>
+      <dsp:cNvGrpSpPr/>
+    </dsp:nvGrpSpPr>
+    <dsp:grpSpPr/>
     <dsp:sp modelId="{B3F4A75D-7E61-9C47-8C40-9525D91EFA23}">
       <dsp:nvSpPr>
         <dsp:cNvPr id="0" name=""/>
@@ -11676,6 +13229,152 @@
 </file>
 
 <file path=ppt/diagrams/layout3.xml><?xml version="1.0" encoding="utf-8"?>
+<dgm:layoutDef xmlns:dgm="http://schemas.openxmlformats.org/drawingml/2006/diagram" xmlns:a="http://schemas.openxmlformats.org/drawingml/2006/main" uniqueId="urn:microsoft.com/office/officeart/2005/8/layout/process1">
+  <dgm:title val=""/>
+  <dgm:desc val=""/>
+  <dgm:catLst>
+    <dgm:cat type="process" pri="1000"/>
+    <dgm:cat type="convert" pri="15000"/>
+  </dgm:catLst>
+  <dgm:sampData useDef="1">
+    <dgm:dataModel>
+      <dgm:ptLst/>
+      <dgm:bg/>
+      <dgm:whole/>
+    </dgm:dataModel>
+  </dgm:sampData>
+  <dgm:styleData>
+    <dgm:dataModel>
+      <dgm:ptLst>
+        <dgm:pt modelId="0" type="doc"/>
+        <dgm:pt modelId="1"/>
+        <dgm:pt modelId="2"/>
+      </dgm:ptLst>
+      <dgm:cxnLst>
+        <dgm:cxn modelId="3" srcId="0" destId="1" srcOrd="0" destOrd="0"/>
+        <dgm:cxn modelId="4" srcId="0" destId="2" srcOrd="1" destOrd="0"/>
+      </dgm:cxnLst>
+      <dgm:bg/>
+      <dgm:whole/>
+    </dgm:dataModel>
+  </dgm:styleData>
+  <dgm:clrData>
+    <dgm:dataModel>
+      <dgm:ptLst>
+        <dgm:pt modelId="0" type="doc"/>
+        <dgm:pt modelId="1"/>
+        <dgm:pt modelId="2"/>
+        <dgm:pt modelId="3"/>
+        <dgm:pt modelId="4"/>
+      </dgm:ptLst>
+      <dgm:cxnLst>
+        <dgm:cxn modelId="5" srcId="0" destId="1" srcOrd="0" destOrd="0"/>
+        <dgm:cxn modelId="6" srcId="0" destId="2" srcOrd="1" destOrd="0"/>
+        <dgm:cxn modelId="7" srcId="0" destId="3" srcOrd="2" destOrd="0"/>
+        <dgm:cxn modelId="8" srcId="0" destId="4" srcOrd="3" destOrd="0"/>
+      </dgm:cxnLst>
+      <dgm:bg/>
+      <dgm:whole/>
+    </dgm:dataModel>
+  </dgm:clrData>
+  <dgm:layoutNode name="Name0">
+    <dgm:varLst>
+      <dgm:dir/>
+      <dgm:resizeHandles val="exact"/>
+    </dgm:varLst>
+    <dgm:choose name="Name1">
+      <dgm:if name="Name2" func="var" arg="dir" op="equ" val="norm">
+        <dgm:alg type="lin"/>
+      </dgm:if>
+      <dgm:else name="Name3">
+        <dgm:alg type="lin">
+          <dgm:param type="linDir" val="fromR"/>
+        </dgm:alg>
+      </dgm:else>
+    </dgm:choose>
+    <dgm:shape xmlns:r="http://schemas.openxmlformats.org/officeDocument/2006/relationships" r:blip="">
+      <dgm:adjLst/>
+    </dgm:shape>
+    <dgm:presOf/>
+    <dgm:constrLst>
+      <dgm:constr type="w" for="ch" ptType="node" refType="w"/>
+      <dgm:constr type="h" for="ch" ptType="node" op="equ"/>
+      <dgm:constr type="primFontSz" for="ch" ptType="node" op="equ" val="65"/>
+      <dgm:constr type="w" for="ch" ptType="sibTrans" refType="w" refFor="ch" refPtType="node" op="equ" fact="0.4"/>
+      <dgm:constr type="h" for="ch" ptType="sibTrans" op="equ"/>
+      <dgm:constr type="primFontSz" for="des" forName="connectorText" op="equ" val="55"/>
+      <dgm:constr type="primFontSz" for="des" forName="connectorText" refType="primFontSz" refFor="ch" refPtType="node" op="lte" fact="0.8"/>
+    </dgm:constrLst>
+    <dgm:ruleLst/>
+    <dgm:forEach name="nodesForEach" axis="ch" ptType="node">
+      <dgm:layoutNode name="node">
+        <dgm:varLst>
+          <dgm:bulletEnabled val="1"/>
+        </dgm:varLst>
+        <dgm:alg type="tx"/>
+        <dgm:shape xmlns:r="http://schemas.openxmlformats.org/officeDocument/2006/relationships" type="roundRect" r:blip="">
+          <dgm:adjLst>
+            <dgm:adj idx="1" val="0.1"/>
+          </dgm:adjLst>
+        </dgm:shape>
+        <dgm:presOf axis="desOrSelf" ptType="node"/>
+        <dgm:constrLst>
+          <dgm:constr type="h" refType="w" fact="0.6"/>
+          <dgm:constr type="tMarg" refType="primFontSz" fact="0.3"/>
+          <dgm:constr type="bMarg" refType="primFontSz" fact="0.3"/>
+          <dgm:constr type="lMarg" refType="primFontSz" fact="0.3"/>
+          <dgm:constr type="rMarg" refType="primFontSz" fact="0.3"/>
+        </dgm:constrLst>
+        <dgm:ruleLst>
+          <dgm:rule type="primFontSz" val="18" fact="NaN" max="NaN"/>
+          <dgm:rule type="h" val="NaN" fact="1.5" max="NaN"/>
+          <dgm:rule type="primFontSz" val="5" fact="NaN" max="NaN"/>
+          <dgm:rule type="h" val="INF" fact="NaN" max="NaN"/>
+        </dgm:ruleLst>
+      </dgm:layoutNode>
+      <dgm:forEach name="sibTransForEach" axis="followSib" ptType="sibTrans" cnt="1">
+        <dgm:layoutNode name="sibTrans">
+          <dgm:alg type="conn">
+            <dgm:param type="begPts" val="auto"/>
+            <dgm:param type="endPts" val="auto"/>
+          </dgm:alg>
+          <dgm:shape xmlns:r="http://schemas.openxmlformats.org/officeDocument/2006/relationships" type="conn" r:blip="">
+            <dgm:adjLst/>
+          </dgm:shape>
+          <dgm:presOf axis="self"/>
+          <dgm:constrLst>
+            <dgm:constr type="h" refType="w" fact="0.62"/>
+            <dgm:constr type="connDist"/>
+            <dgm:constr type="begPad" refType="connDist" fact="0.25"/>
+            <dgm:constr type="endPad" refType="connDist" fact="0.22"/>
+          </dgm:constrLst>
+          <dgm:ruleLst/>
+          <dgm:layoutNode name="connectorText">
+            <dgm:alg type="tx">
+              <dgm:param type="autoTxRot" val="grav"/>
+            </dgm:alg>
+            <dgm:shape xmlns:r="http://schemas.openxmlformats.org/officeDocument/2006/relationships" type="conn" r:blip="" hideGeom="1">
+              <dgm:adjLst/>
+            </dgm:shape>
+            <dgm:presOf axis="self"/>
+            <dgm:constrLst>
+              <dgm:constr type="lMarg"/>
+              <dgm:constr type="rMarg"/>
+              <dgm:constr type="tMarg"/>
+              <dgm:constr type="bMarg"/>
+            </dgm:constrLst>
+            <dgm:ruleLst>
+              <dgm:rule type="primFontSz" val="5" fact="NaN" max="NaN"/>
+            </dgm:ruleLst>
+          </dgm:layoutNode>
+        </dgm:layoutNode>
+      </dgm:forEach>
+    </dgm:forEach>
+  </dgm:layoutNode>
+</dgm:layoutDef>
+</file>
+
+<file path=ppt/diagrams/layout4.xml><?xml version="1.0" encoding="utf-8"?>
 <dgm:layoutDef xmlns:dgm="http://schemas.openxmlformats.org/drawingml/2006/diagram" xmlns:a="http://schemas.openxmlformats.org/drawingml/2006/main" uniqueId="urn:microsoft.com/office/officeart/2005/8/layout/funnel1">
   <dgm:title val=""/>
   <dgm:desc val=""/>
@@ -14062,6 +15761,1040 @@
 </file>
 
 <file path=ppt/diagrams/quickStyle3.xml><?xml version="1.0" encoding="utf-8"?>
+<dgm:styleDef xmlns:dgm="http://schemas.openxmlformats.org/drawingml/2006/diagram" xmlns:a="http://schemas.openxmlformats.org/drawingml/2006/main" uniqueId="urn:microsoft.com/office/officeart/2005/8/quickstyle/simple1">
+  <dgm:title val=""/>
+  <dgm:desc val=""/>
+  <dgm:catLst>
+    <dgm:cat type="simple" pri="10100"/>
+  </dgm:catLst>
+  <dgm:scene3d>
+    <a:camera prst="orthographicFront"/>
+    <a:lightRig rig="threePt" dir="t"/>
+  </dgm:scene3d>
+  <dgm:styleLbl name="node0">
+    <dgm:scene3d>
+      <a:camera prst="orthographicFront"/>
+      <a:lightRig rig="threePt" dir="t"/>
+    </dgm:scene3d>
+    <dgm:sp3d/>
+    <dgm:txPr/>
+    <dgm:style>
+      <a:lnRef idx="2">
+        <a:scrgbClr r="0" g="0" b="0"/>
+      </a:lnRef>
+      <a:fillRef idx="1">
+        <a:scrgbClr r="0" g="0" b="0"/>
+      </a:fillRef>
+      <a:effectRef idx="0">
+        <a:scrgbClr r="0" g="0" b="0"/>
+      </a:effectRef>
+      <a:fontRef idx="minor">
+        <a:schemeClr val="lt1"/>
+      </a:fontRef>
+    </dgm:style>
+  </dgm:styleLbl>
+  <dgm:styleLbl name="lnNode1">
+    <dgm:scene3d>
+      <a:camera prst="orthographicFront"/>
+      <a:lightRig rig="threePt" dir="t"/>
+    </dgm:scene3d>
+    <dgm:sp3d/>
+    <dgm:txPr/>
+    <dgm:style>
+      <a:lnRef idx="2">
+        <a:scrgbClr r="0" g="0" b="0"/>
+      </a:lnRef>
+      <a:fillRef idx="1">
+        <a:scrgbClr r="0" g="0" b="0"/>
+      </a:fillRef>
+      <a:effectRef idx="0">
+        <a:scrgbClr r="0" g="0" b="0"/>
+      </a:effectRef>
+      <a:fontRef idx="minor">
+        <a:schemeClr val="lt1"/>
+      </a:fontRef>
+    </dgm:style>
+  </dgm:styleLbl>
+  <dgm:styleLbl name="vennNode1">
+    <dgm:scene3d>
+      <a:camera prst="orthographicFront"/>
+      <a:lightRig rig="threePt" dir="t"/>
+    </dgm:scene3d>
+    <dgm:sp3d/>
+    <dgm:txPr/>
+    <dgm:style>
+      <a:lnRef idx="2">
+        <a:scrgbClr r="0" g="0" b="0"/>
+      </a:lnRef>
+      <a:fillRef idx="1">
+        <a:scrgbClr r="0" g="0" b="0"/>
+      </a:fillRef>
+      <a:effectRef idx="0">
+        <a:scrgbClr r="0" g="0" b="0"/>
+      </a:effectRef>
+      <a:fontRef idx="minor">
+        <a:schemeClr val="tx1"/>
+      </a:fontRef>
+    </dgm:style>
+  </dgm:styleLbl>
+  <dgm:styleLbl name="alignNode1">
+    <dgm:scene3d>
+      <a:camera prst="orthographicFront"/>
+      <a:lightRig rig="threePt" dir="t"/>
+    </dgm:scene3d>
+    <dgm:sp3d/>
+    <dgm:txPr/>
+    <dgm:style>
+      <a:lnRef idx="2">
+        <a:scrgbClr r="0" g="0" b="0"/>
+      </a:lnRef>
+      <a:fillRef idx="1">
+        <a:scrgbClr r="0" g="0" b="0"/>
+      </a:fillRef>
+      <a:effectRef idx="0">
+        <a:scrgbClr r="0" g="0" b="0"/>
+      </a:effectRef>
+      <a:fontRef idx="minor">
+        <a:schemeClr val="lt1"/>
+      </a:fontRef>
+    </dgm:style>
+  </dgm:styleLbl>
+  <dgm:styleLbl name="node1">
+    <dgm:scene3d>
+      <a:camera prst="orthographicFront"/>
+      <a:lightRig rig="threePt" dir="t"/>
+    </dgm:scene3d>
+    <dgm:sp3d/>
+    <dgm:txPr/>
+    <dgm:style>
+      <a:lnRef idx="2">
+        <a:scrgbClr r="0" g="0" b="0"/>
+      </a:lnRef>
+      <a:fillRef idx="1">
+        <a:scrgbClr r="0" g="0" b="0"/>
+      </a:fillRef>
+      <a:effectRef idx="0">
+        <a:scrgbClr r="0" g="0" b="0"/>
+      </a:effectRef>
+      <a:fontRef idx="minor">
+        <a:schemeClr val="lt1"/>
+      </a:fontRef>
+    </dgm:style>
+  </dgm:styleLbl>
+  <dgm:styleLbl name="node2">
+    <dgm:scene3d>
+      <a:camera prst="orthographicFront"/>
+      <a:lightRig rig="threePt" dir="t"/>
+    </dgm:scene3d>
+    <dgm:sp3d/>
+    <dgm:txPr/>
+    <dgm:style>
+      <a:lnRef idx="2">
+        <a:scrgbClr r="0" g="0" b="0"/>
+      </a:lnRef>
+      <a:fillRef idx="1">
+        <a:scrgbClr r="0" g="0" b="0"/>
+      </a:fillRef>
+      <a:effectRef idx="0">
+        <a:scrgbClr r="0" g="0" b="0"/>
+      </a:effectRef>
+      <a:fontRef idx="minor">
+        <a:schemeClr val="lt1"/>
+      </a:fontRef>
+    </dgm:style>
+  </dgm:styleLbl>
+  <dgm:styleLbl name="node3">
+    <dgm:scene3d>
+      <a:camera prst="orthographicFront"/>
+      <a:lightRig rig="threePt" dir="t"/>
+    </dgm:scene3d>
+    <dgm:sp3d/>
+    <dgm:txPr/>
+    <dgm:style>
+      <a:lnRef idx="2">
+        <a:scrgbClr r="0" g="0" b="0"/>
+      </a:lnRef>
+      <a:fillRef idx="1">
+        <a:scrgbClr r="0" g="0" b="0"/>
+      </a:fillRef>
+      <a:effectRef idx="0">
+        <a:scrgbClr r="0" g="0" b="0"/>
+      </a:effectRef>
+      <a:fontRef idx="minor">
+        <a:schemeClr val="lt1"/>
+      </a:fontRef>
+    </dgm:style>
+  </dgm:styleLbl>
+  <dgm:styleLbl name="node4">
+    <dgm:scene3d>
+      <a:camera prst="orthographicFront"/>
+      <a:lightRig rig="threePt" dir="t"/>
+    </dgm:scene3d>
+    <dgm:sp3d/>
+    <dgm:txPr/>
+    <dgm:style>
+      <a:lnRef idx="2">
+        <a:scrgbClr r="0" g="0" b="0"/>
+      </a:lnRef>
+      <a:fillRef idx="1">
+        <a:scrgbClr r="0" g="0" b="0"/>
+      </a:fillRef>
+      <a:effectRef idx="0">
+        <a:scrgbClr r="0" g="0" b="0"/>
+      </a:effectRef>
+      <a:fontRef idx="minor">
+        <a:schemeClr val="lt1"/>
+      </a:fontRef>
+    </dgm:style>
+  </dgm:styleLbl>
+  <dgm:styleLbl name="fgImgPlace1">
+    <dgm:scene3d>
+      <a:camera prst="orthographicFront"/>
+      <a:lightRig rig="threePt" dir="t"/>
+    </dgm:scene3d>
+    <dgm:sp3d/>
+    <dgm:txPr/>
+    <dgm:style>
+      <a:lnRef idx="2">
+        <a:scrgbClr r="0" g="0" b="0"/>
+      </a:lnRef>
+      <a:fillRef idx="1">
+        <a:scrgbClr r="0" g="0" b="0"/>
+      </a:fillRef>
+      <a:effectRef idx="0">
+        <a:scrgbClr r="0" g="0" b="0"/>
+      </a:effectRef>
+      <a:fontRef idx="minor"/>
+    </dgm:style>
+  </dgm:styleLbl>
+  <dgm:styleLbl name="alignImgPlace1">
+    <dgm:scene3d>
+      <a:camera prst="orthographicFront"/>
+      <a:lightRig rig="threePt" dir="t"/>
+    </dgm:scene3d>
+    <dgm:sp3d/>
+    <dgm:txPr/>
+    <dgm:style>
+      <a:lnRef idx="2">
+        <a:scrgbClr r="0" g="0" b="0"/>
+      </a:lnRef>
+      <a:fillRef idx="1">
+        <a:scrgbClr r="0" g="0" b="0"/>
+      </a:fillRef>
+      <a:effectRef idx="0">
+        <a:scrgbClr r="0" g="0" b="0"/>
+      </a:effectRef>
+      <a:fontRef idx="minor"/>
+    </dgm:style>
+  </dgm:styleLbl>
+  <dgm:styleLbl name="bgImgPlace1">
+    <dgm:scene3d>
+      <a:camera prst="orthographicFront"/>
+      <a:lightRig rig="threePt" dir="t"/>
+    </dgm:scene3d>
+    <dgm:sp3d/>
+    <dgm:txPr/>
+    <dgm:style>
+      <a:lnRef idx="2">
+        <a:scrgbClr r="0" g="0" b="0"/>
+      </a:lnRef>
+      <a:fillRef idx="1">
+        <a:scrgbClr r="0" g="0" b="0"/>
+      </a:fillRef>
+      <a:effectRef idx="0">
+        <a:scrgbClr r="0" g="0" b="0"/>
+      </a:effectRef>
+      <a:fontRef idx="minor"/>
+    </dgm:style>
+  </dgm:styleLbl>
+  <dgm:styleLbl name="sibTrans2D1">
+    <dgm:scene3d>
+      <a:camera prst="orthographicFront"/>
+      <a:lightRig rig="threePt" dir="t"/>
+    </dgm:scene3d>
+    <dgm:sp3d/>
+    <dgm:txPr/>
+    <dgm:style>
+      <a:lnRef idx="0">
+        <a:scrgbClr r="0" g="0" b="0"/>
+      </a:lnRef>
+      <a:fillRef idx="1">
+        <a:scrgbClr r="0" g="0" b="0"/>
+      </a:fillRef>
+      <a:effectRef idx="0">
+        <a:scrgbClr r="0" g="0" b="0"/>
+      </a:effectRef>
+      <a:fontRef idx="minor">
+        <a:schemeClr val="lt1"/>
+      </a:fontRef>
+    </dgm:style>
+  </dgm:styleLbl>
+  <dgm:styleLbl name="fgSibTrans2D1">
+    <dgm:scene3d>
+      <a:camera prst="orthographicFront"/>
+      <a:lightRig rig="threePt" dir="t"/>
+    </dgm:scene3d>
+    <dgm:sp3d/>
+    <dgm:txPr/>
+    <dgm:style>
+      <a:lnRef idx="0">
+        <a:scrgbClr r="0" g="0" b="0"/>
+      </a:lnRef>
+      <a:fillRef idx="1">
+        <a:scrgbClr r="0" g="0" b="0"/>
+      </a:fillRef>
+      <a:effectRef idx="0">
+        <a:scrgbClr r="0" g="0" b="0"/>
+      </a:effectRef>
+      <a:fontRef idx="minor">
+        <a:schemeClr val="lt1"/>
+      </a:fontRef>
+    </dgm:style>
+  </dgm:styleLbl>
+  <dgm:styleLbl name="bgSibTrans2D1">
+    <dgm:scene3d>
+      <a:camera prst="orthographicFront"/>
+      <a:lightRig rig="threePt" dir="t"/>
+    </dgm:scene3d>
+    <dgm:sp3d/>
+    <dgm:txPr/>
+    <dgm:style>
+      <a:lnRef idx="0">
+        <a:scrgbClr r="0" g="0" b="0"/>
+      </a:lnRef>
+      <a:fillRef idx="1">
+        <a:scrgbClr r="0" g="0" b="0"/>
+      </a:fillRef>
+      <a:effectRef idx="0">
+        <a:scrgbClr r="0" g="0" b="0"/>
+      </a:effectRef>
+      <a:fontRef idx="minor">
+        <a:schemeClr val="lt1"/>
+      </a:fontRef>
+    </dgm:style>
+  </dgm:styleLbl>
+  <dgm:styleLbl name="sibTrans1D1">
+    <dgm:scene3d>
+      <a:camera prst="orthographicFront"/>
+      <a:lightRig rig="threePt" dir="t"/>
+    </dgm:scene3d>
+    <dgm:sp3d/>
+    <dgm:txPr/>
+    <dgm:style>
+      <a:lnRef idx="1">
+        <a:scrgbClr r="0" g="0" b="0"/>
+      </a:lnRef>
+      <a:fillRef idx="0">
+        <a:scrgbClr r="0" g="0" b="0"/>
+      </a:fillRef>
+      <a:effectRef idx="0">
+        <a:scrgbClr r="0" g="0" b="0"/>
+      </a:effectRef>
+      <a:fontRef idx="minor"/>
+    </dgm:style>
+  </dgm:styleLbl>
+  <dgm:styleLbl name="callout">
+    <dgm:scene3d>
+      <a:camera prst="orthographicFront"/>
+      <a:lightRig rig="threePt" dir="t"/>
+    </dgm:scene3d>
+    <dgm:sp3d/>
+    <dgm:txPr/>
+    <dgm:style>
+      <a:lnRef idx="2">
+        <a:scrgbClr r="0" g="0" b="0"/>
+      </a:lnRef>
+      <a:fillRef idx="1">
+        <a:scrgbClr r="0" g="0" b="0"/>
+      </a:fillRef>
+      <a:effectRef idx="0">
+        <a:scrgbClr r="0" g="0" b="0"/>
+      </a:effectRef>
+      <a:fontRef idx="minor"/>
+    </dgm:style>
+  </dgm:styleLbl>
+  <dgm:styleLbl name="asst0">
+    <dgm:scene3d>
+      <a:camera prst="orthographicFront"/>
+      <a:lightRig rig="threePt" dir="t"/>
+    </dgm:scene3d>
+    <dgm:sp3d/>
+    <dgm:txPr/>
+    <dgm:style>
+      <a:lnRef idx="2">
+        <a:scrgbClr r="0" g="0" b="0"/>
+      </a:lnRef>
+      <a:fillRef idx="1">
+        <a:scrgbClr r="0" g="0" b="0"/>
+      </a:fillRef>
+      <a:effectRef idx="0">
+        <a:scrgbClr r="0" g="0" b="0"/>
+      </a:effectRef>
+      <a:fontRef idx="minor">
+        <a:schemeClr val="lt1"/>
+      </a:fontRef>
+    </dgm:style>
+  </dgm:styleLbl>
+  <dgm:styleLbl name="asst1">
+    <dgm:scene3d>
+      <a:camera prst="orthographicFront"/>
+      <a:lightRig rig="threePt" dir="t"/>
+    </dgm:scene3d>
+    <dgm:sp3d/>
+    <dgm:txPr/>
+    <dgm:style>
+      <a:lnRef idx="2">
+        <a:scrgbClr r="0" g="0" b="0"/>
+      </a:lnRef>
+      <a:fillRef idx="1">
+        <a:scrgbClr r="0" g="0" b="0"/>
+      </a:fillRef>
+      <a:effectRef idx="0">
+        <a:scrgbClr r="0" g="0" b="0"/>
+      </a:effectRef>
+      <a:fontRef idx="minor">
+        <a:schemeClr val="lt1"/>
+      </a:fontRef>
+    </dgm:style>
+  </dgm:styleLbl>
+  <dgm:styleLbl name="asst2">
+    <dgm:scene3d>
+      <a:camera prst="orthographicFront"/>
+      <a:lightRig rig="threePt" dir="t"/>
+    </dgm:scene3d>
+    <dgm:sp3d/>
+    <dgm:txPr/>
+    <dgm:style>
+      <a:lnRef idx="2">
+        <a:scrgbClr r="0" g="0" b="0"/>
+      </a:lnRef>
+      <a:fillRef idx="1">
+        <a:scrgbClr r="0" g="0" b="0"/>
+      </a:fillRef>
+      <a:effectRef idx="0">
+        <a:scrgbClr r="0" g="0" b="0"/>
+      </a:effectRef>
+      <a:fontRef idx="minor">
+        <a:schemeClr val="lt1"/>
+      </a:fontRef>
+    </dgm:style>
+  </dgm:styleLbl>
+  <dgm:styleLbl name="asst3">
+    <dgm:scene3d>
+      <a:camera prst="orthographicFront"/>
+      <a:lightRig rig="threePt" dir="t"/>
+    </dgm:scene3d>
+    <dgm:sp3d/>
+    <dgm:txPr/>
+    <dgm:style>
+      <a:lnRef idx="2">
+        <a:scrgbClr r="0" g="0" b="0"/>
+      </a:lnRef>
+      <a:fillRef idx="1">
+        <a:scrgbClr r="0" g="0" b="0"/>
+      </a:fillRef>
+      <a:effectRef idx="0">
+        <a:scrgbClr r="0" g="0" b="0"/>
+      </a:effectRef>
+      <a:fontRef idx="minor">
+        <a:schemeClr val="lt1"/>
+      </a:fontRef>
+    </dgm:style>
+  </dgm:styleLbl>
+  <dgm:styleLbl name="asst4">
+    <dgm:scene3d>
+      <a:camera prst="orthographicFront"/>
+      <a:lightRig rig="threePt" dir="t"/>
+    </dgm:scene3d>
+    <dgm:sp3d/>
+    <dgm:txPr/>
+    <dgm:style>
+      <a:lnRef idx="2">
+        <a:scrgbClr r="0" g="0" b="0"/>
+      </a:lnRef>
+      <a:fillRef idx="1">
+        <a:scrgbClr r="0" g="0" b="0"/>
+      </a:fillRef>
+      <a:effectRef idx="0">
+        <a:scrgbClr r="0" g="0" b="0"/>
+      </a:effectRef>
+      <a:fontRef idx="minor">
+        <a:schemeClr val="lt1"/>
+      </a:fontRef>
+    </dgm:style>
+  </dgm:styleLbl>
+  <dgm:styleLbl name="parChTrans2D1">
+    <dgm:scene3d>
+      <a:camera prst="orthographicFront"/>
+      <a:lightRig rig="threePt" dir="t"/>
+    </dgm:scene3d>
+    <dgm:sp3d/>
+    <dgm:txPr/>
+    <dgm:style>
+      <a:lnRef idx="2">
+        <a:scrgbClr r="0" g="0" b="0"/>
+      </a:lnRef>
+      <a:fillRef idx="1">
+        <a:scrgbClr r="0" g="0" b="0"/>
+      </a:fillRef>
+      <a:effectRef idx="0">
+        <a:scrgbClr r="0" g="0" b="0"/>
+      </a:effectRef>
+      <a:fontRef idx="minor">
+        <a:schemeClr val="lt1"/>
+      </a:fontRef>
+    </dgm:style>
+  </dgm:styleLbl>
+  <dgm:styleLbl name="parChTrans2D2">
+    <dgm:scene3d>
+      <a:camera prst="orthographicFront"/>
+      <a:lightRig rig="threePt" dir="t"/>
+    </dgm:scene3d>
+    <dgm:sp3d/>
+    <dgm:txPr/>
+    <dgm:style>
+      <a:lnRef idx="2">
+        <a:scrgbClr r="0" g="0" b="0"/>
+      </a:lnRef>
+      <a:fillRef idx="1">
+        <a:scrgbClr r="0" g="0" b="0"/>
+      </a:fillRef>
+      <a:effectRef idx="0">
+        <a:scrgbClr r="0" g="0" b="0"/>
+      </a:effectRef>
+      <a:fontRef idx="minor">
+        <a:schemeClr val="lt1"/>
+      </a:fontRef>
+    </dgm:style>
+  </dgm:styleLbl>
+  <dgm:styleLbl name="parChTrans2D3">
+    <dgm:scene3d>
+      <a:camera prst="orthographicFront"/>
+      <a:lightRig rig="threePt" dir="t"/>
+    </dgm:scene3d>
+    <dgm:sp3d/>
+    <dgm:txPr/>
+    <dgm:style>
+      <a:lnRef idx="2">
+        <a:scrgbClr r="0" g="0" b="0"/>
+      </a:lnRef>
+      <a:fillRef idx="1">
+        <a:scrgbClr r="0" g="0" b="0"/>
+      </a:fillRef>
+      <a:effectRef idx="0">
+        <a:scrgbClr r="0" g="0" b="0"/>
+      </a:effectRef>
+      <a:fontRef idx="minor">
+        <a:schemeClr val="lt1"/>
+      </a:fontRef>
+    </dgm:style>
+  </dgm:styleLbl>
+  <dgm:styleLbl name="parChTrans2D4">
+    <dgm:scene3d>
+      <a:camera prst="orthographicFront"/>
+      <a:lightRig rig="threePt" dir="t"/>
+    </dgm:scene3d>
+    <dgm:sp3d/>
+    <dgm:txPr/>
+    <dgm:style>
+      <a:lnRef idx="2">
+        <a:scrgbClr r="0" g="0" b="0"/>
+      </a:lnRef>
+      <a:fillRef idx="1">
+        <a:scrgbClr r="0" g="0" b="0"/>
+      </a:fillRef>
+      <a:effectRef idx="0">
+        <a:scrgbClr r="0" g="0" b="0"/>
+      </a:effectRef>
+      <a:fontRef idx="minor">
+        <a:schemeClr val="lt1"/>
+      </a:fontRef>
+    </dgm:style>
+  </dgm:styleLbl>
+  <dgm:styleLbl name="parChTrans1D1">
+    <dgm:scene3d>
+      <a:camera prst="orthographicFront"/>
+      <a:lightRig rig="threePt" dir="t"/>
+    </dgm:scene3d>
+    <dgm:sp3d/>
+    <dgm:txPr/>
+    <dgm:style>
+      <a:lnRef idx="2">
+        <a:scrgbClr r="0" g="0" b="0"/>
+      </a:lnRef>
+      <a:fillRef idx="0">
+        <a:scrgbClr r="0" g="0" b="0"/>
+      </a:fillRef>
+      <a:effectRef idx="0">
+        <a:scrgbClr r="0" g="0" b="0"/>
+      </a:effectRef>
+      <a:fontRef idx="minor"/>
+    </dgm:style>
+  </dgm:styleLbl>
+  <dgm:styleLbl name="parChTrans1D2">
+    <dgm:scene3d>
+      <a:camera prst="orthographicFront"/>
+      <a:lightRig rig="threePt" dir="t"/>
+    </dgm:scene3d>
+    <dgm:sp3d/>
+    <dgm:txPr/>
+    <dgm:style>
+      <a:lnRef idx="2">
+        <a:scrgbClr r="0" g="0" b="0"/>
+      </a:lnRef>
+      <a:fillRef idx="0">
+        <a:scrgbClr r="0" g="0" b="0"/>
+      </a:fillRef>
+      <a:effectRef idx="0">
+        <a:scrgbClr r="0" g="0" b="0"/>
+      </a:effectRef>
+      <a:fontRef idx="minor"/>
+    </dgm:style>
+  </dgm:styleLbl>
+  <dgm:styleLbl name="parChTrans1D3">
+    <dgm:scene3d>
+      <a:camera prst="orthographicFront"/>
+      <a:lightRig rig="threePt" dir="t"/>
+    </dgm:scene3d>
+    <dgm:sp3d/>
+    <dgm:txPr/>
+    <dgm:style>
+      <a:lnRef idx="2">
+        <a:scrgbClr r="0" g="0" b="0"/>
+      </a:lnRef>
+      <a:fillRef idx="0">
+        <a:scrgbClr r="0" g="0" b="0"/>
+      </a:fillRef>
+      <a:effectRef idx="0">
+        <a:scrgbClr r="0" g="0" b="0"/>
+      </a:effectRef>
+      <a:fontRef idx="minor"/>
+    </dgm:style>
+  </dgm:styleLbl>
+  <dgm:styleLbl name="parChTrans1D4">
+    <dgm:scene3d>
+      <a:camera prst="orthographicFront"/>
+      <a:lightRig rig="threePt" dir="t"/>
+    </dgm:scene3d>
+    <dgm:sp3d/>
+    <dgm:txPr/>
+    <dgm:style>
+      <a:lnRef idx="2">
+        <a:scrgbClr r="0" g="0" b="0"/>
+      </a:lnRef>
+      <a:fillRef idx="0">
+        <a:scrgbClr r="0" g="0" b="0"/>
+      </a:fillRef>
+      <a:effectRef idx="0">
+        <a:scrgbClr r="0" g="0" b="0"/>
+      </a:effectRef>
+      <a:fontRef idx="minor"/>
+    </dgm:style>
+  </dgm:styleLbl>
+  <dgm:styleLbl name="fgAcc1">
+    <dgm:scene3d>
+      <a:camera prst="orthographicFront"/>
+      <a:lightRig rig="threePt" dir="t"/>
+    </dgm:scene3d>
+    <dgm:sp3d/>
+    <dgm:txPr/>
+    <dgm:style>
+      <a:lnRef idx="2">
+        <a:scrgbClr r="0" g="0" b="0"/>
+      </a:lnRef>
+      <a:fillRef idx="1">
+        <a:scrgbClr r="0" g="0" b="0"/>
+      </a:fillRef>
+      <a:effectRef idx="0">
+        <a:scrgbClr r="0" g="0" b="0"/>
+      </a:effectRef>
+      <a:fontRef idx="minor"/>
+    </dgm:style>
+  </dgm:styleLbl>
+  <dgm:styleLbl name="conFgAcc1">
+    <dgm:scene3d>
+      <a:camera prst="orthographicFront"/>
+      <a:lightRig rig="threePt" dir="t"/>
+    </dgm:scene3d>
+    <dgm:sp3d/>
+    <dgm:txPr/>
+    <dgm:style>
+      <a:lnRef idx="2">
+        <a:scrgbClr r="0" g="0" b="0"/>
+      </a:lnRef>
+      <a:fillRef idx="1">
+        <a:scrgbClr r="0" g="0" b="0"/>
+      </a:fillRef>
+      <a:effectRef idx="0">
+        <a:scrgbClr r="0" g="0" b="0"/>
+      </a:effectRef>
+      <a:fontRef idx="minor"/>
+    </dgm:style>
+  </dgm:styleLbl>
+  <dgm:styleLbl name="alignAcc1">
+    <dgm:scene3d>
+      <a:camera prst="orthographicFront"/>
+      <a:lightRig rig="threePt" dir="t"/>
+    </dgm:scene3d>
+    <dgm:sp3d/>
+    <dgm:txPr/>
+    <dgm:style>
+      <a:lnRef idx="2">
+        <a:scrgbClr r="0" g="0" b="0"/>
+      </a:lnRef>
+      <a:fillRef idx="1">
+        <a:scrgbClr r="0" g="0" b="0"/>
+      </a:fillRef>
+      <a:effectRef idx="0">
+        <a:scrgbClr r="0" g="0" b="0"/>
+      </a:effectRef>
+      <a:fontRef idx="minor"/>
+    </dgm:style>
+  </dgm:styleLbl>
+  <dgm:styleLbl name="trAlignAcc1">
+    <dgm:scene3d>
+      <a:camera prst="orthographicFront"/>
+      <a:lightRig rig="threePt" dir="t"/>
+    </dgm:scene3d>
+    <dgm:sp3d/>
+    <dgm:txPr/>
+    <dgm:style>
+      <a:lnRef idx="1">
+        <a:scrgbClr r="0" g="0" b="0"/>
+      </a:lnRef>
+      <a:fillRef idx="1">
+        <a:scrgbClr r="0" g="0" b="0"/>
+      </a:fillRef>
+      <a:effectRef idx="0">
+        <a:scrgbClr r="0" g="0" b="0"/>
+      </a:effectRef>
+      <a:fontRef idx="minor"/>
+    </dgm:style>
+  </dgm:styleLbl>
+  <dgm:styleLbl name="bgAcc1">
+    <dgm:scene3d>
+      <a:camera prst="orthographicFront"/>
+      <a:lightRig rig="threePt" dir="t"/>
+    </dgm:scene3d>
+    <dgm:sp3d/>
+    <dgm:txPr/>
+    <dgm:style>
+      <a:lnRef idx="2">
+        <a:scrgbClr r="0" g="0" b="0"/>
+      </a:lnRef>
+      <a:fillRef idx="1">
+        <a:scrgbClr r="0" g="0" b="0"/>
+      </a:fillRef>
+      <a:effectRef idx="0">
+        <a:scrgbClr r="0" g="0" b="0"/>
+      </a:effectRef>
+      <a:fontRef idx="minor"/>
+    </dgm:style>
+  </dgm:styleLbl>
+  <dgm:styleLbl name="solidFgAcc1">
+    <dgm:scene3d>
+      <a:camera prst="orthographicFront"/>
+      <a:lightRig rig="threePt" dir="t"/>
+    </dgm:scene3d>
+    <dgm:sp3d/>
+    <dgm:txPr/>
+    <dgm:style>
+      <a:lnRef idx="2">
+        <a:scrgbClr r="0" g="0" b="0"/>
+      </a:lnRef>
+      <a:fillRef idx="1">
+        <a:scrgbClr r="0" g="0" b="0"/>
+      </a:fillRef>
+      <a:effectRef idx="0">
+        <a:scrgbClr r="0" g="0" b="0"/>
+      </a:effectRef>
+      <a:fontRef idx="minor"/>
+    </dgm:style>
+  </dgm:styleLbl>
+  <dgm:styleLbl name="solidAlignAcc1">
+    <dgm:scene3d>
+      <a:camera prst="orthographicFront"/>
+      <a:lightRig rig="threePt" dir="t"/>
+    </dgm:scene3d>
+    <dgm:sp3d/>
+    <dgm:txPr/>
+    <dgm:style>
+      <a:lnRef idx="2">
+        <a:scrgbClr r="0" g="0" b="0"/>
+      </a:lnRef>
+      <a:fillRef idx="1">
+        <a:scrgbClr r="0" g="0" b="0"/>
+      </a:fillRef>
+      <a:effectRef idx="0">
+        <a:scrgbClr r="0" g="0" b="0"/>
+      </a:effectRef>
+      <a:fontRef idx="minor"/>
+    </dgm:style>
+  </dgm:styleLbl>
+  <dgm:styleLbl name="solidBgAcc1">
+    <dgm:scene3d>
+      <a:camera prst="orthographicFront"/>
+      <a:lightRig rig="threePt" dir="t"/>
+    </dgm:scene3d>
+    <dgm:sp3d/>
+    <dgm:txPr/>
+    <dgm:style>
+      <a:lnRef idx="2">
+        <a:scrgbClr r="0" g="0" b="0"/>
+      </a:lnRef>
+      <a:fillRef idx="1">
+        <a:scrgbClr r="0" g="0" b="0"/>
+      </a:fillRef>
+      <a:effectRef idx="0">
+        <a:scrgbClr r="0" g="0" b="0"/>
+      </a:effectRef>
+      <a:fontRef idx="minor"/>
+    </dgm:style>
+  </dgm:styleLbl>
+  <dgm:styleLbl name="fgAccFollowNode1">
+    <dgm:scene3d>
+      <a:camera prst="orthographicFront"/>
+      <a:lightRig rig="threePt" dir="t"/>
+    </dgm:scene3d>
+    <dgm:sp3d/>
+    <dgm:txPr/>
+    <dgm:style>
+      <a:lnRef idx="2">
+        <a:scrgbClr r="0" g="0" b="0"/>
+      </a:lnRef>
+      <a:fillRef idx="1">
+        <a:scrgbClr r="0" g="0" b="0"/>
+      </a:fillRef>
+      <a:effectRef idx="0">
+        <a:scrgbClr r="0" g="0" b="0"/>
+      </a:effectRef>
+      <a:fontRef idx="minor"/>
+    </dgm:style>
+  </dgm:styleLbl>
+  <dgm:styleLbl name="alignAccFollowNode1">
+    <dgm:scene3d>
+      <a:camera prst="orthographicFront"/>
+      <a:lightRig rig="threePt" dir="t"/>
+    </dgm:scene3d>
+    <dgm:sp3d/>
+    <dgm:txPr/>
+    <dgm:style>
+      <a:lnRef idx="2">
+        <a:scrgbClr r="0" g="0" b="0"/>
+      </a:lnRef>
+      <a:fillRef idx="1">
+        <a:scrgbClr r="0" g="0" b="0"/>
+      </a:fillRef>
+      <a:effectRef idx="0">
+        <a:scrgbClr r="0" g="0" b="0"/>
+      </a:effectRef>
+      <a:fontRef idx="minor"/>
+    </dgm:style>
+  </dgm:styleLbl>
+  <dgm:styleLbl name="bgAccFollowNode1">
+    <dgm:scene3d>
+      <a:camera prst="orthographicFront"/>
+      <a:lightRig rig="threePt" dir="t"/>
+    </dgm:scene3d>
+    <dgm:sp3d/>
+    <dgm:txPr/>
+    <dgm:style>
+      <a:lnRef idx="2">
+        <a:scrgbClr r="0" g="0" b="0"/>
+      </a:lnRef>
+      <a:fillRef idx="1">
+        <a:scrgbClr r="0" g="0" b="0"/>
+      </a:fillRef>
+      <a:effectRef idx="0">
+        <a:scrgbClr r="0" g="0" b="0"/>
+      </a:effectRef>
+      <a:fontRef idx="minor"/>
+    </dgm:style>
+  </dgm:styleLbl>
+  <dgm:styleLbl name="fgAcc0">
+    <dgm:scene3d>
+      <a:camera prst="orthographicFront"/>
+      <a:lightRig rig="threePt" dir="t"/>
+    </dgm:scene3d>
+    <dgm:sp3d/>
+    <dgm:txPr/>
+    <dgm:style>
+      <a:lnRef idx="2">
+        <a:scrgbClr r="0" g="0" b="0"/>
+      </a:lnRef>
+      <a:fillRef idx="1">
+        <a:scrgbClr r="0" g="0" b="0"/>
+      </a:fillRef>
+      <a:effectRef idx="0">
+        <a:scrgbClr r="0" g="0" b="0"/>
+      </a:effectRef>
+      <a:fontRef idx="minor"/>
+    </dgm:style>
+  </dgm:styleLbl>
+  <dgm:styleLbl name="fgAcc2">
+    <dgm:scene3d>
+      <a:camera prst="orthographicFront"/>
+      <a:lightRig rig="threePt" dir="t"/>
+    </dgm:scene3d>
+    <dgm:sp3d/>
+    <dgm:txPr/>
+    <dgm:style>
+      <a:lnRef idx="2">
+        <a:scrgbClr r="0" g="0" b="0"/>
+      </a:lnRef>
+      <a:fillRef idx="1">
+        <a:scrgbClr r="0" g="0" b="0"/>
+      </a:fillRef>
+      <a:effectRef idx="0">
+        <a:scrgbClr r="0" g="0" b="0"/>
+      </a:effectRef>
+      <a:fontRef idx="minor"/>
+    </dgm:style>
+  </dgm:styleLbl>
+  <dgm:styleLbl name="fgAcc3">
+    <dgm:scene3d>
+      <a:camera prst="orthographicFront"/>
+      <a:lightRig rig="threePt" dir="t"/>
+    </dgm:scene3d>
+    <dgm:sp3d/>
+    <dgm:txPr/>
+    <dgm:style>
+      <a:lnRef idx="2">
+        <a:scrgbClr r="0" g="0" b="0"/>
+      </a:lnRef>
+      <a:fillRef idx="1">
+        <a:scrgbClr r="0" g="0" b="0"/>
+      </a:fillRef>
+      <a:effectRef idx="0">
+        <a:scrgbClr r="0" g="0" b="0"/>
+      </a:effectRef>
+      <a:fontRef idx="minor"/>
+    </dgm:style>
+  </dgm:styleLbl>
+  <dgm:styleLbl name="fgAcc4">
+    <dgm:scene3d>
+      <a:camera prst="orthographicFront"/>
+      <a:lightRig rig="threePt" dir="t"/>
+    </dgm:scene3d>
+    <dgm:sp3d/>
+    <dgm:txPr/>
+    <dgm:style>
+      <a:lnRef idx="2">
+        <a:scrgbClr r="0" g="0" b="0"/>
+      </a:lnRef>
+      <a:fillRef idx="1">
+        <a:scrgbClr r="0" g="0" b="0"/>
+      </a:fillRef>
+      <a:effectRef idx="0">
+        <a:scrgbClr r="0" g="0" b="0"/>
+      </a:effectRef>
+      <a:fontRef idx="minor"/>
+    </dgm:style>
+  </dgm:styleLbl>
+  <dgm:styleLbl name="bgShp">
+    <dgm:scene3d>
+      <a:camera prst="orthographicFront"/>
+      <a:lightRig rig="threePt" dir="t"/>
+    </dgm:scene3d>
+    <dgm:sp3d/>
+    <dgm:txPr/>
+    <dgm:style>
+      <a:lnRef idx="0">
+        <a:scrgbClr r="0" g="0" b="0"/>
+      </a:lnRef>
+      <a:fillRef idx="1">
+        <a:scrgbClr r="0" g="0" b="0"/>
+      </a:fillRef>
+      <a:effectRef idx="0">
+        <a:scrgbClr r="0" g="0" b="0"/>
+      </a:effectRef>
+      <a:fontRef idx="minor"/>
+    </dgm:style>
+  </dgm:styleLbl>
+  <dgm:styleLbl name="dkBgShp">
+    <dgm:scene3d>
+      <a:camera prst="orthographicFront"/>
+      <a:lightRig rig="threePt" dir="t"/>
+    </dgm:scene3d>
+    <dgm:sp3d/>
+    <dgm:txPr/>
+    <dgm:style>
+      <a:lnRef idx="0">
+        <a:scrgbClr r="0" g="0" b="0"/>
+      </a:lnRef>
+      <a:fillRef idx="1">
+        <a:scrgbClr r="0" g="0" b="0"/>
+      </a:fillRef>
+      <a:effectRef idx="0">
+        <a:scrgbClr r="0" g="0" b="0"/>
+      </a:effectRef>
+      <a:fontRef idx="minor"/>
+    </dgm:style>
+  </dgm:styleLbl>
+  <dgm:styleLbl name="trBgShp">
+    <dgm:scene3d>
+      <a:camera prst="orthographicFront"/>
+      <a:lightRig rig="threePt" dir="t"/>
+    </dgm:scene3d>
+    <dgm:sp3d/>
+    <dgm:txPr/>
+    <dgm:style>
+      <a:lnRef idx="0">
+        <a:scrgbClr r="0" g="0" b="0"/>
+      </a:lnRef>
+      <a:fillRef idx="1">
+        <a:scrgbClr r="0" g="0" b="0"/>
+      </a:fillRef>
+      <a:effectRef idx="0">
+        <a:scrgbClr r="0" g="0" b="0"/>
+      </a:effectRef>
+      <a:fontRef idx="minor"/>
+    </dgm:style>
+  </dgm:styleLbl>
+  <dgm:styleLbl name="fgShp">
+    <dgm:scene3d>
+      <a:camera prst="orthographicFront"/>
+      <a:lightRig rig="threePt" dir="t"/>
+    </dgm:scene3d>
+    <dgm:sp3d/>
+    <dgm:txPr/>
+    <dgm:style>
+      <a:lnRef idx="2">
+        <a:scrgbClr r="0" g="0" b="0"/>
+      </a:lnRef>
+      <a:fillRef idx="1">
+        <a:scrgbClr r="0" g="0" b="0"/>
+      </a:fillRef>
+      <a:effectRef idx="0">
+        <a:scrgbClr r="0" g="0" b="0"/>
+      </a:effectRef>
+      <a:fontRef idx="minor"/>
+    </dgm:style>
+  </dgm:styleLbl>
+  <dgm:styleLbl name="revTx">
+    <dgm:scene3d>
+      <a:camera prst="orthographicFront"/>
+      <a:lightRig rig="threePt" dir="t"/>
+    </dgm:scene3d>
+    <dgm:sp3d/>
+    <dgm:txPr/>
+    <dgm:style>
+      <a:lnRef idx="0">
+        <a:scrgbClr r="0" g="0" b="0"/>
+      </a:lnRef>
+      <a:fillRef idx="0">
+        <a:scrgbClr r="0" g="0" b="0"/>
+      </a:fillRef>
+      <a:effectRef idx="0">
+        <a:scrgbClr r="0" g="0" b="0"/>
+      </a:effectRef>
+      <a:fontRef idx="minor"/>
+    </dgm:style>
+  </dgm:styleLbl>
+</dgm:styleDef>
+</file>
+
+<file path=ppt/diagrams/quickStyle4.xml><?xml version="1.0" encoding="utf-8"?>
 <dgm:styleDef xmlns:dgm="http://schemas.openxmlformats.org/drawingml/2006/diagram" xmlns:a="http://schemas.openxmlformats.org/drawingml/2006/main" uniqueId="urn:microsoft.com/office/officeart/2005/8/quickstyle/simple1">
   <dgm:title val=""/>
   <dgm:desc val=""/>
@@ -15596,7 +18329,7 @@
           <a:p>
             <a:fld id="{5E64D5E2-E313-0149-A090-E605E7F1C794}" type="datetimeFigureOut">
               <a:rPr lang="en-US" smtClean="0"/>
-              <a:t>6/8/21</a:t>
+              <a:t>6/9/21</a:t>
             </a:fld>
             <a:endParaRPr lang="en-US"/>
           </a:p>
@@ -15773,7 +18506,7 @@
           <a:p>
             <a:fld id="{5E64D5E2-E313-0149-A090-E605E7F1C794}" type="datetimeFigureOut">
               <a:rPr lang="en-US" smtClean="0"/>
-              <a:t>6/8/21</a:t>
+              <a:t>6/9/21</a:t>
             </a:fld>
             <a:endParaRPr lang="en-US"/>
           </a:p>
@@ -15953,7 +18686,7 @@
           <a:p>
             <a:fld id="{5E64D5E2-E313-0149-A090-E605E7F1C794}" type="datetimeFigureOut">
               <a:rPr lang="en-US" smtClean="0"/>
-              <a:t>6/8/21</a:t>
+              <a:t>6/9/21</a:t>
             </a:fld>
             <a:endParaRPr lang="en-US"/>
           </a:p>
@@ -16123,7 +18856,7 @@
           <a:p>
             <a:fld id="{5E64D5E2-E313-0149-A090-E605E7F1C794}" type="datetimeFigureOut">
               <a:rPr lang="en-US" smtClean="0"/>
-              <a:t>6/8/21</a:t>
+              <a:t>6/9/21</a:t>
             </a:fld>
             <a:endParaRPr lang="en-US"/>
           </a:p>
@@ -16444,7 +19177,7 @@
           <a:p>
             <a:fld id="{5E64D5E2-E313-0149-A090-E605E7F1C794}" type="datetimeFigureOut">
               <a:rPr lang="en-US" smtClean="0"/>
-              <a:t>6/8/21</a:t>
+              <a:t>6/9/21</a:t>
             </a:fld>
             <a:endParaRPr lang="en-US"/>
           </a:p>
@@ -16904,7 +19637,7 @@
           <a:p>
             <a:fld id="{5E64D5E2-E313-0149-A090-E605E7F1C794}" type="datetimeFigureOut">
               <a:rPr lang="en-US" smtClean="0"/>
-              <a:t>6/8/21</a:t>
+              <a:t>6/9/21</a:t>
             </a:fld>
             <a:endParaRPr lang="en-US"/>
           </a:p>
@@ -17315,7 +20048,7 @@
           <a:p>
             <a:fld id="{5E64D5E2-E313-0149-A090-E605E7F1C794}" type="datetimeFigureOut">
               <a:rPr lang="en-US" smtClean="0"/>
-              <a:t>6/8/21</a:t>
+              <a:t>6/9/21</a:t>
             </a:fld>
             <a:endParaRPr lang="en-US"/>
           </a:p>
@@ -17433,7 +20166,7 @@
           <a:p>
             <a:fld id="{5E64D5E2-E313-0149-A090-E605E7F1C794}" type="datetimeFigureOut">
               <a:rPr lang="en-US" smtClean="0"/>
-              <a:t>6/8/21</a:t>
+              <a:t>6/9/21</a:t>
             </a:fld>
             <a:endParaRPr lang="en-US"/>
           </a:p>
@@ -17550,7 +20283,7 @@
           <a:p>
             <a:fld id="{5E64D5E2-E313-0149-A090-E605E7F1C794}" type="datetimeFigureOut">
               <a:rPr lang="en-US" smtClean="0"/>
-              <a:t>6/8/21</a:t>
+              <a:t>6/9/21</a:t>
             </a:fld>
             <a:endParaRPr lang="en-US"/>
           </a:p>
@@ -17908,7 +20641,7 @@
           <a:p>
             <a:fld id="{5E64D5E2-E313-0149-A090-E605E7F1C794}" type="datetimeFigureOut">
               <a:rPr lang="en-US" smtClean="0"/>
-              <a:t>6/8/21</a:t>
+              <a:t>6/9/21</a:t>
             </a:fld>
             <a:endParaRPr lang="en-US"/>
           </a:p>
@@ -18415,7 +21148,7 @@
           <a:p>
             <a:fld id="{5E64D5E2-E313-0149-A090-E605E7F1C794}" type="datetimeFigureOut">
               <a:rPr lang="en-US" smtClean="0"/>
-              <a:t>6/8/21</a:t>
+              <a:t>6/9/21</a:t>
             </a:fld>
             <a:endParaRPr lang="en-US"/>
           </a:p>
@@ -18770,7 +21503,7 @@
           <a:p>
             <a:fld id="{5E64D5E2-E313-0149-A090-E605E7F1C794}" type="datetimeFigureOut">
               <a:rPr lang="en-US" smtClean="0"/>
-              <a:t>6/8/21</a:t>
+              <a:t>6/9/21</a:t>
             </a:fld>
             <a:endParaRPr lang="en-US"/>
           </a:p>
@@ -19924,6 +22657,125 @@
 </file>
 
 <file path=ppt/slides/slide10.xml><?xml version="1.0" encoding="utf-8"?>
+<p:sld xmlns:a="http://schemas.openxmlformats.org/drawingml/2006/main" xmlns:r="http://schemas.openxmlformats.org/officeDocument/2006/relationships" xmlns:p="http://schemas.openxmlformats.org/presentationml/2006/main">
+  <p:cSld>
+    <p:spTree>
+      <p:nvGrpSpPr>
+        <p:cNvPr id="1" name=""/>
+        <p:cNvGrpSpPr/>
+        <p:nvPr/>
+      </p:nvGrpSpPr>
+      <p:grpSpPr>
+        <a:xfrm>
+          <a:off x="0" y="0"/>
+          <a:ext cx="0" cy="0"/>
+          <a:chOff x="0" y="0"/>
+          <a:chExt cx="0" cy="0"/>
+        </a:xfrm>
+      </p:grpSpPr>
+      <p:sp>
+        <p:nvSpPr>
+          <p:cNvPr id="2" name="Title 1">
+            <a:extLst>
+              <a:ext uri="{FF2B5EF4-FFF2-40B4-BE49-F238E27FC236}">
+                <a16:creationId xmlns:a16="http://schemas.microsoft.com/office/drawing/2014/main" id="{9B6F6FAD-1CB3-5247-9D59-845A5D2F51B4}"/>
+              </a:ext>
+            </a:extLst>
+          </p:cNvPr>
+          <p:cNvSpPr>
+            <a:spLocks noGrp="1"/>
+          </p:cNvSpPr>
+          <p:nvPr>
+            <p:ph type="title"/>
+          </p:nvPr>
+        </p:nvSpPr>
+        <p:spPr/>
+        <p:txBody>
+          <a:bodyPr/>
+          <a:lstStyle/>
+          <a:p>
+            <a:r>
+              <a:rPr lang="en-US" dirty="0"/>
+              <a:t>Off- chain Exclusion Criteria</a:t>
+            </a:r>
+          </a:p>
+        </p:txBody>
+      </p:sp>
+      <p:sp>
+        <p:nvSpPr>
+          <p:cNvPr id="3" name="Content Placeholder 2">
+            <a:extLst>
+              <a:ext uri="{FF2B5EF4-FFF2-40B4-BE49-F238E27FC236}">
+                <a16:creationId xmlns:a16="http://schemas.microsoft.com/office/drawing/2014/main" id="{AC0D552F-EF59-3E47-B773-C83D5ED6230D}"/>
+              </a:ext>
+            </a:extLst>
+          </p:cNvPr>
+          <p:cNvSpPr>
+            <a:spLocks noGrp="1"/>
+          </p:cNvSpPr>
+          <p:nvPr>
+            <p:ph idx="1"/>
+          </p:nvPr>
+        </p:nvSpPr>
+        <p:spPr/>
+        <p:txBody>
+          <a:bodyPr/>
+          <a:lstStyle/>
+          <a:p>
+            <a:r>
+              <a:rPr lang="en-US" dirty="0"/>
+              <a:t>Customers matched with Nexus PEP, Sanctions &amp; Watchlist/Blacklist</a:t>
+            </a:r>
+          </a:p>
+          <a:p>
+            <a:r>
+              <a:rPr lang="en-US" dirty="0"/>
+              <a:t>CC utilization &gt;90%</a:t>
+            </a:r>
+          </a:p>
+          <a:p>
+            <a:r>
+              <a:rPr lang="en-US" dirty="0"/>
+              <a:t>Red Flags in past 6 months transactions – Cash Advance, Excess Activity, Insufficient Funds,  Pawn shops, Overdraft,  Credit Counselling or Bankruptcy, &amp; Collections</a:t>
+            </a:r>
+          </a:p>
+          <a:p>
+            <a:r>
+              <a:rPr lang="en-US" dirty="0"/>
+              <a:t>Acct open less than 3/6 months</a:t>
+            </a:r>
+          </a:p>
+          <a:p>
+            <a:r>
+              <a:rPr lang="en-US" dirty="0">
+                <a:solidFill>
+                  <a:schemeClr val="accent4">
+                    <a:lumMod val="75000"/>
+                  </a:schemeClr>
+                </a:solidFill>
+              </a:rPr>
+              <a:t>Debt to Income ratio&gt; 7</a:t>
+            </a:r>
+          </a:p>
+          <a:p>
+            <a:endParaRPr lang="en-US" dirty="0"/>
+          </a:p>
+        </p:txBody>
+      </p:sp>
+    </p:spTree>
+    <p:extLst>
+      <p:ext uri="{BB962C8B-B14F-4D97-AF65-F5344CB8AC3E}">
+        <p14:creationId xmlns:p14="http://schemas.microsoft.com/office/powerpoint/2010/main" val="1633816787"/>
+      </p:ext>
+    </p:extLst>
+  </p:cSld>
+  <p:clrMapOvr>
+    <a:masterClrMapping/>
+  </p:clrMapOvr>
+</p:sld>
+</file>
+
+<file path=ppt/slides/slide11.xml><?xml version="1.0" encoding="utf-8"?>
 <p:sld xmlns:a="http://schemas.openxmlformats.org/drawingml/2006/main" xmlns:r="http://schemas.openxmlformats.org/officeDocument/2006/relationships" xmlns:p="http://schemas.openxmlformats.org/presentationml/2006/main">
   <p:cSld>
     <p:spTree>
@@ -22994,7 +25846,7 @@
 </p:sld>
 </file>
 
-<file path=ppt/slides/slide11.xml><?xml version="1.0" encoding="utf-8"?>
+<file path=ppt/slides/slide12.xml><?xml version="1.0" encoding="utf-8"?>
 <p:sld xmlns:a="http://schemas.openxmlformats.org/drawingml/2006/main" xmlns:r="http://schemas.openxmlformats.org/officeDocument/2006/relationships" xmlns:p="http://schemas.openxmlformats.org/presentationml/2006/main">
   <p:cSld>
     <p:bg>
@@ -23417,7 +26269,7 @@
 </p:sld>
 </file>
 
-<file path=ppt/slides/slide12.xml><?xml version="1.0" encoding="utf-8"?>
+<file path=ppt/slides/slide13.xml><?xml version="1.0" encoding="utf-8"?>
 <p:sld xmlns:a="http://schemas.openxmlformats.org/drawingml/2006/main" xmlns:r="http://schemas.openxmlformats.org/officeDocument/2006/relationships" xmlns:p="http://schemas.openxmlformats.org/presentationml/2006/main">
   <p:cSld>
     <p:spTree>
@@ -23500,7 +26352,7 @@
 </p:sld>
 </file>
 
-<file path=ppt/slides/slide13.xml><?xml version="1.0" encoding="utf-8"?>
+<file path=ppt/slides/slide14.xml><?xml version="1.0" encoding="utf-8"?>
 <p:sld xmlns:a="http://schemas.openxmlformats.org/drawingml/2006/main" xmlns:r="http://schemas.openxmlformats.org/officeDocument/2006/relationships" xmlns:p="http://schemas.openxmlformats.org/presentationml/2006/main">
   <p:cSld>
     <p:spTree>
@@ -27245,7 +30097,7 @@
 </p:sld>
 </file>
 
-<file path=ppt/slides/slide14.xml><?xml version="1.0" encoding="utf-8"?>
+<file path=ppt/slides/slide15.xml><?xml version="1.0" encoding="utf-8"?>
 <p:sld xmlns:a="http://schemas.openxmlformats.org/drawingml/2006/main" xmlns:r="http://schemas.openxmlformats.org/officeDocument/2006/relationships" xmlns:p="http://schemas.openxmlformats.org/presentationml/2006/main">
   <p:cSld>
     <p:spTree>
@@ -27292,6 +30144,41 @@
           </a:graphicData>
         </a:graphic>
       </p:graphicFrame>
+      <p:sp>
+        <p:nvSpPr>
+          <p:cNvPr id="2" name="TextBox 1">
+            <a:extLst>
+              <a:ext uri="{FF2B5EF4-FFF2-40B4-BE49-F238E27FC236}">
+                <a16:creationId xmlns:a16="http://schemas.microsoft.com/office/drawing/2014/main" id="{B047CCC4-43B1-F748-B699-9166FFAD1068}"/>
+              </a:ext>
+            </a:extLst>
+          </p:cNvPr>
+          <p:cNvSpPr txBox="1"/>
+          <p:nvPr/>
+        </p:nvSpPr>
+        <p:spPr>
+          <a:xfrm>
+            <a:off x="212651" y="6373369"/>
+            <a:ext cx="2541850" cy="307777"/>
+          </a:xfrm>
+          <a:prstGeom prst="rect">
+            <a:avLst/>
+          </a:prstGeom>
+          <a:noFill/>
+        </p:spPr>
+        <p:txBody>
+          <a:bodyPr wrap="none" rtlCol="0">
+            <a:spAutoFit/>
+          </a:bodyPr>
+          <a:lstStyle/>
+          <a:p>
+            <a:r>
+              <a:rPr lang="en-US" sz="1400" dirty="0"/>
+              <a:t>Source : Kaggle &amp; Chase 10K</a:t>
+            </a:r>
+          </a:p>
+        </p:txBody>
+      </p:sp>
     </p:spTree>
     <p:extLst>
       <p:ext uri="{BB962C8B-B14F-4D97-AF65-F5344CB8AC3E}">
@@ -29390,17 +32277,11 @@
             <a:avLst/>
           </a:prstGeom>
           <a:solidFill>
-            <a:schemeClr val="accent1">
-              <a:lumMod val="20000"/>
-              <a:lumOff val="80000"/>
-            </a:schemeClr>
+            <a:srgbClr val="92D050"/>
           </a:solidFill>
           <a:ln>
             <a:solidFill>
-              <a:schemeClr val="accent1">
-                <a:lumMod val="20000"/>
-                <a:lumOff val="80000"/>
-              </a:schemeClr>
+              <a:srgbClr val="92D050"/>
             </a:solidFill>
           </a:ln>
         </p:spPr>
@@ -30756,6 +33637,396 @@
           <p:cNvPr id="2" name="Title 1">
             <a:extLst>
               <a:ext uri="{FF2B5EF4-FFF2-40B4-BE49-F238E27FC236}">
+                <a16:creationId xmlns:a16="http://schemas.microsoft.com/office/drawing/2014/main" id="{B9FB7443-9A30-6D43-851C-C9A84919C164}"/>
+              </a:ext>
+            </a:extLst>
+          </p:cNvPr>
+          <p:cNvSpPr>
+            <a:spLocks noGrp="1"/>
+          </p:cNvSpPr>
+          <p:nvPr>
+            <p:ph type="title"/>
+          </p:nvPr>
+        </p:nvSpPr>
+        <p:spPr/>
+        <p:txBody>
+          <a:bodyPr/>
+          <a:lstStyle/>
+          <a:p>
+            <a:r>
+              <a:rPr lang="en-US" dirty="0"/>
+              <a:t>Off-chain Dilemma</a:t>
+            </a:r>
+          </a:p>
+        </p:txBody>
+      </p:sp>
+      <p:graphicFrame>
+        <p:nvGraphicFramePr>
+          <p:cNvPr id="4" name="Content Placeholder 3">
+            <a:extLst>
+              <a:ext uri="{FF2B5EF4-FFF2-40B4-BE49-F238E27FC236}">
+                <a16:creationId xmlns:a16="http://schemas.microsoft.com/office/drawing/2014/main" id="{C1A6A093-FB0B-6D4B-91E8-F958C3916E67}"/>
+              </a:ext>
+            </a:extLst>
+          </p:cNvPr>
+          <p:cNvGraphicFramePr>
+            <a:graphicFrameLocks noGrp="1"/>
+          </p:cNvGraphicFramePr>
+          <p:nvPr>
+            <p:ph idx="1"/>
+            <p:extLst>
+              <p:ext uri="{D42A27DB-BD31-4B8C-83A1-F6EECF244321}">
+                <p14:modId xmlns:p14="http://schemas.microsoft.com/office/powerpoint/2010/main" val="3504883994"/>
+              </p:ext>
+            </p:extLst>
+          </p:nvPr>
+        </p:nvGraphicFramePr>
+        <p:xfrm>
+          <a:off x="984914" y="1185235"/>
+          <a:ext cx="10058400" cy="4051300"/>
+        </p:xfrm>
+        <a:graphic>
+          <a:graphicData uri="http://schemas.openxmlformats.org/drawingml/2006/diagram">
+            <dgm:relIds xmlns:dgm="http://schemas.openxmlformats.org/drawingml/2006/diagram" xmlns:r="http://schemas.openxmlformats.org/officeDocument/2006/relationships" r:dm="rId2" r:lo="rId3" r:qs="rId4" r:cs="rId5"/>
+          </a:graphicData>
+        </a:graphic>
+      </p:graphicFrame>
+      <p:cxnSp>
+        <p:nvCxnSpPr>
+          <p:cNvPr id="13" name="Elbow Connector 12">
+            <a:extLst>
+              <a:ext uri="{FF2B5EF4-FFF2-40B4-BE49-F238E27FC236}">
+                <a16:creationId xmlns:a16="http://schemas.microsoft.com/office/drawing/2014/main" id="{5DC8CBC9-CEB8-6646-86CC-BE9F168CA505}"/>
+              </a:ext>
+            </a:extLst>
+          </p:cNvPr>
+          <p:cNvCxnSpPr>
+            <a:cxnSpLocks/>
+          </p:cNvCxnSpPr>
+          <p:nvPr/>
+        </p:nvCxnSpPr>
+        <p:spPr>
+          <a:xfrm>
+            <a:off x="1965278" y="3998794"/>
+            <a:ext cx="2596089" cy="1530136"/>
+          </a:xfrm>
+          <a:prstGeom prst="bentConnector3">
+            <a:avLst>
+              <a:gd name="adj1" fmla="val 1635"/>
+            </a:avLst>
+          </a:prstGeom>
+          <a:ln w="41275">
+            <a:solidFill>
+              <a:schemeClr val="tx2">
+                <a:lumMod val="60000"/>
+                <a:lumOff val="40000"/>
+              </a:schemeClr>
+            </a:solidFill>
+            <a:tailEnd type="triangle"/>
+          </a:ln>
+        </p:spPr>
+        <p:style>
+          <a:lnRef idx="1">
+            <a:schemeClr val="accent1"/>
+          </a:lnRef>
+          <a:fillRef idx="0">
+            <a:schemeClr val="accent1"/>
+          </a:fillRef>
+          <a:effectRef idx="0">
+            <a:schemeClr val="accent1"/>
+          </a:effectRef>
+          <a:fontRef idx="minor">
+            <a:schemeClr val="tx1"/>
+          </a:fontRef>
+        </p:style>
+      </p:cxnSp>
+      <p:cxnSp>
+        <p:nvCxnSpPr>
+          <p:cNvPr id="20" name="Elbow Connector 19">
+            <a:extLst>
+              <a:ext uri="{FF2B5EF4-FFF2-40B4-BE49-F238E27FC236}">
+                <a16:creationId xmlns:a16="http://schemas.microsoft.com/office/drawing/2014/main" id="{B002A8E1-A0DF-F84D-9E53-4A8B951C3938}"/>
+              </a:ext>
+            </a:extLst>
+          </p:cNvPr>
+          <p:cNvCxnSpPr>
+            <a:cxnSpLocks/>
+          </p:cNvCxnSpPr>
+          <p:nvPr/>
+        </p:nvCxnSpPr>
+        <p:spPr>
+          <a:xfrm rot="10800000" flipV="1">
+            <a:off x="7630635" y="3998794"/>
+            <a:ext cx="2199570" cy="1530136"/>
+          </a:xfrm>
+          <a:prstGeom prst="bentConnector3">
+            <a:avLst>
+              <a:gd name="adj1" fmla="val -879"/>
+            </a:avLst>
+          </a:prstGeom>
+          <a:ln w="41275">
+            <a:solidFill>
+              <a:schemeClr val="tx2">
+                <a:lumMod val="60000"/>
+                <a:lumOff val="40000"/>
+              </a:schemeClr>
+            </a:solidFill>
+            <a:tailEnd type="triangle"/>
+          </a:ln>
+        </p:spPr>
+        <p:style>
+          <a:lnRef idx="1">
+            <a:schemeClr val="accent1"/>
+          </a:lnRef>
+          <a:fillRef idx="0">
+            <a:schemeClr val="accent1"/>
+          </a:fillRef>
+          <a:effectRef idx="0">
+            <a:schemeClr val="accent1"/>
+          </a:effectRef>
+          <a:fontRef idx="minor">
+            <a:schemeClr val="tx1"/>
+          </a:fontRef>
+        </p:style>
+      </p:cxnSp>
+      <p:sp>
+        <p:nvSpPr>
+          <p:cNvPr id="26" name="TextBox 25">
+            <a:extLst>
+              <a:ext uri="{FF2B5EF4-FFF2-40B4-BE49-F238E27FC236}">
+                <a16:creationId xmlns:a16="http://schemas.microsoft.com/office/drawing/2014/main" id="{1CCC3185-39D9-5D45-A58F-08B2B0F65230}"/>
+              </a:ext>
+            </a:extLst>
+          </p:cNvPr>
+          <p:cNvSpPr txBox="1"/>
+          <p:nvPr/>
+        </p:nvSpPr>
+        <p:spPr>
+          <a:xfrm>
+            <a:off x="4804012" y="4995081"/>
+            <a:ext cx="2565779" cy="1477328"/>
+          </a:xfrm>
+          <a:prstGeom prst="rect">
+            <a:avLst/>
+          </a:prstGeom>
+          <a:noFill/>
+        </p:spPr>
+        <p:txBody>
+          <a:bodyPr wrap="square" rtlCol="0">
+            <a:spAutoFit/>
+          </a:bodyPr>
+          <a:lstStyle/>
+          <a:p>
+            <a:r>
+              <a:rPr lang="en-US" dirty="0"/>
+              <a:t>Both these systems should have like to like features &amp; they should be similar </a:t>
+            </a:r>
+            <a:r>
+              <a:rPr lang="en-US" dirty="0" err="1"/>
+              <a:t>i.e</a:t>
+            </a:r>
+            <a:r>
+              <a:rPr lang="en-US" dirty="0"/>
+              <a:t> x should match </a:t>
+            </a:r>
+          </a:p>
+        </p:txBody>
+      </p:sp>
+      <p:sp>
+        <p:nvSpPr>
+          <p:cNvPr id="27" name="TextBox 26">
+            <a:extLst>
+              <a:ext uri="{FF2B5EF4-FFF2-40B4-BE49-F238E27FC236}">
+                <a16:creationId xmlns:a16="http://schemas.microsoft.com/office/drawing/2014/main" id="{CDCFEC27-0AD6-DA4D-86FA-8DD8576276E1}"/>
+              </a:ext>
+            </a:extLst>
+          </p:cNvPr>
+          <p:cNvSpPr txBox="1"/>
+          <p:nvPr/>
+        </p:nvSpPr>
+        <p:spPr>
+          <a:xfrm>
+            <a:off x="173692" y="6050202"/>
+            <a:ext cx="3583172" cy="646331"/>
+          </a:xfrm>
+          <a:prstGeom prst="rect">
+            <a:avLst/>
+          </a:prstGeom>
+          <a:noFill/>
+        </p:spPr>
+        <p:txBody>
+          <a:bodyPr wrap="square" rtlCol="0">
+            <a:spAutoFit/>
+          </a:bodyPr>
+          <a:lstStyle/>
+          <a:p>
+            <a:r>
+              <a:rPr lang="en-US" dirty="0"/>
+              <a:t>Datasets available for ML build – Nexus, Kaggle</a:t>
+            </a:r>
+          </a:p>
+        </p:txBody>
+      </p:sp>
+      <mc:AlternateContent xmlns:mc="http://schemas.openxmlformats.org/markup-compatibility/2006">
+        <mc:Choice xmlns:a14="http://schemas.microsoft.com/office/drawing/2010/main" Requires="a14">
+          <p:sp>
+            <p:nvSpPr>
+              <p:cNvPr id="3" name="TextBox 2">
+                <a:extLst>
+                  <a:ext uri="{FF2B5EF4-FFF2-40B4-BE49-F238E27FC236}">
+                    <a16:creationId xmlns:a16="http://schemas.microsoft.com/office/drawing/2014/main" id="{A376978B-EB7B-0A41-8AB3-BAD989100F98}"/>
+                  </a:ext>
+                </a:extLst>
+              </p:cNvPr>
+              <p:cNvSpPr txBox="1"/>
+              <p:nvPr/>
+            </p:nvSpPr>
+            <p:spPr>
+              <a:xfrm>
+                <a:off x="4804012" y="2573413"/>
+                <a:ext cx="2373214" cy="276999"/>
+              </a:xfrm>
+              <a:prstGeom prst="rect">
+                <a:avLst/>
+              </a:prstGeom>
+              <a:noFill/>
+            </p:spPr>
+            <p:txBody>
+              <a:bodyPr wrap="none" lIns="0" tIns="0" rIns="0" bIns="0" rtlCol="0">
+                <a:spAutoFit/>
+              </a:bodyPr>
+              <a:lstStyle/>
+              <a:p>
+                <a14:m>
+                  <m:oMathPara xmlns:m="http://schemas.openxmlformats.org/officeDocument/2006/math">
+                    <m:oMathParaPr>
+                      <m:jc m:val="centerGroup"/>
+                    </m:oMathParaPr>
+                    <m:oMath xmlns:m="http://schemas.openxmlformats.org/officeDocument/2006/math">
+                      <m:r>
+                        <a:rPr lang="en-CA" b="0" i="1" smtClean="0">
+                          <a:latin typeface="Cambria Math" panose="02040503050406030204" pitchFamily="18" charset="0"/>
+                        </a:rPr>
+                        <m:t>𝑇𝑒𝑙𝑙𝑒𝑟</m:t>
+                      </m:r>
+                      <m:r>
+                        <a:rPr lang="en-CA" b="0" i="1" smtClean="0">
+                          <a:latin typeface="Cambria Math" panose="02040503050406030204" pitchFamily="18" charset="0"/>
+                        </a:rPr>
+                        <m:t> </m:t>
+                      </m:r>
+                      <m:r>
+                        <a:rPr lang="en-CA" b="0" i="1" smtClean="0">
+                          <a:latin typeface="Cambria Math" panose="02040503050406030204" pitchFamily="18" charset="0"/>
+                        </a:rPr>
+                        <m:t>𝑃𝑜𝑖𝑛𝑡𝑠</m:t>
+                      </m:r>
+                      <m:r>
+                        <a:rPr lang="en-CA" b="0" i="1" smtClean="0">
+                          <a:latin typeface="Cambria Math" panose="02040503050406030204" pitchFamily="18" charset="0"/>
+                        </a:rPr>
+                        <m:t>=2</m:t>
+                      </m:r>
+                      <m:r>
+                        <a:rPr lang="en-CA" b="0" i="1" smtClean="0">
+                          <a:latin typeface="Cambria Math" panose="02040503050406030204" pitchFamily="18" charset="0"/>
+                        </a:rPr>
+                        <m:t>𝑥</m:t>
+                      </m:r>
+                      <m:r>
+                        <a:rPr lang="en-CA" b="0" i="1" smtClean="0">
+                          <a:latin typeface="Cambria Math" panose="02040503050406030204" pitchFamily="18" charset="0"/>
+                        </a:rPr>
+                        <m:t>+5</m:t>
+                      </m:r>
+                    </m:oMath>
+                  </m:oMathPara>
+                </a14:m>
+                <a:endParaRPr lang="en-US" dirty="0"/>
+              </a:p>
+            </p:txBody>
+          </p:sp>
+        </mc:Choice>
+        <mc:Fallback>
+          <p:sp>
+            <p:nvSpPr>
+              <p:cNvPr id="3" name="TextBox 2">
+                <a:extLst>
+                  <a:ext uri="{FF2B5EF4-FFF2-40B4-BE49-F238E27FC236}">
+                    <a16:creationId xmlns:a16="http://schemas.microsoft.com/office/drawing/2014/main" id="{A376978B-EB7B-0A41-8AB3-BAD989100F98}"/>
+                  </a:ext>
+                </a:extLst>
+              </p:cNvPr>
+              <p:cNvSpPr txBox="1">
+                <a:spLocks noRot="1" noChangeAspect="1" noMove="1" noResize="1" noEditPoints="1" noAdjustHandles="1" noChangeArrowheads="1" noChangeShapeType="1" noTextEdit="1"/>
+              </p:cNvSpPr>
+              <p:nvPr/>
+            </p:nvSpPr>
+            <p:spPr>
+              <a:xfrm>
+                <a:off x="4804012" y="2573413"/>
+                <a:ext cx="2373214" cy="276999"/>
+              </a:xfrm>
+              <a:prstGeom prst="rect">
+                <a:avLst/>
+              </a:prstGeom>
+              <a:blipFill>
+                <a:blip r:embed="rId7"/>
+                <a:stretch>
+                  <a:fillRect l="-2139" t="-4348" r="-2139" b="-34783"/>
+                </a:stretch>
+              </a:blipFill>
+            </p:spPr>
+            <p:txBody>
+              <a:bodyPr/>
+              <a:lstStyle/>
+              <a:p>
+                <a:r>
+                  <a:rPr lang="en-US">
+                    <a:noFill/>
+                  </a:rPr>
+                  <a:t> </a:t>
+                </a:r>
+              </a:p>
+            </p:txBody>
+          </p:sp>
+        </mc:Fallback>
+      </mc:AlternateContent>
+    </p:spTree>
+    <p:extLst>
+      <p:ext uri="{BB962C8B-B14F-4D97-AF65-F5344CB8AC3E}">
+        <p14:creationId xmlns:p14="http://schemas.microsoft.com/office/powerpoint/2010/main" val="2157446705"/>
+      </p:ext>
+    </p:extLst>
+  </p:cSld>
+  <p:clrMapOvr>
+    <a:masterClrMapping/>
+  </p:clrMapOvr>
+</p:sld>
+</file>
+
+<file path=ppt/slides/slide6.xml><?xml version="1.0" encoding="utf-8"?>
+<p:sld xmlns:a="http://schemas.openxmlformats.org/drawingml/2006/main" xmlns:r="http://schemas.openxmlformats.org/officeDocument/2006/relationships" xmlns:p="http://schemas.openxmlformats.org/presentationml/2006/main">
+  <p:cSld>
+    <p:spTree>
+      <p:nvGrpSpPr>
+        <p:cNvPr id="1" name=""/>
+        <p:cNvGrpSpPr/>
+        <p:nvPr/>
+      </p:nvGrpSpPr>
+      <p:grpSpPr>
+        <a:xfrm>
+          <a:off x="0" y="0"/>
+          <a:ext cx="0" cy="0"/>
+          <a:chOff x="0" y="0"/>
+          <a:chExt cx="0" cy="0"/>
+        </a:xfrm>
+      </p:grpSpPr>
+      <p:sp>
+        <p:nvSpPr>
+          <p:cNvPr id="2" name="Title 1">
+            <a:extLst>
+              <a:ext uri="{FF2B5EF4-FFF2-40B4-BE49-F238E27FC236}">
                 <a16:creationId xmlns:a16="http://schemas.microsoft.com/office/drawing/2014/main" id="{DAF33D13-582B-C542-BC37-EC39D42EC1D2}"/>
               </a:ext>
             </a:extLst>
@@ -30906,6 +34177,40 @@
           </a:p>
         </p:txBody>
       </p:sp>
+      <p:sp>
+        <p:nvSpPr>
+          <p:cNvPr id="6" name="Rectangle 5">
+            <a:extLst>
+              <a:ext uri="{FF2B5EF4-FFF2-40B4-BE49-F238E27FC236}">
+                <a16:creationId xmlns:a16="http://schemas.microsoft.com/office/drawing/2014/main" id="{1792A1D2-00DB-CE49-8AAA-0689E56F5FE1}"/>
+              </a:ext>
+            </a:extLst>
+          </p:cNvPr>
+          <p:cNvSpPr/>
+          <p:nvPr/>
+        </p:nvSpPr>
+        <p:spPr>
+          <a:xfrm>
+            <a:off x="0" y="6488668"/>
+            <a:ext cx="3638560" cy="307777"/>
+          </a:xfrm>
+          <a:prstGeom prst="rect">
+            <a:avLst/>
+          </a:prstGeom>
+        </p:spPr>
+        <p:txBody>
+          <a:bodyPr wrap="none">
+            <a:spAutoFit/>
+          </a:bodyPr>
+          <a:lstStyle/>
+          <a:p>
+            <a:r>
+              <a:rPr lang="en-US" sz="1400" dirty="0"/>
+              <a:t>Source : Kaggle, Chase, Citi, &amp; TD 10k/10q</a:t>
+            </a:r>
+          </a:p>
+        </p:txBody>
+      </p:sp>
     </p:spTree>
     <p:extLst>
       <p:ext uri="{BB962C8B-B14F-4D97-AF65-F5344CB8AC3E}">
@@ -30919,7 +34224,7 @@
 </p:sld>
 </file>
 
-<file path=ppt/slides/slide6.xml><?xml version="1.0" encoding="utf-8"?>
+<file path=ppt/slides/slide7.xml><?xml version="1.0" encoding="utf-8"?>
 <p:sld xmlns:a="http://schemas.openxmlformats.org/drawingml/2006/main" xmlns:r="http://schemas.openxmlformats.org/officeDocument/2006/relationships" xmlns:p="http://schemas.openxmlformats.org/presentationml/2006/main">
   <p:cSld>
     <p:spTree>
@@ -30951,13 +34256,13 @@
           <p:nvPr>
             <p:extLst>
               <p:ext uri="{D42A27DB-BD31-4B8C-83A1-F6EECF244321}">
-                <p14:modId xmlns:p14="http://schemas.microsoft.com/office/powerpoint/2010/main" val="1971224842"/>
+                <p14:modId xmlns:p14="http://schemas.microsoft.com/office/powerpoint/2010/main" val="3189666804"/>
               </p:ext>
             </p:extLst>
           </p:nvPr>
         </p:nvGraphicFramePr>
         <p:xfrm>
-          <a:off x="134112" y="459073"/>
+          <a:off x="134112" y="278312"/>
           <a:ext cx="11461750" cy="6573838"/>
         </p:xfrm>
         <a:graphic>
@@ -31060,7 +34365,7 @@
         </p:nvSpPr>
         <p:spPr>
           <a:xfrm>
-            <a:off x="7825809" y="1355489"/>
+            <a:off x="7825809" y="1121563"/>
             <a:ext cx="1746912" cy="646331"/>
           </a:xfrm>
           <a:prstGeom prst="rect">
@@ -31116,6 +34421,40 @@
           </a:p>
         </p:txBody>
       </p:sp>
+      <p:sp>
+        <p:nvSpPr>
+          <p:cNvPr id="3" name="Rectangle 2">
+            <a:extLst>
+              <a:ext uri="{FF2B5EF4-FFF2-40B4-BE49-F238E27FC236}">
+                <a16:creationId xmlns:a16="http://schemas.microsoft.com/office/drawing/2014/main" id="{69EEE674-809E-1B40-80DE-0FE6720248DD}"/>
+              </a:ext>
+            </a:extLst>
+          </p:cNvPr>
+          <p:cNvSpPr/>
+          <p:nvPr/>
+        </p:nvSpPr>
+        <p:spPr>
+          <a:xfrm>
+            <a:off x="0" y="6488668"/>
+            <a:ext cx="3638560" cy="307777"/>
+          </a:xfrm>
+          <a:prstGeom prst="rect">
+            <a:avLst/>
+          </a:prstGeom>
+        </p:spPr>
+        <p:txBody>
+          <a:bodyPr wrap="none">
+            <a:spAutoFit/>
+          </a:bodyPr>
+          <a:lstStyle/>
+          <a:p>
+            <a:r>
+              <a:rPr lang="en-US" sz="1400" dirty="0"/>
+              <a:t>Source : Kaggle, Chase, Citi, &amp; TD 10k/10q</a:t>
+            </a:r>
+          </a:p>
+        </p:txBody>
+      </p:sp>
     </p:spTree>
     <p:extLst>
       <p:ext uri="{BB962C8B-B14F-4D97-AF65-F5344CB8AC3E}">
@@ -31126,13 +34465,13 @@
   <p:clrMapOvr>
     <a:masterClrMapping/>
   </p:clrMapOvr>
-  <mc:AlternateContent xmlns:mc="http://schemas.openxmlformats.org/markup-compatibility/2006">
-    <mc:Choice xmlns:p14="http://schemas.microsoft.com/office/powerpoint/2010/main" Requires="p14">
+  <mc:AlternateContent xmlns:mc="http://schemas.openxmlformats.org/markup-compatibility/2006" xmlns:p14="http://schemas.microsoft.com/office/powerpoint/2010/main">
+    <mc:Choice Requires="p14">
       <p:transition spd="med" p14:dur="700">
         <p:fade/>
       </p:transition>
     </mc:Choice>
-    <mc:Fallback>
+    <mc:Fallback xmlns="">
       <p:transition spd="med">
         <p:fade/>
       </p:transition>
@@ -31141,7 +34480,7 @@
 </p:sld>
 </file>
 
-<file path=ppt/slides/slide7.xml><?xml version="1.0" encoding="utf-8"?>
+<file path=ppt/slides/slide8.xml><?xml version="1.0" encoding="utf-8"?>
 <p:sld xmlns:a="http://schemas.openxmlformats.org/drawingml/2006/main" xmlns:r="http://schemas.openxmlformats.org/officeDocument/2006/relationships" xmlns:p="http://schemas.openxmlformats.org/presentationml/2006/main">
   <p:cSld>
     <p:spTree>
@@ -31203,13 +34542,13 @@
           <p:nvPr>
             <p:extLst>
               <p:ext uri="{D42A27DB-BD31-4B8C-83A1-F6EECF244321}">
-                <p14:modId xmlns:p14="http://schemas.microsoft.com/office/powerpoint/2010/main" val="4084609979"/>
+                <p14:modId xmlns:p14="http://schemas.microsoft.com/office/powerpoint/2010/main" val="509411198"/>
               </p:ext>
             </p:extLst>
           </p:nvPr>
         </p:nvGraphicFramePr>
         <p:xfrm>
-          <a:off x="-877824" y="423481"/>
+          <a:off x="-792763" y="423481"/>
           <a:ext cx="11461750" cy="6573838"/>
         </p:xfrm>
         <a:graphic>
@@ -31366,6 +34705,41 @@
           </a:p>
         </p:txBody>
       </p:sp>
+      <p:sp>
+        <p:nvSpPr>
+          <p:cNvPr id="8" name="TextBox 7">
+            <a:extLst>
+              <a:ext uri="{FF2B5EF4-FFF2-40B4-BE49-F238E27FC236}">
+                <a16:creationId xmlns:a16="http://schemas.microsoft.com/office/drawing/2014/main" id="{16715012-A317-5344-BA12-FE013365780F}"/>
+              </a:ext>
+            </a:extLst>
+          </p:cNvPr>
+          <p:cNvSpPr txBox="1"/>
+          <p:nvPr/>
+        </p:nvSpPr>
+        <p:spPr>
+          <a:xfrm>
+            <a:off x="125741" y="6550223"/>
+            <a:ext cx="3608039" cy="307777"/>
+          </a:xfrm>
+          <a:prstGeom prst="rect">
+            <a:avLst/>
+          </a:prstGeom>
+          <a:noFill/>
+        </p:spPr>
+        <p:txBody>
+          <a:bodyPr wrap="none" rtlCol="0">
+            <a:spAutoFit/>
+          </a:bodyPr>
+          <a:lstStyle/>
+          <a:p>
+            <a:r>
+              <a:rPr lang="en-US" sz="1400" dirty="0"/>
+              <a:t>Source : Kaggle, Chase, Citi, &amp; TD 10k/10q</a:t>
+            </a:r>
+          </a:p>
+        </p:txBody>
+      </p:sp>
     </p:spTree>
     <p:extLst>
       <p:ext uri="{BB962C8B-B14F-4D97-AF65-F5344CB8AC3E}">
@@ -31379,7 +34753,7 @@
 </p:sld>
 </file>
 
-<file path=ppt/slides/slide8.xml><?xml version="1.0" encoding="utf-8"?>
+<file path=ppt/slides/slide9.xml><?xml version="1.0" encoding="utf-8"?>
 <p:sld xmlns:a="http://schemas.openxmlformats.org/drawingml/2006/main" xmlns:r="http://schemas.openxmlformats.org/officeDocument/2006/relationships" xmlns:p="http://schemas.openxmlformats.org/presentationml/2006/main">
   <p:cSld>
     <p:spTree>
@@ -31475,127 +34849,524 @@
           </a:p>
         </p:txBody>
       </p:sp>
-      <p:pic>
-        <p:nvPicPr>
-          <p:cNvPr id="6" name="Picture 5" descr="Text, letter&#10;&#10;Description automatically generated">
+      <mc:AlternateContent xmlns:mc="http://schemas.openxmlformats.org/markup-compatibility/2006">
+        <mc:Choice xmlns:a14="http://schemas.microsoft.com/office/drawing/2010/main" Requires="a14">
+          <p:sp>
+            <p:nvSpPr>
+              <p:cNvPr id="5" name="TextBox 4">
+                <a:extLst>
+                  <a:ext uri="{FF2B5EF4-FFF2-40B4-BE49-F238E27FC236}">
+                    <a16:creationId xmlns:a16="http://schemas.microsoft.com/office/drawing/2014/main" id="{622F4DFB-93C8-2047-BFAE-E46FC2A8D251}"/>
+                  </a:ext>
+                </a:extLst>
+              </p:cNvPr>
+              <p:cNvSpPr txBox="1"/>
+              <p:nvPr/>
+            </p:nvSpPr>
+            <p:spPr>
+              <a:xfrm>
+                <a:off x="1063752" y="4235314"/>
+                <a:ext cx="7621024" cy="430887"/>
+              </a:xfrm>
+              <a:prstGeom prst="rect">
+                <a:avLst/>
+              </a:prstGeom>
+              <a:noFill/>
+            </p:spPr>
+            <p:txBody>
+              <a:bodyPr wrap="square" lIns="0" tIns="0" rIns="0" bIns="0" rtlCol="0">
+                <a:spAutoFit/>
+              </a:bodyPr>
+              <a:lstStyle/>
+              <a:p>
+                <a:pPr algn="ctr"/>
+                <a14:m>
+                  <m:oMath xmlns:m="http://schemas.openxmlformats.org/officeDocument/2006/math">
+                    <m:r>
+                      <a:rPr lang="en-CA" sz="1400" b="0" i="1" smtClean="0">
+                        <a:latin typeface="Cambria Math" panose="02040503050406030204" pitchFamily="18" charset="0"/>
+                      </a:rPr>
+                      <m:t>𝑇𝑒𝑙𝑙𝑒𝑟</m:t>
+                    </m:r>
+                    <m:r>
+                      <a:rPr lang="en-CA" sz="1400" b="0" i="1" smtClean="0">
+                        <a:latin typeface="Cambria Math" panose="02040503050406030204" pitchFamily="18" charset="0"/>
+                      </a:rPr>
+                      <m:t> </m:t>
+                    </m:r>
+                    <m:r>
+                      <a:rPr lang="en-CA" sz="1400" b="0" i="1" smtClean="0">
+                        <a:latin typeface="Cambria Math" panose="02040503050406030204" pitchFamily="18" charset="0"/>
+                      </a:rPr>
+                      <m:t>𝑃𝑜𝑖𝑛𝑡𝑠</m:t>
+                    </m:r>
+                    <m:r>
+                      <a:rPr lang="en-CA" sz="1400" b="0" i="1" smtClean="0">
+                        <a:latin typeface="Cambria Math" panose="02040503050406030204" pitchFamily="18" charset="0"/>
+                      </a:rPr>
+                      <m:t>=</m:t>
+                    </m:r>
+                    <m:r>
+                      <a:rPr lang="en-CA" sz="1400" b="0" i="1" smtClean="0">
+                        <a:latin typeface="Cambria Math" panose="02040503050406030204" pitchFamily="18" charset="0"/>
+                        <a:ea typeface="Cambria Math" panose="02040503050406030204" pitchFamily="18" charset="0"/>
+                      </a:rPr>
+                      <m:t>𝛽</m:t>
+                    </m:r>
+                    <m:r>
+                      <a:rPr lang="en-CA" sz="1400" b="0" i="1" smtClean="0">
+                        <a:latin typeface="Cambria Math" panose="02040503050406030204" pitchFamily="18" charset="0"/>
+                        <a:ea typeface="Cambria Math" panose="02040503050406030204" pitchFamily="18" charset="0"/>
+                      </a:rPr>
+                      <m:t>0+</m:t>
+                    </m:r>
+                    <m:r>
+                      <a:rPr lang="en-CA" sz="1400" i="1">
+                        <a:latin typeface="Cambria Math" panose="02040503050406030204" pitchFamily="18" charset="0"/>
+                        <a:ea typeface="Cambria Math" panose="02040503050406030204" pitchFamily="18" charset="0"/>
+                      </a:rPr>
+                      <m:t>𝛽</m:t>
+                    </m:r>
+                    <m:r>
+                      <a:rPr lang="en-CA" sz="1400" b="0" i="1" smtClean="0">
+                        <a:latin typeface="Cambria Math" panose="02040503050406030204" pitchFamily="18" charset="0"/>
+                        <a:ea typeface="Cambria Math" panose="02040503050406030204" pitchFamily="18" charset="0"/>
+                      </a:rPr>
+                      <m:t>1</m:t>
+                    </m:r>
+                    <m:r>
+                      <a:rPr lang="en-CA" sz="1400" b="0" i="1" smtClean="0">
+                        <a:latin typeface="Cambria Math" panose="02040503050406030204" pitchFamily="18" charset="0"/>
+                      </a:rPr>
+                      <m:t>∗</m:t>
+                    </m:r>
+                    <m:r>
+                      <a:rPr lang="en-CA" sz="1400" b="0" i="1" smtClean="0">
+                        <a:latin typeface="Cambria Math" panose="02040503050406030204" pitchFamily="18" charset="0"/>
+                      </a:rPr>
+                      <m:t>𝑛𝑜</m:t>
+                    </m:r>
+                    <m:r>
+                      <a:rPr lang="en-CA" sz="1400" b="0" i="1" smtClean="0">
+                        <a:latin typeface="Cambria Math" panose="02040503050406030204" pitchFamily="18" charset="0"/>
+                      </a:rPr>
+                      <m:t>.</m:t>
+                    </m:r>
+                    <m:r>
+                      <a:rPr lang="en-CA" sz="1400" b="0" i="1" smtClean="0">
+                        <a:latin typeface="Cambria Math" panose="02040503050406030204" pitchFamily="18" charset="0"/>
+                      </a:rPr>
+                      <m:t>𝑎𝑐𝑐𝑡𝑠</m:t>
+                    </m:r>
+                    <m:r>
+                      <a:rPr lang="en-CA" sz="1400" b="0" i="1" smtClean="0">
+                        <a:latin typeface="Cambria Math" panose="02040503050406030204" pitchFamily="18" charset="0"/>
+                      </a:rPr>
+                      <m:t>+</m:t>
+                    </m:r>
+                    <m:r>
+                      <a:rPr lang="en-CA" sz="1400" i="1">
+                        <a:latin typeface="Cambria Math" panose="02040503050406030204" pitchFamily="18" charset="0"/>
+                        <a:ea typeface="Cambria Math" panose="02040503050406030204" pitchFamily="18" charset="0"/>
+                      </a:rPr>
+                      <m:t>𝛽</m:t>
+                    </m:r>
+                    <m:r>
+                      <a:rPr lang="en-CA" sz="1400" b="0" i="1" smtClean="0">
+                        <a:latin typeface="Cambria Math" panose="02040503050406030204" pitchFamily="18" charset="0"/>
+                        <a:ea typeface="Cambria Math" panose="02040503050406030204" pitchFamily="18" charset="0"/>
+                      </a:rPr>
+                      <m:t>2</m:t>
+                    </m:r>
+                    <m:r>
+                      <a:rPr lang="en-CA" sz="1400" b="0" i="1" smtClean="0">
+                        <a:latin typeface="Cambria Math" panose="02040503050406030204" pitchFamily="18" charset="0"/>
+                      </a:rPr>
+                      <m:t>∗</m:t>
+                    </m:r>
+                    <m:r>
+                      <a:rPr lang="en-CA" sz="1400" b="0" i="1" smtClean="0">
+                        <a:latin typeface="Cambria Math" panose="02040503050406030204" pitchFamily="18" charset="0"/>
+                      </a:rPr>
+                      <m:t>𝑐𝑐</m:t>
+                    </m:r>
+                    <m:r>
+                      <a:rPr lang="en-CA" sz="1400" b="0" i="1" smtClean="0">
+                        <a:latin typeface="Cambria Math" panose="02040503050406030204" pitchFamily="18" charset="0"/>
+                      </a:rPr>
+                      <m:t> </m:t>
+                    </m:r>
+                    <m:r>
+                      <a:rPr lang="en-CA" sz="1400" b="0" i="1" smtClean="0">
+                        <a:latin typeface="Cambria Math" panose="02040503050406030204" pitchFamily="18" charset="0"/>
+                      </a:rPr>
+                      <m:t>𝑢𝑡𝑖𝑙𝑖𝑧𝑎𝑡𝑖𝑜𝑛</m:t>
+                    </m:r>
+                    <m:r>
+                      <a:rPr lang="en-CA" sz="1400" b="0" i="1" smtClean="0">
+                        <a:latin typeface="Cambria Math" panose="02040503050406030204" pitchFamily="18" charset="0"/>
+                      </a:rPr>
+                      <m:t>%</m:t>
+                    </m:r>
+                  </m:oMath>
+                </a14:m>
+                <a:r>
+                  <a:rPr lang="en-US" sz="1400" dirty="0"/>
+                  <a:t>+</a:t>
+                </a:r>
+                <a:r>
+                  <a:rPr lang="en-CA" sz="1400" dirty="0">
+                    <a:ea typeface="Cambria Math" panose="02040503050406030204" pitchFamily="18" charset="0"/>
+                  </a:rPr>
+                  <a:t> </a:t>
+                </a:r>
+                <a14:m>
+                  <m:oMath xmlns:m="http://schemas.openxmlformats.org/officeDocument/2006/math">
+                    <m:r>
+                      <a:rPr lang="en-CA" sz="1400" i="1">
+                        <a:latin typeface="Cambria Math" panose="02040503050406030204" pitchFamily="18" charset="0"/>
+                        <a:ea typeface="Cambria Math" panose="02040503050406030204" pitchFamily="18" charset="0"/>
+                      </a:rPr>
+                      <m:t>𝛽</m:t>
+                    </m:r>
+                    <m:r>
+                      <a:rPr lang="en-CA" sz="1400" b="0" i="1" smtClean="0">
+                        <a:latin typeface="Cambria Math" panose="02040503050406030204" pitchFamily="18" charset="0"/>
+                        <a:ea typeface="Cambria Math" panose="02040503050406030204" pitchFamily="18" charset="0"/>
+                      </a:rPr>
+                      <m:t>3∗#</m:t>
+                    </m:r>
+                    <m:r>
+                      <a:rPr lang="en-CA" sz="1400" b="0" i="1" smtClean="0">
+                        <a:latin typeface="Cambria Math" panose="02040503050406030204" pitchFamily="18" charset="0"/>
+                        <a:ea typeface="Cambria Math" panose="02040503050406030204" pitchFamily="18" charset="0"/>
+                      </a:rPr>
+                      <m:t>𝑎𝑐𝑡𝑖𝑣𝑒</m:t>
+                    </m:r>
+                    <m:r>
+                      <a:rPr lang="en-CA" sz="1400" b="0" i="1" smtClean="0">
+                        <a:latin typeface="Cambria Math" panose="02040503050406030204" pitchFamily="18" charset="0"/>
+                        <a:ea typeface="Cambria Math" panose="02040503050406030204" pitchFamily="18" charset="0"/>
+                      </a:rPr>
+                      <m:t> </m:t>
+                    </m:r>
+                    <m:r>
+                      <a:rPr lang="en-CA" sz="1400" b="0" i="1" smtClean="0">
+                        <a:latin typeface="Cambria Math" panose="02040503050406030204" pitchFamily="18" charset="0"/>
+                        <a:ea typeface="Cambria Math" panose="02040503050406030204" pitchFamily="18" charset="0"/>
+                      </a:rPr>
+                      <m:t>𝑑𝑎𝑦𝑠</m:t>
+                    </m:r>
+                    <m:r>
+                      <a:rPr lang="en-CA" sz="1400" b="0" i="1" smtClean="0">
+                        <a:latin typeface="Cambria Math" panose="02040503050406030204" pitchFamily="18" charset="0"/>
+                        <a:ea typeface="Cambria Math" panose="02040503050406030204" pitchFamily="18" charset="0"/>
+                      </a:rPr>
+                      <m:t>+</m:t>
+                    </m:r>
+                    <m:r>
+                      <a:rPr lang="en-CA" sz="1400" i="1">
+                        <a:latin typeface="Cambria Math" panose="02040503050406030204" pitchFamily="18" charset="0"/>
+                        <a:ea typeface="Cambria Math" panose="02040503050406030204" pitchFamily="18" charset="0"/>
+                      </a:rPr>
+                      <m:t>𝛽</m:t>
+                    </m:r>
+                    <m:r>
+                      <a:rPr lang="en-CA" sz="1400" b="0" i="1" smtClean="0">
+                        <a:latin typeface="Cambria Math" panose="02040503050406030204" pitchFamily="18" charset="0"/>
+                        <a:ea typeface="Cambria Math" panose="02040503050406030204" pitchFamily="18" charset="0"/>
+                      </a:rPr>
+                      <m:t>4∗</m:t>
+                    </m:r>
+                    <m:r>
+                      <a:rPr lang="en-CA" sz="1400" b="0" i="1" smtClean="0">
+                        <a:latin typeface="Cambria Math" panose="02040503050406030204" pitchFamily="18" charset="0"/>
+                        <a:ea typeface="Cambria Math" panose="02040503050406030204" pitchFamily="18" charset="0"/>
+                      </a:rPr>
+                      <m:t>𝐷𝑒𝑏𝑡</m:t>
+                    </m:r>
+                    <m:r>
+                      <a:rPr lang="en-CA" sz="1400" b="0" i="1" smtClean="0">
+                        <a:latin typeface="Cambria Math" panose="02040503050406030204" pitchFamily="18" charset="0"/>
+                        <a:ea typeface="Cambria Math" panose="02040503050406030204" pitchFamily="18" charset="0"/>
+                      </a:rPr>
+                      <m:t> </m:t>
+                    </m:r>
+                    <m:r>
+                      <a:rPr lang="en-CA" sz="1400" b="0" i="1" smtClean="0">
+                        <a:latin typeface="Cambria Math" panose="02040503050406030204" pitchFamily="18" charset="0"/>
+                        <a:ea typeface="Cambria Math" panose="02040503050406030204" pitchFamily="18" charset="0"/>
+                      </a:rPr>
+                      <m:t>𝑡𝑜</m:t>
+                    </m:r>
+                    <m:r>
+                      <a:rPr lang="en-CA" sz="1400" b="0" i="1" smtClean="0">
+                        <a:latin typeface="Cambria Math" panose="02040503050406030204" pitchFamily="18" charset="0"/>
+                        <a:ea typeface="Cambria Math" panose="02040503050406030204" pitchFamily="18" charset="0"/>
+                      </a:rPr>
+                      <m:t> </m:t>
+                    </m:r>
+                    <m:r>
+                      <a:rPr lang="en-CA" sz="1400" b="0" i="1" smtClean="0">
+                        <a:latin typeface="Cambria Math" panose="02040503050406030204" pitchFamily="18" charset="0"/>
+                        <a:ea typeface="Cambria Math" panose="02040503050406030204" pitchFamily="18" charset="0"/>
+                      </a:rPr>
+                      <m:t>𝐴𝑠𝑠𝑒𝑡</m:t>
+                    </m:r>
+                    <m:r>
+                      <a:rPr lang="en-CA" sz="1400" b="0" i="1" smtClean="0">
+                        <a:latin typeface="Cambria Math" panose="02040503050406030204" pitchFamily="18" charset="0"/>
+                        <a:ea typeface="Cambria Math" panose="02040503050406030204" pitchFamily="18" charset="0"/>
+                      </a:rPr>
+                      <m:t> </m:t>
+                    </m:r>
+                    <m:r>
+                      <a:rPr lang="en-CA" sz="1400" b="0" i="1" smtClean="0">
+                        <a:latin typeface="Cambria Math" panose="02040503050406030204" pitchFamily="18" charset="0"/>
+                        <a:ea typeface="Cambria Math" panose="02040503050406030204" pitchFamily="18" charset="0"/>
+                      </a:rPr>
+                      <m:t>𝑅𝑎𝑡𝑖𝑜</m:t>
+                    </m:r>
+                    <m:r>
+                      <a:rPr lang="en-CA" sz="1400" b="0" i="1" smtClean="0">
+                        <a:latin typeface="Cambria Math" panose="02040503050406030204" pitchFamily="18" charset="0"/>
+                        <a:ea typeface="Cambria Math" panose="02040503050406030204" pitchFamily="18" charset="0"/>
+                      </a:rPr>
+                      <m:t>+</m:t>
+                    </m:r>
+                    <m:r>
+                      <a:rPr lang="en-CA" sz="1400" i="1">
+                        <a:latin typeface="Cambria Math" panose="02040503050406030204" pitchFamily="18" charset="0"/>
+                        <a:ea typeface="Cambria Math" panose="02040503050406030204" pitchFamily="18" charset="0"/>
+                      </a:rPr>
+                      <m:t>𝛽</m:t>
+                    </m:r>
+                    <m:r>
+                      <a:rPr lang="en-CA" sz="1400" b="0" i="1" smtClean="0">
+                        <a:latin typeface="Cambria Math" panose="02040503050406030204" pitchFamily="18" charset="0"/>
+                        <a:ea typeface="Cambria Math" panose="02040503050406030204" pitchFamily="18" charset="0"/>
+                      </a:rPr>
+                      <m:t>5∗%</m:t>
+                    </m:r>
+                    <m:r>
+                      <a:rPr lang="en-CA" sz="1400" b="0" i="1" smtClean="0">
+                        <a:latin typeface="Cambria Math" panose="02040503050406030204" pitchFamily="18" charset="0"/>
+                        <a:ea typeface="Cambria Math" panose="02040503050406030204" pitchFamily="18" charset="0"/>
+                      </a:rPr>
+                      <m:t>𝑟𝑖𝑠𝑘𝑦</m:t>
+                    </m:r>
+                    <m:r>
+                      <a:rPr lang="en-CA" sz="1400" b="0" i="1" smtClean="0">
+                        <a:latin typeface="Cambria Math" panose="02040503050406030204" pitchFamily="18" charset="0"/>
+                        <a:ea typeface="Cambria Math" panose="02040503050406030204" pitchFamily="18" charset="0"/>
+                      </a:rPr>
+                      <m:t> </m:t>
+                    </m:r>
+                    <m:r>
+                      <a:rPr lang="en-CA" sz="1400" b="0" i="1" smtClean="0">
+                        <a:latin typeface="Cambria Math" panose="02040503050406030204" pitchFamily="18" charset="0"/>
+                        <a:ea typeface="Cambria Math" panose="02040503050406030204" pitchFamily="18" charset="0"/>
+                      </a:rPr>
+                      <m:t>𝑡𝑟𝑎𝑛𝑠𝑎𝑐𝑡𝑖𝑜𝑛</m:t>
+                    </m:r>
+                    <m:r>
+                      <a:rPr lang="en-CA" sz="1400" b="0" i="1" smtClean="0">
+                        <a:latin typeface="Cambria Math" panose="02040503050406030204" pitchFamily="18" charset="0"/>
+                        <a:ea typeface="Cambria Math" panose="02040503050406030204" pitchFamily="18" charset="0"/>
+                      </a:rPr>
+                      <m:t> </m:t>
+                    </m:r>
+                    <m:r>
+                      <a:rPr lang="en-CA" sz="1400" b="0" i="1" smtClean="0">
+                        <a:latin typeface="Cambria Math" panose="02040503050406030204" pitchFamily="18" charset="0"/>
+                        <a:ea typeface="Cambria Math" panose="02040503050406030204" pitchFamily="18" charset="0"/>
+                      </a:rPr>
+                      <m:t>𝑉𝑜𝑙</m:t>
+                    </m:r>
+                    <m:r>
+                      <a:rPr lang="en-CA" sz="1400" b="0" i="1" smtClean="0">
+                        <a:latin typeface="Cambria Math" panose="02040503050406030204" pitchFamily="18" charset="0"/>
+                        <a:ea typeface="Cambria Math" panose="02040503050406030204" pitchFamily="18" charset="0"/>
+                      </a:rPr>
+                      <m:t>+</m:t>
+                    </m:r>
+                  </m:oMath>
+                </a14:m>
+                <a:r>
+                  <a:rPr lang="en-CA" sz="1400" dirty="0">
+                    <a:ea typeface="Cambria Math" panose="02040503050406030204" pitchFamily="18" charset="0"/>
+                  </a:rPr>
+                  <a:t> </a:t>
+                </a:r>
+                <a14:m>
+                  <m:oMath xmlns:m="http://schemas.openxmlformats.org/officeDocument/2006/math">
+                    <m:r>
+                      <a:rPr lang="en-CA" sz="1400" i="1">
+                        <a:latin typeface="Cambria Math" panose="02040503050406030204" pitchFamily="18" charset="0"/>
+                        <a:ea typeface="Cambria Math" panose="02040503050406030204" pitchFamily="18" charset="0"/>
+                      </a:rPr>
+                      <m:t>𝛽</m:t>
+                    </m:r>
+                    <m:r>
+                      <a:rPr lang="en-CA" sz="1400" b="0" i="1" smtClean="0">
+                        <a:latin typeface="Cambria Math" panose="02040503050406030204" pitchFamily="18" charset="0"/>
+                        <a:ea typeface="Cambria Math" panose="02040503050406030204" pitchFamily="18" charset="0"/>
+                      </a:rPr>
+                      <m:t>6∗</m:t>
+                    </m:r>
+                    <m:r>
+                      <a:rPr lang="en-CA" sz="1400" b="0" i="1" smtClean="0">
+                        <a:latin typeface="Cambria Math" panose="02040503050406030204" pitchFamily="18" charset="0"/>
+                        <a:ea typeface="Cambria Math" panose="02040503050406030204" pitchFamily="18" charset="0"/>
+                      </a:rPr>
+                      <m:t>𝐶𝑟𝑒𝑑𝑖𝑡</m:t>
+                    </m:r>
+                    <m:r>
+                      <a:rPr lang="en-CA" sz="1400" b="0" i="1" smtClean="0">
+                        <a:latin typeface="Cambria Math" panose="02040503050406030204" pitchFamily="18" charset="0"/>
+                        <a:ea typeface="Cambria Math" panose="02040503050406030204" pitchFamily="18" charset="0"/>
+                      </a:rPr>
+                      <m:t> </m:t>
+                    </m:r>
+                    <m:r>
+                      <a:rPr lang="en-CA" sz="1400" b="0" i="1" smtClean="0">
+                        <a:latin typeface="Cambria Math" panose="02040503050406030204" pitchFamily="18" charset="0"/>
+                        <a:ea typeface="Cambria Math" panose="02040503050406030204" pitchFamily="18" charset="0"/>
+                      </a:rPr>
+                      <m:t>𝑆𝑐𝑜𝑟𝑒</m:t>
+                    </m:r>
+                  </m:oMath>
+                </a14:m>
+                <a:endParaRPr lang="en-US" sz="1400" dirty="0"/>
+              </a:p>
+            </p:txBody>
+          </p:sp>
+        </mc:Choice>
+        <mc:Fallback>
+          <p:sp>
+            <p:nvSpPr>
+              <p:cNvPr id="5" name="TextBox 4">
+                <a:extLst>
+                  <a:ext uri="{FF2B5EF4-FFF2-40B4-BE49-F238E27FC236}">
+                    <a16:creationId xmlns:a16="http://schemas.microsoft.com/office/drawing/2014/main" id="{622F4DFB-93C8-2047-BFAE-E46FC2A8D251}"/>
+                  </a:ext>
+                </a:extLst>
+              </p:cNvPr>
+              <p:cNvSpPr txBox="1">
+                <a:spLocks noRot="1" noChangeAspect="1" noMove="1" noResize="1" noEditPoints="1" noAdjustHandles="1" noChangeArrowheads="1" noChangeShapeType="1" noTextEdit="1"/>
+              </p:cNvSpPr>
+              <p:nvPr/>
+            </p:nvSpPr>
+            <p:spPr>
+              <a:xfrm>
+                <a:off x="1063752" y="4235314"/>
+                <a:ext cx="7621024" cy="430887"/>
+              </a:xfrm>
+              <a:prstGeom prst="rect">
+                <a:avLst/>
+              </a:prstGeom>
+              <a:blipFill>
+                <a:blip r:embed="rId2"/>
+                <a:stretch>
+                  <a:fillRect t="-14286" b="-17143"/>
+                </a:stretch>
+              </a:blipFill>
+            </p:spPr>
+            <p:txBody>
+              <a:bodyPr/>
+              <a:lstStyle/>
+              <a:p>
+                <a:r>
+                  <a:rPr lang="en-US">
+                    <a:noFill/>
+                  </a:rPr>
+                  <a:t> </a:t>
+                </a:r>
+              </a:p>
+            </p:txBody>
+          </p:sp>
+        </mc:Fallback>
+      </mc:AlternateContent>
+      <p:sp>
+        <p:nvSpPr>
+          <p:cNvPr id="4" name="TextBox 3">
             <a:extLst>
               <a:ext uri="{FF2B5EF4-FFF2-40B4-BE49-F238E27FC236}">
-                <a16:creationId xmlns:a16="http://schemas.microsoft.com/office/drawing/2014/main" id="{CB76EA4C-FB86-DC4D-89BC-C3C4BCE5932B}"/>
+                <a16:creationId xmlns:a16="http://schemas.microsoft.com/office/drawing/2014/main" id="{5D6956C3-CCE8-3340-A18E-EC35275FE5B3}"/>
               </a:ext>
             </a:extLst>
           </p:cNvPr>
-          <p:cNvPicPr>
-            <a:picLocks noChangeAspect="1"/>
-          </p:cNvPicPr>
+          <p:cNvSpPr txBox="1"/>
           <p:nvPr/>
-        </p:nvPicPr>
-        <p:blipFill>
-          <a:blip r:embed="rId2"/>
-          <a:stretch>
-            <a:fillRect/>
-          </a:stretch>
-        </p:blipFill>
+        </p:nvSpPr>
         <p:spPr>
           <a:xfrm>
-            <a:off x="914399" y="4270445"/>
-            <a:ext cx="6273595" cy="1929187"/>
+            <a:off x="1063752" y="5087568"/>
+            <a:ext cx="8898466" cy="523220"/>
           </a:xfrm>
           <a:prstGeom prst="rect">
             <a:avLst/>
           </a:prstGeom>
+          <a:noFill/>
         </p:spPr>
-      </p:pic>
+        <p:txBody>
+          <a:bodyPr wrap="square" rtlCol="0">
+            <a:spAutoFit/>
+          </a:bodyPr>
+          <a:lstStyle/>
+          <a:p>
+            <a:r>
+              <a:rPr lang="en-US" sz="1400" dirty="0"/>
+              <a:t>Features in the algo will be picked by the team &amp; will not be selected by standard model building process to make sure those features are available in both the back-end &amp; front-end datasets</a:t>
+            </a:r>
+          </a:p>
+        </p:txBody>
+      </p:sp>
+      <p:cxnSp>
+        <p:nvCxnSpPr>
+          <p:cNvPr id="8" name="Straight Arrow Connector 7">
+            <a:extLst>
+              <a:ext uri="{FF2B5EF4-FFF2-40B4-BE49-F238E27FC236}">
+                <a16:creationId xmlns:a16="http://schemas.microsoft.com/office/drawing/2014/main" id="{58E87CC0-95A0-E74D-8F0D-C9B125A93D89}"/>
+              </a:ext>
+            </a:extLst>
+          </p:cNvPr>
+          <p:cNvCxnSpPr>
+            <a:stCxn id="5" idx="2"/>
+          </p:cNvCxnSpPr>
+          <p:nvPr/>
+        </p:nvCxnSpPr>
+        <p:spPr>
+          <a:xfrm>
+            <a:off x="4874264" y="4666201"/>
+            <a:ext cx="0" cy="362999"/>
+          </a:xfrm>
+          <a:prstGeom prst="straightConnector1">
+            <a:avLst/>
+          </a:prstGeom>
+          <a:ln>
+            <a:tailEnd type="triangle"/>
+          </a:ln>
+        </p:spPr>
+        <p:style>
+          <a:lnRef idx="1">
+            <a:schemeClr val="accent1"/>
+          </a:lnRef>
+          <a:fillRef idx="0">
+            <a:schemeClr val="accent1"/>
+          </a:fillRef>
+          <a:effectRef idx="0">
+            <a:schemeClr val="accent1"/>
+          </a:effectRef>
+          <a:fontRef idx="minor">
+            <a:schemeClr val="tx1"/>
+          </a:fontRef>
+        </p:style>
+      </p:cxnSp>
     </p:spTree>
     <p:extLst>
       <p:ext uri="{BB962C8B-B14F-4D97-AF65-F5344CB8AC3E}">
         <p14:creationId xmlns:p14="http://schemas.microsoft.com/office/powerpoint/2010/main" val="606856741"/>
-      </p:ext>
-    </p:extLst>
-  </p:cSld>
-  <p:clrMapOvr>
-    <a:masterClrMapping/>
-  </p:clrMapOvr>
-</p:sld>
-</file>
-
-<file path=ppt/slides/slide9.xml><?xml version="1.0" encoding="utf-8"?>
-<p:sld xmlns:a="http://schemas.openxmlformats.org/drawingml/2006/main" xmlns:r="http://schemas.openxmlformats.org/officeDocument/2006/relationships" xmlns:p="http://schemas.openxmlformats.org/presentationml/2006/main">
-  <p:cSld>
-    <p:spTree>
-      <p:nvGrpSpPr>
-        <p:cNvPr id="1" name=""/>
-        <p:cNvGrpSpPr/>
-        <p:nvPr/>
-      </p:nvGrpSpPr>
-      <p:grpSpPr>
-        <a:xfrm>
-          <a:off x="0" y="0"/>
-          <a:ext cx="0" cy="0"/>
-          <a:chOff x="0" y="0"/>
-          <a:chExt cx="0" cy="0"/>
-        </a:xfrm>
-      </p:grpSpPr>
-      <p:sp>
-        <p:nvSpPr>
-          <p:cNvPr id="2" name="Title 1">
-            <a:extLst>
-              <a:ext uri="{FF2B5EF4-FFF2-40B4-BE49-F238E27FC236}">
-                <a16:creationId xmlns:a16="http://schemas.microsoft.com/office/drawing/2014/main" id="{D8751C99-4849-DF46-8393-83CC63358B15}"/>
-              </a:ext>
-            </a:extLst>
-          </p:cNvPr>
-          <p:cNvSpPr>
-            <a:spLocks noGrp="1"/>
-          </p:cNvSpPr>
-          <p:nvPr>
-            <p:ph type="title"/>
-          </p:nvPr>
-        </p:nvSpPr>
-        <p:spPr/>
-        <p:txBody>
-          <a:bodyPr/>
-          <a:lstStyle/>
-          <a:p>
-            <a:r>
-              <a:rPr lang="en-US" dirty="0"/>
-              <a:t>Initial SCRUBS</a:t>
-            </a:r>
-          </a:p>
-        </p:txBody>
-      </p:sp>
-      <p:pic>
-        <p:nvPicPr>
-          <p:cNvPr id="5" name="Content Placeholder 4" descr="Text, letter&#10;&#10;Description automatically generated">
-            <a:extLst>
-              <a:ext uri="{FF2B5EF4-FFF2-40B4-BE49-F238E27FC236}">
-                <a16:creationId xmlns:a16="http://schemas.microsoft.com/office/drawing/2014/main" id="{A5912380-4EE0-5D4A-BA50-BE28F82A71AC}"/>
-              </a:ext>
-            </a:extLst>
-          </p:cNvPr>
-          <p:cNvPicPr>
-            <a:picLocks noGrp="1" noChangeAspect="1"/>
-          </p:cNvPicPr>
-          <p:nvPr>
-            <p:ph idx="1"/>
-          </p:nvPr>
-        </p:nvPicPr>
-        <p:blipFill>
-          <a:blip r:embed="rId2"/>
-          <a:stretch>
-            <a:fillRect/>
-          </a:stretch>
-        </p:blipFill>
-        <p:spPr>
-          <a:xfrm>
-            <a:off x="1069847" y="2322068"/>
-            <a:ext cx="4700757" cy="4051300"/>
-          </a:xfrm>
-        </p:spPr>
-      </p:pic>
-    </p:spTree>
-    <p:extLst>
-      <p:ext uri="{BB962C8B-B14F-4D97-AF65-F5344CB8AC3E}">
-        <p14:creationId xmlns:p14="http://schemas.microsoft.com/office/powerpoint/2010/main" val="2873643166"/>
       </p:ext>
     </p:extLst>
   </p:cSld>

</xml_diff>

<commit_message>
covalent update and nansen code add
</commit_message>
<xml_diff>
--- a/API Analysis/Review deck/Initial Scoping.pptx
+++ b/API Analysis/Review deck/Initial Scoping.pptx
@@ -3759,7 +3759,6 @@
   <c:externalData r:id="rId3">
     <c:autoUpdate val="0"/>
   </c:externalData>
-  <c:userShapes r:id="rId4"/>
 </c:chartSpace>
 </file>
 
@@ -12356,8 +12355,8 @@
     </dgm:pt>
   </dgm:ptLst>
   <dgm:cxnLst>
+    <dgm:cxn modelId="{40DB745C-42EA-B548-ADA5-4F034B7095FC}" type="presOf" srcId="{7E9E90DB-36DA-3E4E-AC95-8770E247C94D}" destId="{F6A4F41B-2127-6845-A2F0-0FE5AE15AA65}" srcOrd="0" destOrd="0" presId="urn:microsoft.com/office/officeart/2005/8/layout/funnel1"/>
     <dgm:cxn modelId="{81245D45-5D16-3847-8EDA-6E77AA59A0E8}" srcId="{0C1123CB-21AC-B745-B147-6B0F77A8FC70}" destId="{9BDB6ED8-7D00-F244-BC42-7315F5329629}" srcOrd="1" destOrd="0" parTransId="{8BBF319E-9641-AF4A-8584-70765EFD5470}" sibTransId="{25CC220D-3AAF-E346-A35A-D5B57E2F3C31}"/>
-    <dgm:cxn modelId="{40DB745C-42EA-B548-ADA5-4F034B7095FC}" type="presOf" srcId="{7E9E90DB-36DA-3E4E-AC95-8770E247C94D}" destId="{F6A4F41B-2127-6845-A2F0-0FE5AE15AA65}" srcOrd="0" destOrd="0" presId="urn:microsoft.com/office/officeart/2005/8/layout/funnel1"/>
     <dgm:cxn modelId="{B5A3E674-2A03-1D45-A5B4-A8CB76E92DC8}" srcId="{0C1123CB-21AC-B745-B147-6B0F77A8FC70}" destId="{7E9E90DB-36DA-3E4E-AC95-8770E247C94D}" srcOrd="2" destOrd="0" parTransId="{5FCC8E10-4A9F-5143-B4A6-B24E2BF715FA}" sibTransId="{12C9B481-ABFA-F04A-9D24-F451249B15E2}"/>
     <dgm:cxn modelId="{02F24A97-1B4D-024B-B691-8054A6A142DB}" type="presOf" srcId="{1891B614-18F0-5D4D-8017-CA53CD07DE5B}" destId="{8AF16239-F40F-2640-9E5A-2C1E8AD25A0C}" srcOrd="0" destOrd="0" presId="urn:microsoft.com/office/officeart/2005/8/layout/funnel1"/>
     <dgm:cxn modelId="{D9BC3A99-8173-EF43-813C-F40F8F40FC49}" type="presOf" srcId="{9BDB6ED8-7D00-F244-BC42-7315F5329629}" destId="{60880A80-D707-AF41-98A8-212B131F62D0}" srcOrd="0" destOrd="0" presId="urn:microsoft.com/office/officeart/2005/8/layout/funnel1"/>
@@ -20960,9 +20959,6 @@
 </dgm:styleDef>
 </file>
 
-<file path=ppt/drawings/drawing1.xml><c:userShapes xmlns:c="http://schemas.openxmlformats.org/drawingml/2006/chart"><cdr:relSizeAnchor xmlns:cdr="http://schemas.openxmlformats.org/drawingml/2006/chartDrawing"><cdr:from><cdr:x>0.77999</cdr:x><cdr:y>0.23265</cdr:y></cdr:from><cdr:to><cdr:x>1</cdr:x><cdr:y>0.26542</cdr:y></cdr:to><cdr:sp macro="" textlink=""><cdr:nvSpPr><cdr:cNvPr id="2" name="TextBox 12"><a:extLst xmlns:a="http://schemas.openxmlformats.org/drawingml/2006/main"><a:ext uri="{FF2B5EF4-FFF2-40B4-BE49-F238E27FC236}"><a16:creationId xmlns:a16="http://schemas.microsoft.com/office/drawing/2014/main" id="{EB487842-E500-244B-BAD1-7D246D1A77B6}"/></a:ext></a:extLst></cdr:cNvPr><cdr:cNvSpPr txBox="1"/></cdr:nvSpPr><cdr:spPr><a:xfrm xmlns:a="http://schemas.openxmlformats.org/drawingml/2006/main"><a:off x="8940098" y="1529409"/><a:ext cx="2521652" cy="215444"/></a:xfrm><a:prstGeom xmlns:a="http://schemas.openxmlformats.org/drawingml/2006/main" prst="rect"><a:avLst/></a:prstGeom><a:noFill xmlns:a="http://schemas.openxmlformats.org/drawingml/2006/main"/></cdr:spPr><cdr:txBody><a:bodyPr xmlns:a="http://schemas.openxmlformats.org/drawingml/2006/main" wrap="none" lIns="0" tIns="0" rIns="0" bIns="0" rtlCol="0"><a:spAutoFit/></a:bodyPr><a:lstStyle xmlns:a="http://schemas.openxmlformats.org/drawingml/2006/main"><a:defPPr><a:defRPr lang="en-US"/></a:defPPr><a:lvl1pPr marL="0" algn="l" defTabSz="914400" rtl="0" eaLnBrk="1" latinLnBrk="0" hangingPunct="1"><a:defRPr sz="1800" kern="1200"><a:solidFill><a:schemeClr val="tx1"/></a:solidFill><a:latin typeface="+mn-lt"/><a:ea typeface="+mn-ea"/><a:cs typeface="+mn-cs"/></a:defRPr></a:lvl1pPr><a:lvl2pPr marL="457200" algn="l" defTabSz="914400" rtl="0" eaLnBrk="1" latinLnBrk="0" hangingPunct="1"><a:defRPr sz="1800" kern="1200"><a:solidFill><a:schemeClr val="tx1"/></a:solidFill><a:latin typeface="+mn-lt"/><a:ea typeface="+mn-ea"/><a:cs typeface="+mn-cs"/></a:defRPr></a:lvl2pPr><a:lvl3pPr marL="914400" algn="l" defTabSz="914400" rtl="0" eaLnBrk="1" latinLnBrk="0" hangingPunct="1"><a:defRPr sz="1800" kern="1200"><a:solidFill><a:schemeClr val="tx1"/></a:solidFill><a:latin typeface="+mn-lt"/><a:ea typeface="+mn-ea"/><a:cs typeface="+mn-cs"/></a:defRPr></a:lvl3pPr><a:lvl4pPr marL="1371600" algn="l" defTabSz="914400" rtl="0" eaLnBrk="1" latinLnBrk="0" hangingPunct="1"><a:defRPr sz="1800" kern="1200"><a:solidFill><a:schemeClr val="tx1"/></a:solidFill><a:latin typeface="+mn-lt"/><a:ea typeface="+mn-ea"/><a:cs typeface="+mn-cs"/></a:defRPr></a:lvl4pPr><a:lvl5pPr marL="1828800" algn="l" defTabSz="914400" rtl="0" eaLnBrk="1" latinLnBrk="0" hangingPunct="1"><a:defRPr sz="1800" kern="1200"><a:solidFill><a:schemeClr val="tx1"/></a:solidFill><a:latin typeface="+mn-lt"/><a:ea typeface="+mn-ea"/><a:cs typeface="+mn-cs"/></a:defRPr></a:lvl5pPr><a:lvl6pPr marL="2286000" algn="l" defTabSz="914400" rtl="0" eaLnBrk="1" latinLnBrk="0" hangingPunct="1"><a:defRPr sz="1800" kern="1200"><a:solidFill><a:schemeClr val="tx1"/></a:solidFill><a:latin typeface="+mn-lt"/><a:ea typeface="+mn-ea"/><a:cs typeface="+mn-cs"/></a:defRPr></a:lvl6pPr><a:lvl7pPr marL="2743200" algn="l" defTabSz="914400" rtl="0" eaLnBrk="1" latinLnBrk="0" hangingPunct="1"><a:defRPr sz="1800" kern="1200"><a:solidFill><a:schemeClr val="tx1"/></a:solidFill><a:latin typeface="+mn-lt"/><a:ea typeface="+mn-ea"/><a:cs typeface="+mn-cs"/></a:defRPr></a:lvl7pPr><a:lvl8pPr marL="3200400" algn="l" defTabSz="914400" rtl="0" eaLnBrk="1" latinLnBrk="0" hangingPunct="1"><a:defRPr sz="1800" kern="1200"><a:solidFill><a:schemeClr val="tx1"/></a:solidFill><a:latin typeface="+mn-lt"/><a:ea typeface="+mn-ea"/><a:cs typeface="+mn-cs"/></a:defRPr></a:lvl8pPr><a:lvl9pPr marL="3657600" algn="l" defTabSz="914400" rtl="0" eaLnBrk="1" latinLnBrk="0" hangingPunct="1"><a:defRPr sz="1800" kern="1200"><a:solidFill><a:schemeClr val="tx1"/></a:solidFill><a:latin typeface="+mn-lt"/><a:ea typeface="+mn-ea"/><a:cs typeface="+mn-cs"/></a:defRPr></a:lvl9pPr></a:lstStyle><a:p xmlns:a="http://schemas.openxmlformats.org/drawingml/2006/main"><a:pPr/><a:r><a:rPr lang="en-CA" sz="1400" b="0" i="0"><a:latin typeface="Cambria Math" panose="02040503050406030204" pitchFamily="18" charset="0"/></a:rPr><a:t>𝐿𝑜𝑎𝑛=16.7(𝑥−0.795)+6467</a:t></a:r><a:endParaRPr lang="en-US" sz="1400" dirty="0"/></a:p></cdr:txBody></cdr:sp></cdr:relSizeAnchor></c:userShapes>/m:oMathParaPr><m:oMath xmlns:m="http://schemas.openxmlformats.org/officeDocument/2006/math"><m:r><a:rPr lang="en-CA" sz="1400" b="0" i="1" smtClean="0"><a:latin typeface="Cambria Math" panose="02040503050406030204" pitchFamily="18" charset="0"/></a:rPr><m:t>𝐿𝑜𝑎𝑛</m:t></m:r><m:r><a:rPr lang="en-CA" sz="1400" b="0" i="1" smtClean="0"><a:latin typeface="Cambria Math" panose="02040503050406030204" pitchFamily="18" charset="0"/></a:rPr><m:t>=16.7(</m:t></m:r><m:r><a:rPr lang="en-CA" sz="1400" b="0" i="1" smtClean="0"><a:latin typeface="Cambria Math" panose="02040503050406030204" pitchFamily="18" charset="0"/></a:rPr><m:t>𝑥</m:t></m:r><m:r><a:rPr lang="en-CA" sz="1400" b="0" i="1" smtClean="0"><a:latin typeface="Cambria Math" panose="02040503050406030204" pitchFamily="18" charset="0"/></a:rPr><m:t>−0.795)+6467</m:t></m:r></m:oMath></m:oMathPara></a14:m><a:endParaRPr lang="en-US" sz="1400" dirty="0"/></a:p></cdr:txBody></cdr:sp></mc:Choice><mc:Fallback><cdr:sp macro="" textlink=""><cdr:nvSpPr><cdr:cNvPr id="2" name="TextBox 12"><a:extLst xmlns:a="http://schemas.openxmlformats.org/drawingml/2006/main"><a:ext uri="{FF2B5EF4-FFF2-40B4-BE49-F238E27FC236}"><a16:creationId xmlns:a16="http://schemas.microsoft.com/office/drawing/2014/main" id="{EB487842-E500-244B-BAD1-7D246D1A77B6}"/></a:ext></a:extLst></cdr:cNvPr><cdr:cNvSpPr txBox="1"/></cdr:nvSpPr><cdr:spPr><a:xfrm xmlns:a="http://schemas.openxmlformats.org/drawingml/2006/main"><a:off x="8940098" y="1529409"/><a:ext cx="2521652" cy="215444"/></a:xfrm><a:prstGeom xmlns:a="http://schemas.openxmlformats.org/drawingml/2006/main" prst="rect"><a:avLst/></a:prstGeom><a:noFill xmlns:a="http://schemas.openxmlformats.org/drawingml/2006/main"/></cdr:spPr><cdr:txBody><a:bodyPr xmlns:a="http://schemas.openxmlformats.org/drawingml/2006/main" wrap="none" lIns="0" tIns="0" rIns="0" bIns="0" rtlCol="0"><a:spAutoFit/></a:bodyPr><a:lstStyle xmlns:a="http://schemas.openxmlformats.org/drawingml/2006/main"><a:defPPr><a:defRPr lang="en-US"/></a:defPPr><a:lvl1pPr marL="0" algn="l" defTabSz="914400" rtl="0" eaLnBrk="1" latinLnBrk="0" hangingPunct="1"><a:defRPr sz="1800" kern="1200"><a:solidFill><a:schemeClr val="tx1"/></a:solidFill><a:latin typeface="+mn-lt"/><a:ea typeface="+mn-ea"/><a:cs typeface="+mn-cs"/></a:defRPr></a:lvl1pPr><a:lvl2pPr marL="457200" algn="l" defTabSz="914400" rtl="0" eaLnBrk="1" latinLnBrk="0" hangingPunct="1"><a:defRPr sz="1800" kern="1200"><a:solidFill><a:schemeClr val="tx1"/></a:solidFill><a:latin typeface="+mn-lt"/><a:ea typeface="+mn-ea"/><a:cs typeface="+mn-cs"/></a:defRPr></a:lvl2pPr><a:lvl3pPr marL="914400" algn="l" defTabSz="914400" rtl="0" eaLnBrk="1" latinLnBrk="0" hangingPunct="1"><a:defRPr sz="1800" kern="1200"><a:solidFill><a:schemeClr val="tx1"/></a:solidFill><a:latin typeface="+mn-lt"/><a:ea typeface="+mn-ea"/><a:cs typeface="+mn-cs"/></a:defRPr></a:lvl3pPr><a:lvl4pPr marL="1371600" algn="l" defTabSz="914400" rtl="0" eaLnBrk="1" latinLnBrk="0" hangingPunct="1"><a:defRPr sz="1800" kern="1200"><a:solidFill><a:schemeClr val="tx1"/></a:solidFill><a:latin typeface="+mn-lt"/><a:ea typeface="+mn-ea"/><a:cs typeface="+mn-cs"/></a:defRPr></a:lvl4pPr><a:lvl5pPr marL="1828800" algn="l" defTabSz="914400" rtl="0" eaLnBrk="1" latinLnBrk="0" hangingPunct="1"><a:defRPr sz="1800" kern="1200"><a:solidFill><a:schemeClr val="tx1"/></a:solidFill><a:latin typeface="+mn-lt"/><a:ea typeface="+mn-ea"/><a:cs typeface="+mn-cs"/></a:defRPr></a:lvl5pPr><a:lvl6pPr marL="2286000" algn="l" defTabSz="914400" rtl="0" eaLnBrk="1" latinLnBrk="0" hangingPunct="1"><a:defRPr sz="1800" kern="1200"><a:solidFill><a:schemeClr val="tx1"/></a:solidFill><a:latin typeface="+mn-lt"/><a:ea typeface="+mn-ea"/><a:cs typeface="+mn-cs"/></a:defRPr></a:lvl6pPr><a:lvl7pPr marL="2743200" algn="l" defTabSz="914400" rtl="0" eaLnBrk="1" latinLnBrk="0" hangingPunct="1"><a:defRPr sz="1800" kern="1200"><a:solidFill><a:schemeClr val="tx1"/></a:solidFill><a:latin typeface="+mn-lt"/><a:ea typeface="+mn-ea"/><a:cs typeface="+mn-cs"/></a:defRPr></a:lvl7pPr><a:lvl8pPr marL="3200400" algn="l" defTabSz="914400" rtl="0" eaLnBrk="1" latinLnBrk="0" hangingPunct="1"><a:defRPr sz="1800" kern="1200"><a:solidFill><a:schemeClr val="tx1"/></a:solidFill><a:latin typeface="+mn-lt"/><a:ea typeface="+mn-ea"/><a:cs typeface="+mn-cs"/></a:defRPr></a:lvl8pPr><a:lvl9pPr marL="3657600" algn="l" defTabSz="914400" rtl="0" eaLnBrk="1" latinLnBrk="0" hangingPunct="1"><a:defRPr sz="1800" kern="1200"><a:solidFill><a:schemeClr val="tx1"/></a:solidFill><a:latin typeface="+mn-lt"/><a:ea typeface="+mn-ea"/><a:cs typeface="+mn-cs"/></a:defRPr></a:lvl9pPr></a:lstStyle><a:p xmlns:a="http://schemas.openxmlformats.org/drawingml/2006/main"><a:pPr/><a:r><a:rPr lang="en-CA" sz="1400" b="0" i="0"><a:latin typeface="Cambria Math" panose="02040503050406030204" pitchFamily="18" charset="0"/></a:rPr><a:t>𝐿𝑜𝑎𝑛=16.7(𝑥−0.795)+6467</a:t></a:r><a:endParaRPr lang="en-US" sz="1400" dirty="0"/></a:p></cdr:txBody></cdr:sp></mc:Fallback></mc:AlternateContent></cdr:relSizeAnchor></c:userShapes>
-</file>
-
 <file path=ppt/slideLayouts/slideLayout1.xml><?xml version="1.0" encoding="utf-8"?>
 <p:sldLayout xmlns:a="http://schemas.openxmlformats.org/drawingml/2006/main" xmlns:r="http://schemas.openxmlformats.org/officeDocument/2006/relationships" xmlns:p="http://schemas.openxmlformats.org/presentationml/2006/main" showMasterSp="0" type="title" preserve="1">
   <p:cSld name="Title Slide">
@@ -21464,7 +21460,7 @@
           <a:p>
             <a:fld id="{5E64D5E2-E313-0149-A090-E605E7F1C794}" type="datetimeFigureOut">
               <a:rPr lang="en-US" smtClean="0"/>
-              <a:t>6/9/21</a:t>
+              <a:t>6/9/2021</a:t>
             </a:fld>
             <a:endParaRPr lang="en-US"/>
           </a:p>
@@ -21641,7 +21637,7 @@
           <a:p>
             <a:fld id="{5E64D5E2-E313-0149-A090-E605E7F1C794}" type="datetimeFigureOut">
               <a:rPr lang="en-US" smtClean="0"/>
-              <a:t>6/9/21</a:t>
+              <a:t>6/9/2021</a:t>
             </a:fld>
             <a:endParaRPr lang="en-US"/>
           </a:p>
@@ -21821,7 +21817,7 @@
           <a:p>
             <a:fld id="{5E64D5E2-E313-0149-A090-E605E7F1C794}" type="datetimeFigureOut">
               <a:rPr lang="en-US" smtClean="0"/>
-              <a:t>6/9/21</a:t>
+              <a:t>6/9/2021</a:t>
             </a:fld>
             <a:endParaRPr lang="en-US"/>
           </a:p>
@@ -21991,7 +21987,7 @@
           <a:p>
             <a:fld id="{5E64D5E2-E313-0149-A090-E605E7F1C794}" type="datetimeFigureOut">
               <a:rPr lang="en-US" smtClean="0"/>
-              <a:t>6/9/21</a:t>
+              <a:t>6/9/2021</a:t>
             </a:fld>
             <a:endParaRPr lang="en-US"/>
           </a:p>
@@ -22312,7 +22308,7 @@
           <a:p>
             <a:fld id="{5E64D5E2-E313-0149-A090-E605E7F1C794}" type="datetimeFigureOut">
               <a:rPr lang="en-US" smtClean="0"/>
-              <a:t>6/9/21</a:t>
+              <a:t>6/9/2021</a:t>
             </a:fld>
             <a:endParaRPr lang="en-US"/>
           </a:p>
@@ -22772,7 +22768,7 @@
           <a:p>
             <a:fld id="{5E64D5E2-E313-0149-A090-E605E7F1C794}" type="datetimeFigureOut">
               <a:rPr lang="en-US" smtClean="0"/>
-              <a:t>6/9/21</a:t>
+              <a:t>6/9/2021</a:t>
             </a:fld>
             <a:endParaRPr lang="en-US"/>
           </a:p>
@@ -23183,7 +23179,7 @@
           <a:p>
             <a:fld id="{5E64D5E2-E313-0149-A090-E605E7F1C794}" type="datetimeFigureOut">
               <a:rPr lang="en-US" smtClean="0"/>
-              <a:t>6/9/21</a:t>
+              <a:t>6/9/2021</a:t>
             </a:fld>
             <a:endParaRPr lang="en-US"/>
           </a:p>
@@ -23301,7 +23297,7 @@
           <a:p>
             <a:fld id="{5E64D5E2-E313-0149-A090-E605E7F1C794}" type="datetimeFigureOut">
               <a:rPr lang="en-US" smtClean="0"/>
-              <a:t>6/9/21</a:t>
+              <a:t>6/9/2021</a:t>
             </a:fld>
             <a:endParaRPr lang="en-US"/>
           </a:p>
@@ -23418,7 +23414,7 @@
           <a:p>
             <a:fld id="{5E64D5E2-E313-0149-A090-E605E7F1C794}" type="datetimeFigureOut">
               <a:rPr lang="en-US" smtClean="0"/>
-              <a:t>6/9/21</a:t>
+              <a:t>6/9/2021</a:t>
             </a:fld>
             <a:endParaRPr lang="en-US"/>
           </a:p>
@@ -23776,7 +23772,7 @@
           <a:p>
             <a:fld id="{5E64D5E2-E313-0149-A090-E605E7F1C794}" type="datetimeFigureOut">
               <a:rPr lang="en-US" smtClean="0"/>
-              <a:t>6/9/21</a:t>
+              <a:t>6/9/2021</a:t>
             </a:fld>
             <a:endParaRPr lang="en-US"/>
           </a:p>
@@ -24283,7 +24279,7 @@
           <a:p>
             <a:fld id="{5E64D5E2-E313-0149-A090-E605E7F1C794}" type="datetimeFigureOut">
               <a:rPr lang="en-US" smtClean="0"/>
-              <a:t>6/9/21</a:t>
+              <a:t>6/9/2021</a:t>
             </a:fld>
             <a:endParaRPr lang="en-US"/>
           </a:p>
@@ -24638,7 +24634,7 @@
           <a:p>
             <a:fld id="{5E64D5E2-E313-0149-A090-E605E7F1C794}" type="datetimeFigureOut">
               <a:rPr lang="en-US" smtClean="0"/>
-              <a:t>6/9/21</a:t>
+              <a:t>6/9/2021</a:t>
             </a:fld>
             <a:endParaRPr lang="en-US"/>
           </a:p>
@@ -25887,74 +25883,38 @@
           </a:graphicData>
         </a:graphic>
       </p:graphicFrame>
-      <mc:AlternateContent xmlns:mc="http://schemas.openxmlformats.org/markup-compatibility/2006">
-        <mc:Choice xmlns:a14="http://schemas.microsoft.com/office/drawing/2010/main" Requires="a14">
-          <p:graphicFrame>
-            <p:nvGraphicFramePr>
-              <p:cNvPr id="6" name="Chart 5">
-                <a:extLst>
-                  <a:ext uri="{FF2B5EF4-FFF2-40B4-BE49-F238E27FC236}">
-                    <a16:creationId xmlns:a16="http://schemas.microsoft.com/office/drawing/2014/main" id="{2FE4B319-1022-48BF-B00A-BA48C8597FBA}"/>
-                  </a:ext>
-                </a:extLst>
-              </p:cNvPr>
-              <p:cNvGraphicFramePr>
-                <a:graphicFrameLocks/>
-              </p:cNvGraphicFramePr>
-              <p:nvPr>
-                <p:extLst>
-                  <p:ext uri="{D42A27DB-BD31-4B8C-83A1-F6EECF244321}">
-                    <p14:modId xmlns:p14="http://schemas.microsoft.com/office/powerpoint/2010/main" val="1787530249"/>
-                  </p:ext>
-                </p:extLst>
-              </p:nvPr>
-            </p:nvGraphicFramePr>
-            <p:xfrm>
-              <a:off x="125741" y="284162"/>
-              <a:ext cx="11461750" cy="6573838"/>
-            </p:xfrm>
-            <a:graphic>
-              <a:graphicData uri="http://schemas.openxmlformats.org/drawingml/2006/chart">
-                <c:chart xmlns:c="http://schemas.openxmlformats.org/drawingml/2006/chart" xmlns:r="http://schemas.openxmlformats.org/officeDocument/2006/relationships" r:id="rId3"/>
-              </a:graphicData>
-            </a:graphic>
-          </p:graphicFrame>
-        </mc:Choice>
-        <mc:Fallback>
-          <p:graphicFrame>
-            <p:nvGraphicFramePr>
-              <p:cNvPr id="6" name="Chart 5">
-                <a:extLst>
-                  <a:ext uri="{FF2B5EF4-FFF2-40B4-BE49-F238E27FC236}">
-                    <a16:creationId xmlns:a16="http://schemas.microsoft.com/office/drawing/2014/main" id="{2FE4B319-1022-48BF-B00A-BA48C8597FBA}"/>
-                  </a:ext>
-                </a:extLst>
-              </p:cNvPr>
-              <p:cNvGraphicFramePr>
-                <a:graphicFrameLocks/>
-              </p:cNvGraphicFramePr>
-              <p:nvPr>
-                <p:extLst>
-                  <p:ext uri="{D42A27DB-BD31-4B8C-83A1-F6EECF244321}">
-                    <p14:modId xmlns:p14="http://schemas.microsoft.com/office/powerpoint/2010/main" val="1787530249"/>
-                  </p:ext>
-                </p:extLst>
-              </p:nvPr>
-            </p:nvGraphicFramePr>
-            <p:xfrm>
-              <a:off x="125741" y="284162"/>
-              <a:ext cx="11461750" cy="6573838"/>
-            </p:xfrm>
-            <a:graphic>
-              <a:graphicData uri="http://schemas.openxmlformats.org/drawingml/2006/chart">
-                <c:chart xmlns:c="http://schemas.openxmlformats.org/drawingml/2006/chart" xmlns:r="http://schemas.openxmlformats.org/officeDocument/2006/relationships" r:id="rId3"/>
-              </a:graphicData>
-            </a:graphic>
-          </p:graphicFrame>
-        </mc:Fallback>
-      </mc:AlternateContent>
-      <mc:AlternateContent xmlns:mc="http://schemas.openxmlformats.org/markup-compatibility/2006">
-        <mc:Choice xmlns:a14="http://schemas.microsoft.com/office/drawing/2010/main" Requires="a14">
+      <p:graphicFrame>
+        <p:nvGraphicFramePr>
+          <p:cNvPr id="6" name="Chart 5">
+            <a:extLst>
+              <a:ext uri="{FF2B5EF4-FFF2-40B4-BE49-F238E27FC236}">
+                <a16:creationId xmlns:a16="http://schemas.microsoft.com/office/drawing/2014/main" id="{2FE4B319-1022-48BF-B00A-BA48C8597FBA}"/>
+              </a:ext>
+            </a:extLst>
+          </p:cNvPr>
+          <p:cNvGraphicFramePr>
+            <a:graphicFrameLocks/>
+          </p:cNvGraphicFramePr>
+          <p:nvPr>
+            <p:extLst>
+              <p:ext uri="{D42A27DB-BD31-4B8C-83A1-F6EECF244321}">
+                <p14:modId xmlns:p14="http://schemas.microsoft.com/office/powerpoint/2010/main" val="1787530249"/>
+              </p:ext>
+            </p:extLst>
+          </p:nvPr>
+        </p:nvGraphicFramePr>
+        <p:xfrm>
+          <a:off x="125741" y="284162"/>
+          <a:ext cx="11461750" cy="6573838"/>
+        </p:xfrm>
+        <a:graphic>
+          <a:graphicData uri="http://schemas.openxmlformats.org/drawingml/2006/chart">
+            <c:chart xmlns:c="http://schemas.openxmlformats.org/drawingml/2006/chart" xmlns:r="http://schemas.openxmlformats.org/officeDocument/2006/relationships" r:id="rId3"/>
+          </a:graphicData>
+        </a:graphic>
+      </p:graphicFrame>
+      <mc:AlternateContent xmlns:mc="http://schemas.openxmlformats.org/markup-compatibility/2006" xmlns:a14="http://schemas.microsoft.com/office/drawing/2010/main">
+        <mc:Choice Requires="a14">
           <p:sp>
             <p:nvSpPr>
               <p:cNvPr id="2" name="Title 1">
@@ -25999,7 +25959,7 @@
             </p:txBody>
           </p:sp>
         </mc:Choice>
-        <mc:Fallback>
+        <mc:Fallback xmlns="">
           <p:sp>
             <p:nvSpPr>
               <p:cNvPr id="2" name="Title 1">
@@ -26183,8 +26143,8 @@
           </a:p>
         </p:txBody>
       </p:sp>
-      <mc:AlternateContent xmlns:mc="http://schemas.openxmlformats.org/markup-compatibility/2006">
-        <mc:Choice xmlns:a14="http://schemas.microsoft.com/office/drawing/2010/main" Requires="a14">
+      <mc:AlternateContent xmlns:mc="http://schemas.openxmlformats.org/markup-compatibility/2006" xmlns:a14="http://schemas.microsoft.com/office/drawing/2010/main">
+        <mc:Choice Requires="a14">
           <p:sp>
             <p:nvSpPr>
               <p:cNvPr id="4" name="TextBox 3">
@@ -26213,6 +26173,7 @@
               </a:bodyPr>
               <a:lstStyle/>
               <a:p>
+                <a:pPr/>
                 <a14:m>
                   <m:oMathPara xmlns:m="http://schemas.openxmlformats.org/officeDocument/2006/math">
                     <m:oMathParaPr>
@@ -26251,7 +26212,7 @@
             </p:txBody>
           </p:sp>
         </mc:Choice>
-        <mc:Fallback>
+        <mc:Fallback xmlns="">
           <p:sp>
             <p:nvSpPr>
               <p:cNvPr id="4" name="TextBox 3">
@@ -26296,8 +26257,8 @@
           </p:sp>
         </mc:Fallback>
       </mc:AlternateContent>
-      <mc:AlternateContent xmlns:mc="http://schemas.openxmlformats.org/markup-compatibility/2006">
-        <mc:Choice xmlns:a14="http://schemas.microsoft.com/office/drawing/2010/main" Requires="a14">
+      <mc:AlternateContent xmlns:mc="http://schemas.openxmlformats.org/markup-compatibility/2006" xmlns:a14="http://schemas.microsoft.com/office/drawing/2010/main">
+        <mc:Choice Requires="a14">
           <p:sp>
             <p:nvSpPr>
               <p:cNvPr id="13" name="TextBox 12">
@@ -26326,6 +26287,7 @@
               </a:bodyPr>
               <a:lstStyle/>
               <a:p>
+                <a:pPr/>
                 <a14:m>
                   <m:oMathPara xmlns:m="http://schemas.openxmlformats.org/officeDocument/2006/math">
                     <m:oMathParaPr>
@@ -26364,7 +26326,7 @@
             </p:txBody>
           </p:sp>
         </mc:Choice>
-        <mc:Fallback>
+        <mc:Fallback xmlns="">
           <p:sp>
             <p:nvSpPr>
               <p:cNvPr id="13" name="TextBox 12">

</xml_diff>

<commit_message>
Google Maps API added
</commit_message>
<xml_diff>
--- a/API Analysis/Review deck/Initial Scoping.pptx
+++ b/API Analysis/Review deck/Initial Scoping.pptx
@@ -162,7 +162,7 @@
   <pc:docChgLst>
     <pc:chgData name="udai parvathaneni" userId="d83d812613df3043" providerId="LiveId" clId="{3D7A6A80-EE33-4841-B2CA-F0A08A8E7586}"/>
     <pc:docChg chg="undo redo custSel addSld delSld modSld sldOrd">
-      <pc:chgData name="udai parvathaneni" userId="d83d812613df3043" providerId="LiveId" clId="{3D7A6A80-EE33-4841-B2CA-F0A08A8E7586}" dt="2021-06-09T17:44:22.384" v="3849" actId="20577"/>
+      <pc:chgData name="udai parvathaneni" userId="d83d812613df3043" providerId="LiveId" clId="{3D7A6A80-EE33-4841-B2CA-F0A08A8E7586}" dt="2021-06-22T21:09:14.687" v="3911" actId="6549"/>
       <pc:docMkLst>
         <pc:docMk/>
       </pc:docMkLst>
@@ -1041,7 +1041,7 @@
         </pc:graphicFrameChg>
       </pc:sldChg>
       <pc:sldChg chg="addSp delSp modSp new add del mod">
-        <pc:chgData name="udai parvathaneni" userId="d83d812613df3043" providerId="LiveId" clId="{3D7A6A80-EE33-4841-B2CA-F0A08A8E7586}" dt="2021-06-09T17:41:58.874" v="3845" actId="20577"/>
+        <pc:chgData name="udai parvathaneni" userId="d83d812613df3043" providerId="LiveId" clId="{3D7A6A80-EE33-4841-B2CA-F0A08A8E7586}" dt="2021-06-22T21:09:14.687" v="3911" actId="6549"/>
         <pc:sldMkLst>
           <pc:docMk/>
           <pc:sldMk cId="606856741" sldId="272"/>
@@ -1063,7 +1063,7 @@
           </ac:spMkLst>
         </pc:spChg>
         <pc:spChg chg="add mod">
-          <ac:chgData name="udai parvathaneni" userId="d83d812613df3043" providerId="LiveId" clId="{3D7A6A80-EE33-4841-B2CA-F0A08A8E7586}" dt="2021-06-09T13:02:29.170" v="2118" actId="1076"/>
+          <ac:chgData name="udai parvathaneni" userId="d83d812613df3043" providerId="LiveId" clId="{3D7A6A80-EE33-4841-B2CA-F0A08A8E7586}" dt="2021-06-22T21:09:14.687" v="3911" actId="6549"/>
           <ac:spMkLst>
             <pc:docMk/>
             <pc:sldMk cId="606856741" sldId="272"/>
@@ -3804,7 +3804,6 @@
   <c:externalData r:id="rId3">
     <c:autoUpdate val="0"/>
   </c:externalData>
-  <c:userShapes r:id="rId4"/>
 </c:chartSpace>
 </file>
 
@@ -21005,9 +21004,6 @@
 </dgm:styleDef>
 </file>
 
-<file path=ppt/drawings/drawing1.xml><c:userShapes xmlns:c="http://schemas.openxmlformats.org/drawingml/2006/chart"><cdr:relSizeAnchor xmlns:cdr="http://schemas.openxmlformats.org/drawingml/2006/chartDrawing"><cdr:from><cdr:x>0.77999</cdr:x><cdr:y>0.23265</cdr:y></cdr:from><cdr:to><cdr:x>1</cdr:x><cdr:y>0.26542</cdr:y></cdr:to><cdr:sp macro="" textlink=""><cdr:nvSpPr><cdr:cNvPr id="2" name="TextBox 12"><a:extLst xmlns:a="http://schemas.openxmlformats.org/drawingml/2006/main"><a:ext uri="{FF2B5EF4-FFF2-40B4-BE49-F238E27FC236}"><a16:creationId xmlns:a16="http://schemas.microsoft.com/office/drawing/2014/main" id="{EB487842-E500-244B-BAD1-7D246D1A77B6}"/></a:ext></a:extLst></cdr:cNvPr><cdr:cNvSpPr txBox="1"/></cdr:nvSpPr><cdr:spPr><a:xfrm xmlns:a="http://schemas.openxmlformats.org/drawingml/2006/main"><a:off x="8940098" y="1529409"/><a:ext cx="2521652" cy="215444"/></a:xfrm><a:prstGeom xmlns:a="http://schemas.openxmlformats.org/drawingml/2006/main" prst="rect"><a:avLst/></a:prstGeom><a:noFill xmlns:a="http://schemas.openxmlformats.org/drawingml/2006/main"/></cdr:spPr><cdr:txBody><a:bodyPr xmlns:a="http://schemas.openxmlformats.org/drawingml/2006/main" wrap="none" lIns="0" tIns="0" rIns="0" bIns="0" rtlCol="0"><a:spAutoFit/></a:bodyPr><a:lstStyle xmlns:a="http://schemas.openxmlformats.org/drawingml/2006/main"><a:defPPr><a:defRPr lang="en-US"/></a:defPPr><a:lvl1pPr marL="0" algn="l" defTabSz="914400" rtl="0" eaLnBrk="1" latinLnBrk="0" hangingPunct="1"><a:defRPr sz="1800" kern="1200"><a:solidFill><a:schemeClr val="tx1"/></a:solidFill><a:latin typeface="+mn-lt"/><a:ea typeface="+mn-ea"/><a:cs typeface="+mn-cs"/></a:defRPr></a:lvl1pPr><a:lvl2pPr marL="457200" algn="l" defTabSz="914400" rtl="0" eaLnBrk="1" latinLnBrk="0" hangingPunct="1"><a:defRPr sz="1800" kern="1200"><a:solidFill><a:schemeClr val="tx1"/></a:solidFill><a:latin typeface="+mn-lt"/><a:ea typeface="+mn-ea"/><a:cs typeface="+mn-cs"/></a:defRPr></a:lvl2pPr><a:lvl3pPr marL="914400" algn="l" defTabSz="914400" rtl="0" eaLnBrk="1" latinLnBrk="0" hangingPunct="1"><a:defRPr sz="1800" kern="1200"><a:solidFill><a:schemeClr val="tx1"/></a:solidFill><a:latin typeface="+mn-lt"/><a:ea typeface="+mn-ea"/><a:cs typeface="+mn-cs"/></a:defRPr></a:lvl3pPr><a:lvl4pPr marL="1371600" algn="l" defTabSz="914400" rtl="0" eaLnBrk="1" latinLnBrk="0" hangingPunct="1"><a:defRPr sz="1800" kern="1200"><a:solidFill><a:schemeClr val="tx1"/></a:solidFill><a:latin typeface="+mn-lt"/><a:ea typeface="+mn-ea"/><a:cs typeface="+mn-cs"/></a:defRPr></a:lvl4pPr><a:lvl5pPr marL="1828800" algn="l" defTabSz="914400" rtl="0" eaLnBrk="1" latinLnBrk="0" hangingPunct="1"><a:defRPr sz="1800" kern="1200"><a:solidFill><a:schemeClr val="tx1"/></a:solidFill><a:latin typeface="+mn-lt"/><a:ea typeface="+mn-ea"/><a:cs typeface="+mn-cs"/></a:defRPr></a:lvl5pPr><a:lvl6pPr marL="2286000" algn="l" defTabSz="914400" rtl="0" eaLnBrk="1" latinLnBrk="0" hangingPunct="1"><a:defRPr sz="1800" kern="1200"><a:solidFill><a:schemeClr val="tx1"/></a:solidFill><a:latin typeface="+mn-lt"/><a:ea typeface="+mn-ea"/><a:cs typeface="+mn-cs"/></a:defRPr></a:lvl6pPr><a:lvl7pPr marL="2743200" algn="l" defTabSz="914400" rtl="0" eaLnBrk="1" latinLnBrk="0" hangingPunct="1"><a:defRPr sz="1800" kern="1200"><a:solidFill><a:schemeClr val="tx1"/></a:solidFill><a:latin typeface="+mn-lt"/><a:ea typeface="+mn-ea"/><a:cs typeface="+mn-cs"/></a:defRPr></a:lvl7pPr><a:lvl8pPr marL="3200400" algn="l" defTabSz="914400" rtl="0" eaLnBrk="1" latinLnBrk="0" hangingPunct="1"><a:defRPr sz="1800" kern="1200"><a:solidFill><a:schemeClr val="tx1"/></a:solidFill><a:latin typeface="+mn-lt"/><a:ea typeface="+mn-ea"/><a:cs typeface="+mn-cs"/></a:defRPr></a:lvl8pPr><a:lvl9pPr marL="3657600" algn="l" defTabSz="914400" rtl="0" eaLnBrk="1" latinLnBrk="0" hangingPunct="1"><a:defRPr sz="1800" kern="1200"><a:solidFill><a:schemeClr val="tx1"/></a:solidFill><a:latin typeface="+mn-lt"/><a:ea typeface="+mn-ea"/><a:cs typeface="+mn-cs"/></a:defRPr></a:lvl9pPr></a:lstStyle><a:p xmlns:a="http://schemas.openxmlformats.org/drawingml/2006/main"><a:pPr/><a:r><a:rPr lang="en-CA" sz="1400" b="0" i="0"><a:latin typeface="Cambria Math" panose="02040503050406030204" pitchFamily="18" charset="0"/></a:rPr><a:t>𝐿𝑜𝑎𝑛=16.7(𝑥−0.795)+6467</a:t></a:r><a:endParaRPr lang="en-US" sz="1400" dirty="0"/></a:p></cdr:txBody></cdr:sp></cdr:relSizeAnchor></c:userShapes>/m:oMathParaPr><m:oMath xmlns:m="http://schemas.openxmlformats.org/officeDocument/2006/math"><m:r><a:rPr lang="en-CA" sz="1400" b="0" i="1" smtClean="0"><a:latin typeface="Cambria Math" panose="02040503050406030204" pitchFamily="18" charset="0"/></a:rPr><m:t>𝐿𝑜𝑎𝑛</m:t></m:r><m:r><a:rPr lang="en-CA" sz="1400" b="0" i="1" smtClean="0"><a:latin typeface="Cambria Math" panose="02040503050406030204" pitchFamily="18" charset="0"/></a:rPr><m:t>=16.7(</m:t></m:r><m:r><a:rPr lang="en-CA" sz="1400" b="0" i="1" smtClean="0"><a:latin typeface="Cambria Math" panose="02040503050406030204" pitchFamily="18" charset="0"/></a:rPr><m:t>𝑥</m:t></m:r><m:r><a:rPr lang="en-CA" sz="1400" b="0" i="1" smtClean="0"><a:latin typeface="Cambria Math" panose="02040503050406030204" pitchFamily="18" charset="0"/></a:rPr><m:t>−0.795)+6467</m:t></m:r></m:oMath></m:oMathPara></a14:m><a:endParaRPr lang="en-US" sz="1400" dirty="0"/></a:p></cdr:txBody></cdr:sp></mc:Choice><mc:Fallback><cdr:sp macro="" textlink=""><cdr:nvSpPr><cdr:cNvPr id="2" name="TextBox 12"><a:extLst xmlns:a="http://schemas.openxmlformats.org/drawingml/2006/main"><a:ext uri="{FF2B5EF4-FFF2-40B4-BE49-F238E27FC236}"><a16:creationId xmlns:a16="http://schemas.microsoft.com/office/drawing/2014/main" id="{EB487842-E500-244B-BAD1-7D246D1A77B6}"/></a:ext></a:extLst></cdr:cNvPr><cdr:cNvSpPr txBox="1"/></cdr:nvSpPr><cdr:spPr><a:xfrm xmlns:a="http://schemas.openxmlformats.org/drawingml/2006/main"><a:off x="8940098" y="1529409"/><a:ext cx="2521652" cy="215444"/></a:xfrm><a:prstGeom xmlns:a="http://schemas.openxmlformats.org/drawingml/2006/main" prst="rect"><a:avLst/></a:prstGeom><a:noFill xmlns:a="http://schemas.openxmlformats.org/drawingml/2006/main"/></cdr:spPr><cdr:txBody><a:bodyPr xmlns:a="http://schemas.openxmlformats.org/drawingml/2006/main" wrap="none" lIns="0" tIns="0" rIns="0" bIns="0" rtlCol="0"><a:spAutoFit/></a:bodyPr><a:lstStyle xmlns:a="http://schemas.openxmlformats.org/drawingml/2006/main"><a:defPPr><a:defRPr lang="en-US"/></a:defPPr><a:lvl1pPr marL="0" algn="l" defTabSz="914400" rtl="0" eaLnBrk="1" latinLnBrk="0" hangingPunct="1"><a:defRPr sz="1800" kern="1200"><a:solidFill><a:schemeClr val="tx1"/></a:solidFill><a:latin typeface="+mn-lt"/><a:ea typeface="+mn-ea"/><a:cs typeface="+mn-cs"/></a:defRPr></a:lvl1pPr><a:lvl2pPr marL="457200" algn="l" defTabSz="914400" rtl="0" eaLnBrk="1" latinLnBrk="0" hangingPunct="1"><a:defRPr sz="1800" kern="1200"><a:solidFill><a:schemeClr val="tx1"/></a:solidFill><a:latin typeface="+mn-lt"/><a:ea typeface="+mn-ea"/><a:cs typeface="+mn-cs"/></a:defRPr></a:lvl2pPr><a:lvl3pPr marL="914400" algn="l" defTabSz="914400" rtl="0" eaLnBrk="1" latinLnBrk="0" hangingPunct="1"><a:defRPr sz="1800" kern="1200"><a:solidFill><a:schemeClr val="tx1"/></a:solidFill><a:latin typeface="+mn-lt"/><a:ea typeface="+mn-ea"/><a:cs typeface="+mn-cs"/></a:defRPr></a:lvl3pPr><a:lvl4pPr marL="1371600" algn="l" defTabSz="914400" rtl="0" eaLnBrk="1" latinLnBrk="0" hangingPunct="1"><a:defRPr sz="1800" kern="1200"><a:solidFill><a:schemeClr val="tx1"/></a:solidFill><a:latin typeface="+mn-lt"/><a:ea typeface="+mn-ea"/><a:cs typeface="+mn-cs"/></a:defRPr></a:lvl4pPr><a:lvl5pPr marL="1828800" algn="l" defTabSz="914400" rtl="0" eaLnBrk="1" latinLnBrk="0" hangingPunct="1"><a:defRPr sz="1800" kern="1200"><a:solidFill><a:schemeClr val="tx1"/></a:solidFill><a:latin typeface="+mn-lt"/><a:ea typeface="+mn-ea"/><a:cs typeface="+mn-cs"/></a:defRPr></a:lvl5pPr><a:lvl6pPr marL="2286000" algn="l" defTabSz="914400" rtl="0" eaLnBrk="1" latinLnBrk="0" hangingPunct="1"><a:defRPr sz="1800" kern="1200"><a:solidFill><a:schemeClr val="tx1"/></a:solidFill><a:latin typeface="+mn-lt"/><a:ea typeface="+mn-ea"/><a:cs typeface="+mn-cs"/></a:defRPr></a:lvl6pPr><a:lvl7pPr marL="2743200" algn="l" defTabSz="914400" rtl="0" eaLnBrk="1" latinLnBrk="0" hangingPunct="1"><a:defRPr sz="1800" kern="1200"><a:solidFill><a:schemeClr val="tx1"/></a:solidFill><a:latin typeface="+mn-lt"/><a:ea typeface="+mn-ea"/><a:cs typeface="+mn-cs"/></a:defRPr></a:lvl7pPr><a:lvl8pPr marL="3200400" algn="l" defTabSz="914400" rtl="0" eaLnBrk="1" latinLnBrk="0" hangingPunct="1"><a:defRPr sz="1800" kern="1200"><a:solidFill><a:schemeClr val="tx1"/></a:solidFill><a:latin typeface="+mn-lt"/><a:ea typeface="+mn-ea"/><a:cs typeface="+mn-cs"/></a:defRPr></a:lvl8pPr><a:lvl9pPr marL="3657600" algn="l" defTabSz="914400" rtl="0" eaLnBrk="1" latinLnBrk="0" hangingPunct="1"><a:defRPr sz="1800" kern="1200"><a:solidFill><a:schemeClr val="tx1"/></a:solidFill><a:latin typeface="+mn-lt"/><a:ea typeface="+mn-ea"/><a:cs typeface="+mn-cs"/></a:defRPr></a:lvl9pPr></a:lstStyle><a:p xmlns:a="http://schemas.openxmlformats.org/drawingml/2006/main"><a:pPr/><a:r><a:rPr lang="en-CA" sz="1400" b="0" i="0"><a:latin typeface="Cambria Math" panose="02040503050406030204" pitchFamily="18" charset="0"/></a:rPr><a:t>𝐿𝑜𝑎𝑛=16.7(𝑥−0.795)+6467</a:t></a:r><a:endParaRPr lang="en-US" sz="1400" dirty="0"/></a:p></cdr:txBody></cdr:sp></mc:Fallback></mc:AlternateContent></cdr:relSizeAnchor></c:userShapes>
-</file>
-
 <file path=ppt/slideLayouts/slideLayout1.xml><?xml version="1.0" encoding="utf-8"?>
 <p:sldLayout xmlns:a="http://schemas.openxmlformats.org/drawingml/2006/main" xmlns:r="http://schemas.openxmlformats.org/officeDocument/2006/relationships" xmlns:p="http://schemas.openxmlformats.org/presentationml/2006/main" showMasterSp="0" type="title" preserve="1">
   <p:cSld name="Title Slide">
@@ -21509,7 +21505,7 @@
           <a:p>
             <a:fld id="{5E64D5E2-E313-0149-A090-E605E7F1C794}" type="datetimeFigureOut">
               <a:rPr lang="en-US" smtClean="0"/>
-              <a:t>6/9/21</a:t>
+              <a:t>6/22/21</a:t>
             </a:fld>
             <a:endParaRPr lang="en-US"/>
           </a:p>
@@ -21686,7 +21682,7 @@
           <a:p>
             <a:fld id="{5E64D5E2-E313-0149-A090-E605E7F1C794}" type="datetimeFigureOut">
               <a:rPr lang="en-US" smtClean="0"/>
-              <a:t>6/9/21</a:t>
+              <a:t>6/22/21</a:t>
             </a:fld>
             <a:endParaRPr lang="en-US"/>
           </a:p>
@@ -21866,7 +21862,7 @@
           <a:p>
             <a:fld id="{5E64D5E2-E313-0149-A090-E605E7F1C794}" type="datetimeFigureOut">
               <a:rPr lang="en-US" smtClean="0"/>
-              <a:t>6/9/21</a:t>
+              <a:t>6/22/21</a:t>
             </a:fld>
             <a:endParaRPr lang="en-US"/>
           </a:p>
@@ -22036,7 +22032,7 @@
           <a:p>
             <a:fld id="{5E64D5E2-E313-0149-A090-E605E7F1C794}" type="datetimeFigureOut">
               <a:rPr lang="en-US" smtClean="0"/>
-              <a:t>6/9/21</a:t>
+              <a:t>6/22/21</a:t>
             </a:fld>
             <a:endParaRPr lang="en-US"/>
           </a:p>
@@ -22357,7 +22353,7 @@
           <a:p>
             <a:fld id="{5E64D5E2-E313-0149-A090-E605E7F1C794}" type="datetimeFigureOut">
               <a:rPr lang="en-US" smtClean="0"/>
-              <a:t>6/9/21</a:t>
+              <a:t>6/22/21</a:t>
             </a:fld>
             <a:endParaRPr lang="en-US"/>
           </a:p>
@@ -22817,7 +22813,7 @@
           <a:p>
             <a:fld id="{5E64D5E2-E313-0149-A090-E605E7F1C794}" type="datetimeFigureOut">
               <a:rPr lang="en-US" smtClean="0"/>
-              <a:t>6/9/21</a:t>
+              <a:t>6/22/21</a:t>
             </a:fld>
             <a:endParaRPr lang="en-US"/>
           </a:p>
@@ -23228,7 +23224,7 @@
           <a:p>
             <a:fld id="{5E64D5E2-E313-0149-A090-E605E7F1C794}" type="datetimeFigureOut">
               <a:rPr lang="en-US" smtClean="0"/>
-              <a:t>6/9/21</a:t>
+              <a:t>6/22/21</a:t>
             </a:fld>
             <a:endParaRPr lang="en-US"/>
           </a:p>
@@ -23346,7 +23342,7 @@
           <a:p>
             <a:fld id="{5E64D5E2-E313-0149-A090-E605E7F1C794}" type="datetimeFigureOut">
               <a:rPr lang="en-US" smtClean="0"/>
-              <a:t>6/9/21</a:t>
+              <a:t>6/22/21</a:t>
             </a:fld>
             <a:endParaRPr lang="en-US"/>
           </a:p>
@@ -23463,7 +23459,7 @@
           <a:p>
             <a:fld id="{5E64D5E2-E313-0149-A090-E605E7F1C794}" type="datetimeFigureOut">
               <a:rPr lang="en-US" smtClean="0"/>
-              <a:t>6/9/21</a:t>
+              <a:t>6/22/21</a:t>
             </a:fld>
             <a:endParaRPr lang="en-US"/>
           </a:p>
@@ -23821,7 +23817,7 @@
           <a:p>
             <a:fld id="{5E64D5E2-E313-0149-A090-E605E7F1C794}" type="datetimeFigureOut">
               <a:rPr lang="en-US" smtClean="0"/>
-              <a:t>6/9/21</a:t>
+              <a:t>6/22/21</a:t>
             </a:fld>
             <a:endParaRPr lang="en-US"/>
           </a:p>
@@ -24328,7 +24324,7 @@
           <a:p>
             <a:fld id="{5E64D5E2-E313-0149-A090-E605E7F1C794}" type="datetimeFigureOut">
               <a:rPr lang="en-US" smtClean="0"/>
-              <a:t>6/9/21</a:t>
+              <a:t>6/22/21</a:t>
             </a:fld>
             <a:endParaRPr lang="en-US"/>
           </a:p>
@@ -24683,7 +24679,7 @@
           <a:p>
             <a:fld id="{5E64D5E2-E313-0149-A090-E605E7F1C794}" type="datetimeFigureOut">
               <a:rPr lang="en-US" smtClean="0"/>
-              <a:t>6/9/21</a:t>
+              <a:t>6/22/21</a:t>
             </a:fld>
             <a:endParaRPr lang="en-US"/>
           </a:p>
@@ -25938,74 +25934,38 @@
           </a:graphicData>
         </a:graphic>
       </p:graphicFrame>
-      <mc:AlternateContent xmlns:mc="http://schemas.openxmlformats.org/markup-compatibility/2006">
-        <mc:Choice xmlns:a14="http://schemas.microsoft.com/office/drawing/2010/main" Requires="a14">
-          <p:graphicFrame>
-            <p:nvGraphicFramePr>
-              <p:cNvPr id="6" name="Chart 5">
-                <a:extLst>
-                  <a:ext uri="{FF2B5EF4-FFF2-40B4-BE49-F238E27FC236}">
-                    <a16:creationId xmlns:a16="http://schemas.microsoft.com/office/drawing/2014/main" id="{2FE4B319-1022-48BF-B00A-BA48C8597FBA}"/>
-                  </a:ext>
-                </a:extLst>
-              </p:cNvPr>
-              <p:cNvGraphicFramePr>
-                <a:graphicFrameLocks/>
-              </p:cNvGraphicFramePr>
-              <p:nvPr>
-                <p:extLst>
-                  <p:ext uri="{D42A27DB-BD31-4B8C-83A1-F6EECF244321}">
-                    <p14:modId xmlns:p14="http://schemas.microsoft.com/office/powerpoint/2010/main" val="1787530249"/>
-                  </p:ext>
-                </p:extLst>
-              </p:nvPr>
-            </p:nvGraphicFramePr>
-            <p:xfrm>
-              <a:off x="125741" y="284162"/>
-              <a:ext cx="11461750" cy="6573838"/>
-            </p:xfrm>
-            <a:graphic>
-              <a:graphicData uri="http://schemas.openxmlformats.org/drawingml/2006/chart">
-                <c:chart xmlns:c="http://schemas.openxmlformats.org/drawingml/2006/chart" xmlns:r="http://schemas.openxmlformats.org/officeDocument/2006/relationships" r:id="rId3"/>
-              </a:graphicData>
-            </a:graphic>
-          </p:graphicFrame>
-        </mc:Choice>
-        <mc:Fallback>
-          <p:graphicFrame>
-            <p:nvGraphicFramePr>
-              <p:cNvPr id="6" name="Chart 5">
-                <a:extLst>
-                  <a:ext uri="{FF2B5EF4-FFF2-40B4-BE49-F238E27FC236}">
-                    <a16:creationId xmlns:a16="http://schemas.microsoft.com/office/drawing/2014/main" id="{2FE4B319-1022-48BF-B00A-BA48C8597FBA}"/>
-                  </a:ext>
-                </a:extLst>
-              </p:cNvPr>
-              <p:cNvGraphicFramePr>
-                <a:graphicFrameLocks/>
-              </p:cNvGraphicFramePr>
-              <p:nvPr>
-                <p:extLst>
-                  <p:ext uri="{D42A27DB-BD31-4B8C-83A1-F6EECF244321}">
-                    <p14:modId xmlns:p14="http://schemas.microsoft.com/office/powerpoint/2010/main" val="1787530249"/>
-                  </p:ext>
-                </p:extLst>
-              </p:nvPr>
-            </p:nvGraphicFramePr>
-            <p:xfrm>
-              <a:off x="125741" y="284162"/>
-              <a:ext cx="11461750" cy="6573838"/>
-            </p:xfrm>
-            <a:graphic>
-              <a:graphicData uri="http://schemas.openxmlformats.org/drawingml/2006/chart">
-                <c:chart xmlns:c="http://schemas.openxmlformats.org/drawingml/2006/chart" xmlns:r="http://schemas.openxmlformats.org/officeDocument/2006/relationships" r:id="rId3"/>
-              </a:graphicData>
-            </a:graphic>
-          </p:graphicFrame>
-        </mc:Fallback>
-      </mc:AlternateContent>
-      <mc:AlternateContent xmlns:mc="http://schemas.openxmlformats.org/markup-compatibility/2006">
-        <mc:Choice xmlns:a14="http://schemas.microsoft.com/office/drawing/2010/main" Requires="a14">
+      <p:graphicFrame>
+        <p:nvGraphicFramePr>
+          <p:cNvPr id="6" name="Chart 5">
+            <a:extLst>
+              <a:ext uri="{FF2B5EF4-FFF2-40B4-BE49-F238E27FC236}">
+                <a16:creationId xmlns:a16="http://schemas.microsoft.com/office/drawing/2014/main" id="{2FE4B319-1022-48BF-B00A-BA48C8597FBA}"/>
+              </a:ext>
+            </a:extLst>
+          </p:cNvPr>
+          <p:cNvGraphicFramePr>
+            <a:graphicFrameLocks/>
+          </p:cNvGraphicFramePr>
+          <p:nvPr>
+            <p:extLst>
+              <p:ext uri="{D42A27DB-BD31-4B8C-83A1-F6EECF244321}">
+                <p14:modId xmlns:p14="http://schemas.microsoft.com/office/powerpoint/2010/main" val="1787530249"/>
+              </p:ext>
+            </p:extLst>
+          </p:nvPr>
+        </p:nvGraphicFramePr>
+        <p:xfrm>
+          <a:off x="125741" y="284162"/>
+          <a:ext cx="11461750" cy="6573838"/>
+        </p:xfrm>
+        <a:graphic>
+          <a:graphicData uri="http://schemas.openxmlformats.org/drawingml/2006/chart">
+            <c:chart xmlns:c="http://schemas.openxmlformats.org/drawingml/2006/chart" xmlns:r="http://schemas.openxmlformats.org/officeDocument/2006/relationships" r:id="rId3"/>
+          </a:graphicData>
+        </a:graphic>
+      </p:graphicFrame>
+      <mc:AlternateContent xmlns:mc="http://schemas.openxmlformats.org/markup-compatibility/2006" xmlns:a14="http://schemas.microsoft.com/office/drawing/2010/main">
+        <mc:Choice Requires="a14">
           <p:sp>
             <p:nvSpPr>
               <p:cNvPr id="2" name="Title 1">
@@ -26050,7 +26010,7 @@
             </p:txBody>
           </p:sp>
         </mc:Choice>
-        <mc:Fallback>
+        <mc:Fallback xmlns="">
           <p:sp>
             <p:nvSpPr>
               <p:cNvPr id="2" name="Title 1">
@@ -26234,8 +26194,8 @@
           </a:p>
         </p:txBody>
       </p:sp>
-      <mc:AlternateContent xmlns:mc="http://schemas.openxmlformats.org/markup-compatibility/2006">
-        <mc:Choice xmlns:a14="http://schemas.microsoft.com/office/drawing/2010/main" Requires="a14">
+      <mc:AlternateContent xmlns:mc="http://schemas.openxmlformats.org/markup-compatibility/2006" xmlns:a14="http://schemas.microsoft.com/office/drawing/2010/main">
+        <mc:Choice Requires="a14">
           <p:sp>
             <p:nvSpPr>
               <p:cNvPr id="4" name="TextBox 3">
@@ -26264,6 +26224,7 @@
               </a:bodyPr>
               <a:lstStyle/>
               <a:p>
+                <a:pPr/>
                 <a14:m>
                   <m:oMathPara xmlns:m="http://schemas.openxmlformats.org/officeDocument/2006/math">
                     <m:oMathParaPr>
@@ -26302,7 +26263,7 @@
             </p:txBody>
           </p:sp>
         </mc:Choice>
-        <mc:Fallback>
+        <mc:Fallback xmlns="">
           <p:sp>
             <p:nvSpPr>
               <p:cNvPr id="4" name="TextBox 3">
@@ -26347,8 +26308,8 @@
           </p:sp>
         </mc:Fallback>
       </mc:AlternateContent>
-      <mc:AlternateContent xmlns:mc="http://schemas.openxmlformats.org/markup-compatibility/2006">
-        <mc:Choice xmlns:a14="http://schemas.microsoft.com/office/drawing/2010/main" Requires="a14">
+      <mc:AlternateContent xmlns:mc="http://schemas.openxmlformats.org/markup-compatibility/2006" xmlns:a14="http://schemas.microsoft.com/office/drawing/2010/main">
+        <mc:Choice Requires="a14">
           <p:sp>
             <p:nvSpPr>
               <p:cNvPr id="13" name="TextBox 12">
@@ -26377,6 +26338,7 @@
               </a:bodyPr>
               <a:lstStyle/>
               <a:p>
+                <a:pPr/>
                 <a14:m>
                   <m:oMathPara xmlns:m="http://schemas.openxmlformats.org/officeDocument/2006/math">
                     <m:oMathParaPr>
@@ -26415,7 +26377,7 @@
             </p:txBody>
           </p:sp>
         </mc:Choice>
-        <mc:Fallback>
+        <mc:Fallback xmlns="">
           <p:sp>
             <p:nvSpPr>
               <p:cNvPr id="13" name="TextBox 12">
@@ -27350,7 +27312,7 @@
         <p:spPr>
           <a:xfrm>
             <a:off x="1063752" y="5087568"/>
-            <a:ext cx="8898466" cy="523220"/>
+            <a:ext cx="8898466" cy="1169551"/>
           </a:xfrm>
           <a:prstGeom prst="rect">
             <a:avLst/>
@@ -27367,6 +27329,15 @@
               <a:rPr lang="en-US" sz="1400" dirty="0"/>
               <a:t>Features in the algo will be picked by the team &amp; will not be selected by standard model building process to make sure those features are available in both the back-end &amp; front-end datasets</a:t>
             </a:r>
+          </a:p>
+          <a:p>
+            <a:endParaRPr lang="en-US" sz="1400" dirty="0"/>
+          </a:p>
+          <a:p>
+            <a:endParaRPr lang="en-US" sz="1400" dirty="0"/>
+          </a:p>
+          <a:p>
+            <a:endParaRPr lang="en-US" sz="1400" dirty="0"/>
           </a:p>
         </p:txBody>
       </p:sp>

</xml_diff>

<commit_message>
Google with legit reviews
Revised the code based on Ryan's comments on adding in only legit reviews
</commit_message>
<xml_diff>
--- a/API Analysis/Review deck/Initial Scoping.pptx
+++ b/API Analysis/Review deck/Initial Scoping.pptx
@@ -20,10 +20,11 @@
     <p:sldId id="272" r:id="rId14"/>
     <p:sldId id="275" r:id="rId15"/>
     <p:sldId id="263" r:id="rId16"/>
-    <p:sldId id="266" r:id="rId17"/>
-    <p:sldId id="265" r:id="rId18"/>
-    <p:sldId id="264" r:id="rId19"/>
-    <p:sldId id="271" r:id="rId20"/>
+    <p:sldId id="281" r:id="rId17"/>
+    <p:sldId id="266" r:id="rId18"/>
+    <p:sldId id="265" r:id="rId19"/>
+    <p:sldId id="264" r:id="rId20"/>
+    <p:sldId id="271" r:id="rId21"/>
   </p:sldIdLst>
   <p:sldSz cx="12192000" cy="6858000"/>
   <p:notesSz cx="6858000" cy="9144000"/>
@@ -152,7 +153,7 @@
 <file path=ppt/revisionInfo.xml><?xml version="1.0" encoding="utf-8"?>
 <p1510:revInfo xmlns:a="http://schemas.openxmlformats.org/drawingml/2006/main" xmlns:r="http://schemas.openxmlformats.org/officeDocument/2006/relationships" xmlns:p1510="http://schemas.microsoft.com/office/powerpoint/2015/10/main">
   <p1510:revLst>
-    <p1510:client id="{3D7A6A80-EE33-4841-B2CA-F0A08A8E7586}" v="873" dt="2021-06-09T17:44:22.384"/>
+    <p1510:client id="{3D7A6A80-EE33-4841-B2CA-F0A08A8E7586}" v="874" dt="2021-06-29T14:24:07.703"/>
   </p1510:revLst>
 </p1510:revInfo>
 </file>
@@ -162,7 +163,7 @@
   <pc:docChgLst>
     <pc:chgData name="udai parvathaneni" userId="d83d812613df3043" providerId="LiveId" clId="{3D7A6A80-EE33-4841-B2CA-F0A08A8E7586}"/>
     <pc:docChg chg="undo redo custSel addSld delSld modSld sldOrd">
-      <pc:chgData name="udai parvathaneni" userId="d83d812613df3043" providerId="LiveId" clId="{3D7A6A80-EE33-4841-B2CA-F0A08A8E7586}" dt="2021-06-22T21:09:14.687" v="3911" actId="6549"/>
+      <pc:chgData name="udai parvathaneni" userId="d83d812613df3043" providerId="LiveId" clId="{3D7A6A80-EE33-4841-B2CA-F0A08A8E7586}" dt="2021-06-29T14:24:07.701" v="3913"/>
       <pc:docMkLst>
         <pc:docMk/>
       </pc:docMkLst>
@@ -1672,6 +1673,21 @@
             <pc:docMk/>
             <pc:sldMk cId="3767898000" sldId="280"/>
             <ac:spMk id="2" creationId="{139404B1-CFAA-7A4A-8C3E-EFC6D556E086}"/>
+          </ac:spMkLst>
+        </pc:spChg>
+      </pc:sldChg>
+      <pc:sldChg chg="modSp new">
+        <pc:chgData name="udai parvathaneni" userId="d83d812613df3043" providerId="LiveId" clId="{3D7A6A80-EE33-4841-B2CA-F0A08A8E7586}" dt="2021-06-29T14:24:07.701" v="3913"/>
+        <pc:sldMkLst>
+          <pc:docMk/>
+          <pc:sldMk cId="4142471711" sldId="281"/>
+        </pc:sldMkLst>
+        <pc:spChg chg="mod">
+          <ac:chgData name="udai parvathaneni" userId="d83d812613df3043" providerId="LiveId" clId="{3D7A6A80-EE33-4841-B2CA-F0A08A8E7586}" dt="2021-06-29T14:24:07.701" v="3913"/>
+          <ac:spMkLst>
+            <pc:docMk/>
+            <pc:sldMk cId="4142471711" sldId="281"/>
+            <ac:spMk id="3" creationId="{589B54E8-C1F2-E44F-9D2E-14A5669288D2}"/>
           </ac:spMkLst>
         </pc:spChg>
       </pc:sldChg>
@@ -30626,6 +30642,129 @@
 <file path=ppt/slides/slide16.xml><?xml version="1.0" encoding="utf-8"?>
 <p:sld xmlns:a="http://schemas.openxmlformats.org/drawingml/2006/main" xmlns:r="http://schemas.openxmlformats.org/officeDocument/2006/relationships" xmlns:p="http://schemas.openxmlformats.org/presentationml/2006/main">
   <p:cSld>
+    <p:spTree>
+      <p:nvGrpSpPr>
+        <p:cNvPr id="1" name=""/>
+        <p:cNvGrpSpPr/>
+        <p:nvPr/>
+      </p:nvGrpSpPr>
+      <p:grpSpPr>
+        <a:xfrm>
+          <a:off x="0" y="0"/>
+          <a:ext cx="0" cy="0"/>
+          <a:chOff x="0" y="0"/>
+          <a:chExt cx="0" cy="0"/>
+        </a:xfrm>
+      </p:grpSpPr>
+      <p:sp>
+        <p:nvSpPr>
+          <p:cNvPr id="2" name="Title 1">
+            <a:extLst>
+              <a:ext uri="{FF2B5EF4-FFF2-40B4-BE49-F238E27FC236}">
+                <a16:creationId xmlns:a16="http://schemas.microsoft.com/office/drawing/2014/main" id="{BFFD3EF2-7289-464B-A00B-F567B19A1AF5}"/>
+              </a:ext>
+            </a:extLst>
+          </p:cNvPr>
+          <p:cNvSpPr>
+            <a:spLocks noGrp="1"/>
+          </p:cNvSpPr>
+          <p:nvPr>
+            <p:ph type="title"/>
+          </p:nvPr>
+        </p:nvSpPr>
+        <p:spPr/>
+        <p:txBody>
+          <a:bodyPr/>
+          <a:lstStyle/>
+          <a:p>
+            <a:endParaRPr lang="en-US"/>
+          </a:p>
+        </p:txBody>
+      </p:sp>
+      <p:sp>
+        <p:nvSpPr>
+          <p:cNvPr id="3" name="Content Placeholder 2">
+            <a:extLst>
+              <a:ext uri="{FF2B5EF4-FFF2-40B4-BE49-F238E27FC236}">
+                <a16:creationId xmlns:a16="http://schemas.microsoft.com/office/drawing/2014/main" id="{589B54E8-C1F2-E44F-9D2E-14A5669288D2}"/>
+              </a:ext>
+            </a:extLst>
+          </p:cNvPr>
+          <p:cNvSpPr>
+            <a:spLocks noGrp="1"/>
+          </p:cNvSpPr>
+          <p:nvPr>
+            <p:ph idx="1"/>
+          </p:nvPr>
+        </p:nvSpPr>
+        <p:spPr/>
+        <p:txBody>
+          <a:bodyPr/>
+          <a:lstStyle/>
+          <a:p>
+            <a:r>
+              <a:rPr lang="en-US" dirty="0"/>
+              <a:t>&lt;span </a:t>
+            </a:r>
+            <a:r>
+              <a:rPr lang="en-US" dirty="0" err="1"/>
+              <a:t>jstcache</a:t>
+            </a:r>
+            <a:r>
+              <a:rPr lang="en-US" dirty="0"/>
+              <a:t>="142" aria-</a:t>
+            </a:r>
+            <a:r>
+              <a:rPr lang="en-US" dirty="0" err="1"/>
+              <a:t>haspopup</a:t>
+            </a:r>
+            <a:r>
+              <a:rPr lang="en-US" dirty="0"/>
+              <a:t>="true" role="button" </a:t>
+            </a:r>
+            <a:r>
+              <a:rPr lang="en-US" dirty="0" err="1"/>
+              <a:t>tabindex</a:t>
+            </a:r>
+            <a:r>
+              <a:rPr lang="en-US" dirty="0"/>
+              <a:t>="0" </a:t>
+            </a:r>
+            <a:r>
+              <a:rPr lang="en-US" dirty="0" err="1"/>
+              <a:t>jsaction</a:t>
+            </a:r>
+            <a:r>
+              <a:rPr lang="en-US" dirty="0"/>
+              <a:t>="pane.profile-stats.showStats;keydown:pane.profile-stats.showStats" class="uOKFHc-n1UuX-header-UjZuef uOKFHc-n1UuX-header-d6wfac-ibnC6b" </a:t>
+            </a:r>
+            <a:r>
+              <a:rPr lang="en-US" dirty="0" err="1"/>
+              <a:t>jsan</a:t>
+            </a:r>
+            <a:r>
+              <a:rPr lang="en-US" dirty="0"/>
+              <a:t>="7.uOKFHc-n1UuX-header-UjZuef,t-fUhMXXhk9tM,0.aria-haspopup,7.uOKFHc-n1UuX-header-d6wfac-ibnC6b,0.role,0.tabindex,0.jsaction"&gt;Local Guide · Level 8&lt;/span&gt;</a:t>
+            </a:r>
+          </a:p>
+        </p:txBody>
+      </p:sp>
+    </p:spTree>
+    <p:extLst>
+      <p:ext uri="{BB962C8B-B14F-4D97-AF65-F5344CB8AC3E}">
+        <p14:creationId xmlns:p14="http://schemas.microsoft.com/office/powerpoint/2010/main" val="4142471711"/>
+      </p:ext>
+    </p:extLst>
+  </p:cSld>
+  <p:clrMapOvr>
+    <a:masterClrMapping/>
+  </p:clrMapOvr>
+</p:sld>
+</file>
+
+<file path=ppt/slides/slide17.xml><?xml version="1.0" encoding="utf-8"?>
+<p:sld xmlns:a="http://schemas.openxmlformats.org/drawingml/2006/main" xmlns:r="http://schemas.openxmlformats.org/officeDocument/2006/relationships" xmlns:p="http://schemas.openxmlformats.org/presentationml/2006/main">
+  <p:cSld>
     <p:bg>
       <p:bgPr>
         <a:solidFill>
@@ -31046,7 +31185,7 @@
 </p:sld>
 </file>
 
-<file path=ppt/slides/slide17.xml><?xml version="1.0" encoding="utf-8"?>
+<file path=ppt/slides/slide18.xml><?xml version="1.0" encoding="utf-8"?>
 <p:sld xmlns:a="http://schemas.openxmlformats.org/drawingml/2006/main" xmlns:r="http://schemas.openxmlformats.org/officeDocument/2006/relationships" xmlns:p="http://schemas.openxmlformats.org/presentationml/2006/main">
   <p:cSld>
     <p:spTree>
@@ -31129,7 +31268,7 @@
 </p:sld>
 </file>
 
-<file path=ppt/slides/slide18.xml><?xml version="1.0" encoding="utf-8"?>
+<file path=ppt/slides/slide19.xml><?xml version="1.0" encoding="utf-8"?>
 <p:sld xmlns:a="http://schemas.openxmlformats.org/drawingml/2006/main" xmlns:r="http://schemas.openxmlformats.org/officeDocument/2006/relationships" xmlns:p="http://schemas.openxmlformats.org/presentationml/2006/main">
   <p:cSld>
     <p:spTree>
@@ -34874,101 +35013,6 @@
 </p:sld>
 </file>
 
-<file path=ppt/slides/slide19.xml><?xml version="1.0" encoding="utf-8"?>
-<p:sld xmlns:a="http://schemas.openxmlformats.org/drawingml/2006/main" xmlns:r="http://schemas.openxmlformats.org/officeDocument/2006/relationships" xmlns:p="http://schemas.openxmlformats.org/presentationml/2006/main">
-  <p:cSld>
-    <p:spTree>
-      <p:nvGrpSpPr>
-        <p:cNvPr id="1" name=""/>
-        <p:cNvGrpSpPr/>
-        <p:nvPr/>
-      </p:nvGrpSpPr>
-      <p:grpSpPr>
-        <a:xfrm>
-          <a:off x="0" y="0"/>
-          <a:ext cx="0" cy="0"/>
-          <a:chOff x="0" y="0"/>
-          <a:chExt cx="0" cy="0"/>
-        </a:xfrm>
-      </p:grpSpPr>
-      <p:graphicFrame>
-        <p:nvGraphicFramePr>
-          <p:cNvPr id="4" name="Chart 3">
-            <a:extLst>
-              <a:ext uri="{FF2B5EF4-FFF2-40B4-BE49-F238E27FC236}">
-                <a16:creationId xmlns:a16="http://schemas.microsoft.com/office/drawing/2014/main" id="{13EA8622-B609-604B-A1D9-F811954A22E8}"/>
-              </a:ext>
-            </a:extLst>
-          </p:cNvPr>
-          <p:cNvGraphicFramePr>
-            <a:graphicFrameLocks/>
-          </p:cNvGraphicFramePr>
-          <p:nvPr>
-            <p:extLst>
-              <p:ext uri="{D42A27DB-BD31-4B8C-83A1-F6EECF244321}">
-                <p14:modId xmlns:p14="http://schemas.microsoft.com/office/powerpoint/2010/main" val="3995232182"/>
-              </p:ext>
-            </p:extLst>
-          </p:nvPr>
-        </p:nvGraphicFramePr>
-        <p:xfrm>
-          <a:off x="741528" y="791571"/>
-          <a:ext cx="10386720" cy="5581798"/>
-        </p:xfrm>
-        <a:graphic>
-          <a:graphicData uri="http://schemas.openxmlformats.org/drawingml/2006/chart">
-            <c:chart xmlns:c="http://schemas.openxmlformats.org/drawingml/2006/chart" xmlns:r="http://schemas.openxmlformats.org/officeDocument/2006/relationships" r:id="rId2"/>
-          </a:graphicData>
-        </a:graphic>
-      </p:graphicFrame>
-      <p:sp>
-        <p:nvSpPr>
-          <p:cNvPr id="2" name="TextBox 1">
-            <a:extLst>
-              <a:ext uri="{FF2B5EF4-FFF2-40B4-BE49-F238E27FC236}">
-                <a16:creationId xmlns:a16="http://schemas.microsoft.com/office/drawing/2014/main" id="{B047CCC4-43B1-F748-B699-9166FFAD1068}"/>
-              </a:ext>
-            </a:extLst>
-          </p:cNvPr>
-          <p:cNvSpPr txBox="1"/>
-          <p:nvPr/>
-        </p:nvSpPr>
-        <p:spPr>
-          <a:xfrm>
-            <a:off x="212651" y="6373369"/>
-            <a:ext cx="2541850" cy="307777"/>
-          </a:xfrm>
-          <a:prstGeom prst="rect">
-            <a:avLst/>
-          </a:prstGeom>
-          <a:noFill/>
-        </p:spPr>
-        <p:txBody>
-          <a:bodyPr wrap="none" rtlCol="0">
-            <a:spAutoFit/>
-          </a:bodyPr>
-          <a:lstStyle/>
-          <a:p>
-            <a:r>
-              <a:rPr lang="en-US" sz="1400" dirty="0"/>
-              <a:t>Source : Kaggle &amp; Chase 10K</a:t>
-            </a:r>
-          </a:p>
-        </p:txBody>
-      </p:sp>
-    </p:spTree>
-    <p:extLst>
-      <p:ext uri="{BB962C8B-B14F-4D97-AF65-F5344CB8AC3E}">
-        <p14:creationId xmlns:p14="http://schemas.microsoft.com/office/powerpoint/2010/main" val="2371888720"/>
-      </p:ext>
-    </p:extLst>
-  </p:cSld>
-  <p:clrMapOvr>
-    <a:masterClrMapping/>
-  </p:clrMapOvr>
-</p:sld>
-</file>
-
 <file path=ppt/slides/slide2.xml><?xml version="1.0" encoding="utf-8"?>
 <p:sld xmlns:a="http://schemas.openxmlformats.org/drawingml/2006/main" xmlns:r="http://schemas.openxmlformats.org/officeDocument/2006/relationships" xmlns:p="http://schemas.openxmlformats.org/presentationml/2006/main">
   <p:cSld>
@@ -35773,6 +35817,101 @@
     <p:extLst>
       <p:ext uri="{BB962C8B-B14F-4D97-AF65-F5344CB8AC3E}">
         <p14:creationId xmlns:p14="http://schemas.microsoft.com/office/powerpoint/2010/main" val="779737078"/>
+      </p:ext>
+    </p:extLst>
+  </p:cSld>
+  <p:clrMapOvr>
+    <a:masterClrMapping/>
+  </p:clrMapOvr>
+</p:sld>
+</file>
+
+<file path=ppt/slides/slide20.xml><?xml version="1.0" encoding="utf-8"?>
+<p:sld xmlns:a="http://schemas.openxmlformats.org/drawingml/2006/main" xmlns:r="http://schemas.openxmlformats.org/officeDocument/2006/relationships" xmlns:p="http://schemas.openxmlformats.org/presentationml/2006/main">
+  <p:cSld>
+    <p:spTree>
+      <p:nvGrpSpPr>
+        <p:cNvPr id="1" name=""/>
+        <p:cNvGrpSpPr/>
+        <p:nvPr/>
+      </p:nvGrpSpPr>
+      <p:grpSpPr>
+        <a:xfrm>
+          <a:off x="0" y="0"/>
+          <a:ext cx="0" cy="0"/>
+          <a:chOff x="0" y="0"/>
+          <a:chExt cx="0" cy="0"/>
+        </a:xfrm>
+      </p:grpSpPr>
+      <p:graphicFrame>
+        <p:nvGraphicFramePr>
+          <p:cNvPr id="4" name="Chart 3">
+            <a:extLst>
+              <a:ext uri="{FF2B5EF4-FFF2-40B4-BE49-F238E27FC236}">
+                <a16:creationId xmlns:a16="http://schemas.microsoft.com/office/drawing/2014/main" id="{13EA8622-B609-604B-A1D9-F811954A22E8}"/>
+              </a:ext>
+            </a:extLst>
+          </p:cNvPr>
+          <p:cNvGraphicFramePr>
+            <a:graphicFrameLocks/>
+          </p:cNvGraphicFramePr>
+          <p:nvPr>
+            <p:extLst>
+              <p:ext uri="{D42A27DB-BD31-4B8C-83A1-F6EECF244321}">
+                <p14:modId xmlns:p14="http://schemas.microsoft.com/office/powerpoint/2010/main" val="3995232182"/>
+              </p:ext>
+            </p:extLst>
+          </p:nvPr>
+        </p:nvGraphicFramePr>
+        <p:xfrm>
+          <a:off x="741528" y="791571"/>
+          <a:ext cx="10386720" cy="5581798"/>
+        </p:xfrm>
+        <a:graphic>
+          <a:graphicData uri="http://schemas.openxmlformats.org/drawingml/2006/chart">
+            <c:chart xmlns:c="http://schemas.openxmlformats.org/drawingml/2006/chart" xmlns:r="http://schemas.openxmlformats.org/officeDocument/2006/relationships" r:id="rId2"/>
+          </a:graphicData>
+        </a:graphic>
+      </p:graphicFrame>
+      <p:sp>
+        <p:nvSpPr>
+          <p:cNvPr id="2" name="TextBox 1">
+            <a:extLst>
+              <a:ext uri="{FF2B5EF4-FFF2-40B4-BE49-F238E27FC236}">
+                <a16:creationId xmlns:a16="http://schemas.microsoft.com/office/drawing/2014/main" id="{B047CCC4-43B1-F748-B699-9166FFAD1068}"/>
+              </a:ext>
+            </a:extLst>
+          </p:cNvPr>
+          <p:cNvSpPr txBox="1"/>
+          <p:nvPr/>
+        </p:nvSpPr>
+        <p:spPr>
+          <a:xfrm>
+            <a:off x="212651" y="6373369"/>
+            <a:ext cx="2541850" cy="307777"/>
+          </a:xfrm>
+          <a:prstGeom prst="rect">
+            <a:avLst/>
+          </a:prstGeom>
+          <a:noFill/>
+        </p:spPr>
+        <p:txBody>
+          <a:bodyPr wrap="none" rtlCol="0">
+            <a:spAutoFit/>
+          </a:bodyPr>
+          <a:lstStyle/>
+          <a:p>
+            <a:r>
+              <a:rPr lang="en-US" sz="1400" dirty="0"/>
+              <a:t>Source : Kaggle &amp; Chase 10K</a:t>
+            </a:r>
+          </a:p>
+        </p:txBody>
+      </p:sp>
+    </p:spTree>
+    <p:extLst>
+      <p:ext uri="{BB962C8B-B14F-4D97-AF65-F5344CB8AC3E}">
+        <p14:creationId xmlns:p14="http://schemas.microsoft.com/office/powerpoint/2010/main" val="2371888720"/>
       </p:ext>
     </p:extLst>
   </p:cSld>

</xml_diff>

<commit_message>
addnl fixes to Dune
</commit_message>
<xml_diff>
--- a/API Analysis/Review deck/Initial Scoping.pptx
+++ b/API Analysis/Review deck/Initial Scoping.pptx
@@ -163,7 +163,7 @@
   <pc:docChgLst>
     <pc:chgData name="udai parvathaneni" userId="d83d812613df3043" providerId="LiveId" clId="{3D7A6A80-EE33-4841-B2CA-F0A08A8E7586}"/>
     <pc:docChg chg="undo redo custSel addSld delSld modSld sldOrd">
-      <pc:chgData name="udai parvathaneni" userId="d83d812613df3043" providerId="LiveId" clId="{3D7A6A80-EE33-4841-B2CA-F0A08A8E7586}" dt="2021-06-30T14:51:14.499" v="4254" actId="478"/>
+      <pc:chgData name="udai parvathaneni" userId="d83d812613df3043" providerId="LiveId" clId="{3D7A6A80-EE33-4841-B2CA-F0A08A8E7586}" dt="2021-07-07T14:37:12.428" v="4267" actId="20577"/>
       <pc:docMkLst>
         <pc:docMk/>
       </pc:docMkLst>
@@ -1677,7 +1677,7 @@
         </pc:spChg>
       </pc:sldChg>
       <pc:sldChg chg="addSp delSp modSp new mod">
-        <pc:chgData name="udai parvathaneni" userId="d83d812613df3043" providerId="LiveId" clId="{3D7A6A80-EE33-4841-B2CA-F0A08A8E7586}" dt="2021-06-30T14:51:14.499" v="4254" actId="478"/>
+        <pc:chgData name="udai parvathaneni" userId="d83d812613df3043" providerId="LiveId" clId="{3D7A6A80-EE33-4841-B2CA-F0A08A8E7586}" dt="2021-07-07T14:37:12.428" v="4267" actId="20577"/>
         <pc:sldMkLst>
           <pc:docMk/>
           <pc:sldMk cId="4142471711" sldId="281"/>
@@ -1963,7 +1963,7 @@
           </ac:spMkLst>
         </pc:spChg>
         <pc:spChg chg="mod">
-          <ac:chgData name="udai parvathaneni" userId="d83d812613df3043" providerId="LiveId" clId="{3D7A6A80-EE33-4841-B2CA-F0A08A8E7586}" dt="2021-06-30T14:47:25.681" v="4200" actId="2085"/>
+          <ac:chgData name="udai parvathaneni" userId="d83d812613df3043" providerId="LiveId" clId="{3D7A6A80-EE33-4841-B2CA-F0A08A8E7586}" dt="2021-07-07T14:37:12.428" v="4267" actId="20577"/>
           <ac:spMkLst>
             <pc:docMk/>
             <pc:sldMk cId="4142471711" sldId="281"/>
@@ -24909,7 +24909,7 @@
           <a:p>
             <a:fld id="{5E64D5E2-E313-0149-A090-E605E7F1C794}" type="datetimeFigureOut">
               <a:rPr lang="en-US" smtClean="0"/>
-              <a:t>6/22/21</a:t>
+              <a:t>7/7/21</a:t>
             </a:fld>
             <a:endParaRPr lang="en-US"/>
           </a:p>
@@ -25086,7 +25086,7 @@
           <a:p>
             <a:fld id="{5E64D5E2-E313-0149-A090-E605E7F1C794}" type="datetimeFigureOut">
               <a:rPr lang="en-US" smtClean="0"/>
-              <a:t>6/22/21</a:t>
+              <a:t>7/7/21</a:t>
             </a:fld>
             <a:endParaRPr lang="en-US"/>
           </a:p>
@@ -25266,7 +25266,7 @@
           <a:p>
             <a:fld id="{5E64D5E2-E313-0149-A090-E605E7F1C794}" type="datetimeFigureOut">
               <a:rPr lang="en-US" smtClean="0"/>
-              <a:t>6/22/21</a:t>
+              <a:t>7/7/21</a:t>
             </a:fld>
             <a:endParaRPr lang="en-US"/>
           </a:p>
@@ -25436,7 +25436,7 @@
           <a:p>
             <a:fld id="{5E64D5E2-E313-0149-A090-E605E7F1C794}" type="datetimeFigureOut">
               <a:rPr lang="en-US" smtClean="0"/>
-              <a:t>6/22/21</a:t>
+              <a:t>7/7/21</a:t>
             </a:fld>
             <a:endParaRPr lang="en-US"/>
           </a:p>
@@ -25757,7 +25757,7 @@
           <a:p>
             <a:fld id="{5E64D5E2-E313-0149-A090-E605E7F1C794}" type="datetimeFigureOut">
               <a:rPr lang="en-US" smtClean="0"/>
-              <a:t>6/22/21</a:t>
+              <a:t>7/7/21</a:t>
             </a:fld>
             <a:endParaRPr lang="en-US"/>
           </a:p>
@@ -26217,7 +26217,7 @@
           <a:p>
             <a:fld id="{5E64D5E2-E313-0149-A090-E605E7F1C794}" type="datetimeFigureOut">
               <a:rPr lang="en-US" smtClean="0"/>
-              <a:t>6/22/21</a:t>
+              <a:t>7/7/21</a:t>
             </a:fld>
             <a:endParaRPr lang="en-US"/>
           </a:p>
@@ -26628,7 +26628,7 @@
           <a:p>
             <a:fld id="{5E64D5E2-E313-0149-A090-E605E7F1C794}" type="datetimeFigureOut">
               <a:rPr lang="en-US" smtClean="0"/>
-              <a:t>6/22/21</a:t>
+              <a:t>7/7/21</a:t>
             </a:fld>
             <a:endParaRPr lang="en-US"/>
           </a:p>
@@ -26746,7 +26746,7 @@
           <a:p>
             <a:fld id="{5E64D5E2-E313-0149-A090-E605E7F1C794}" type="datetimeFigureOut">
               <a:rPr lang="en-US" smtClean="0"/>
-              <a:t>6/22/21</a:t>
+              <a:t>7/7/21</a:t>
             </a:fld>
             <a:endParaRPr lang="en-US"/>
           </a:p>
@@ -26863,7 +26863,7 @@
           <a:p>
             <a:fld id="{5E64D5E2-E313-0149-A090-E605E7F1C794}" type="datetimeFigureOut">
               <a:rPr lang="en-US" smtClean="0"/>
-              <a:t>6/22/21</a:t>
+              <a:t>7/7/21</a:t>
             </a:fld>
             <a:endParaRPr lang="en-US"/>
           </a:p>
@@ -27221,7 +27221,7 @@
           <a:p>
             <a:fld id="{5E64D5E2-E313-0149-A090-E605E7F1C794}" type="datetimeFigureOut">
               <a:rPr lang="en-US" smtClean="0"/>
-              <a:t>6/22/21</a:t>
+              <a:t>7/7/21</a:t>
             </a:fld>
             <a:endParaRPr lang="en-US"/>
           </a:p>
@@ -27728,7 +27728,7 @@
           <a:p>
             <a:fld id="{5E64D5E2-E313-0149-A090-E605E7F1C794}" type="datetimeFigureOut">
               <a:rPr lang="en-US" smtClean="0"/>
-              <a:t>6/22/21</a:t>
+              <a:t>7/7/21</a:t>
             </a:fld>
             <a:endParaRPr lang="en-US"/>
           </a:p>
@@ -28083,7 +28083,7 @@
           <a:p>
             <a:fld id="{5E64D5E2-E313-0149-A090-E605E7F1C794}" type="datetimeFigureOut">
               <a:rPr lang="en-US" smtClean="0"/>
-              <a:t>6/22/21</a:t>
+              <a:t>7/7/21</a:t>
             </a:fld>
             <a:endParaRPr lang="en-US"/>
           </a:p>

</xml_diff>